<commit_message>
Updated presentation and script
</commit_message>
<xml_diff>
--- a/Apresentação-JoãoVictorSpadão.pptx
+++ b/Apresentação-JoãoVictorSpadão.pptx
@@ -5,22 +5,27 @@
     <p:sldMasterId id="2147483648" r:id="rId1"/>
   </p:sldMasterIdLst>
   <p:handoutMasterIdLst>
-    <p:handoutMasterId r:id="rId15"/>
+    <p:handoutMasterId r:id="rId20"/>
   </p:handoutMasterIdLst>
   <p:sldIdLst>
     <p:sldId id="256" r:id="rId2"/>
     <p:sldId id="257" r:id="rId3"/>
     <p:sldId id="258" r:id="rId4"/>
     <p:sldId id="259" r:id="rId5"/>
-    <p:sldId id="260" r:id="rId6"/>
-    <p:sldId id="262" r:id="rId7"/>
-    <p:sldId id="261" r:id="rId8"/>
-    <p:sldId id="268" r:id="rId9"/>
-    <p:sldId id="265" r:id="rId10"/>
-    <p:sldId id="266" r:id="rId11"/>
-    <p:sldId id="267" r:id="rId12"/>
-    <p:sldId id="269" r:id="rId13"/>
-    <p:sldId id="263" r:id="rId14"/>
+    <p:sldId id="274" r:id="rId6"/>
+    <p:sldId id="260" r:id="rId7"/>
+    <p:sldId id="262" r:id="rId8"/>
+    <p:sldId id="261" r:id="rId9"/>
+    <p:sldId id="268" r:id="rId10"/>
+    <p:sldId id="265" r:id="rId11"/>
+    <p:sldId id="266" r:id="rId12"/>
+    <p:sldId id="267" r:id="rId13"/>
+    <p:sldId id="269" r:id="rId14"/>
+    <p:sldId id="271" r:id="rId15"/>
+    <p:sldId id="263" r:id="rId16"/>
+    <p:sldId id="270" r:id="rId17"/>
+    <p:sldId id="272" r:id="rId18"/>
+    <p:sldId id="273" r:id="rId19"/>
   </p:sldIdLst>
   <p:sldSz cx="12192000" cy="6858000"/>
   <p:notesSz cx="6858000" cy="9144000"/>
@@ -123,6 +128,9 @@
     <p:ext uri="{EFAFB233-063F-42B5-8137-9DF3F51BA10A}">
       <p15:sldGuideLst xmlns:p15="http://schemas.microsoft.com/office/powerpoint/2012/main"/>
     </p:ext>
+    <p:ext uri="{2D200454-40CA-4A62-9FC3-DE9A4176ACB9}">
+      <p15:notesGuideLst xmlns:p15="http://schemas.microsoft.com/office/powerpoint/2012/main"/>
+    </p:ext>
   </p:extLst>
 </p:presentation>
 </file>
@@ -221,7 +229,7 @@
           <a:p>
             <a:fld id="{76F990C6-0F2C-4B49-B9D8-A6A41684FFEB}" type="datetimeFigureOut">
               <a:rPr lang="pt-BR" smtClean="0"/>
-              <a:t>24/11/2020</a:t>
+              <a:t>25/11/2020</a:t>
             </a:fld>
             <a:endParaRPr lang="pt-BR"/>
           </a:p>
@@ -299,7 +307,7 @@
           <a:p>
             <a:fld id="{9845A32D-F7C9-49EB-8472-57F1B5BD6A05}" type="slidenum">
               <a:rPr lang="pt-BR" smtClean="0"/>
-              <a:t>‹#›</a:t>
+              <a:t>‹nº›</a:t>
             </a:fld>
             <a:endParaRPr lang="pt-BR"/>
           </a:p>
@@ -482,7 +490,7 @@
             <a:fld id="{80914C5D-ABDB-4AEE-9173-EE9A77300385}" type="datetimeFigureOut">
               <a:rPr lang="en-GB" smtClean="0"/>
               <a:pPr/>
-              <a:t>24/11/2020</a:t>
+              <a:t>25/11/2020</a:t>
             </a:fld>
             <a:endParaRPr lang="en-GB" b="1" dirty="0"/>
           </a:p>
@@ -536,7 +544,7 @@
           <a:p>
             <a:fld id="{F74C8447-87D7-4742-A9AC-67521EFA977B}" type="slidenum">
               <a:rPr lang="en-GB" smtClean="0"/>
-              <a:t>‹#›</a:t>
+              <a:t>‹nº›</a:t>
             </a:fld>
             <a:endParaRPr lang="en-GB"/>
           </a:p>
@@ -850,7 +858,7 @@
           <a:p>
             <a:fld id="{80914C5D-ABDB-4AEE-9173-EE9A77300385}" type="datetimeFigureOut">
               <a:rPr lang="en-GB" smtClean="0"/>
-              <a:t>24/11/2020</a:t>
+              <a:t>25/11/2020</a:t>
             </a:fld>
             <a:endParaRPr lang="en-GB"/>
           </a:p>
@@ -904,7 +912,7 @@
           <a:p>
             <a:fld id="{F74C8447-87D7-4742-A9AC-67521EFA977B}" type="slidenum">
               <a:rPr lang="en-GB" smtClean="0"/>
-              <a:t>‹#›</a:t>
+              <a:t>‹nº›</a:t>
             </a:fld>
             <a:endParaRPr lang="en-GB"/>
           </a:p>
@@ -1050,7 +1058,7 @@
           <a:p>
             <a:fld id="{80914C5D-ABDB-4AEE-9173-EE9A77300385}" type="datetimeFigureOut">
               <a:rPr lang="en-GB" smtClean="0"/>
-              <a:t>24/11/2020</a:t>
+              <a:t>25/11/2020</a:t>
             </a:fld>
             <a:endParaRPr lang="en-GB"/>
           </a:p>
@@ -1104,7 +1112,7 @@
           <a:p>
             <a:fld id="{F74C8447-87D7-4742-A9AC-67521EFA977B}" type="slidenum">
               <a:rPr lang="en-GB" smtClean="0"/>
-              <a:t>‹#›</a:t>
+              <a:t>‹nº›</a:t>
             </a:fld>
             <a:endParaRPr lang="en-GB"/>
           </a:p>
@@ -1260,7 +1268,7 @@
           <a:p>
             <a:fld id="{80914C5D-ABDB-4AEE-9173-EE9A77300385}" type="datetimeFigureOut">
               <a:rPr lang="en-GB" smtClean="0"/>
-              <a:t>24/11/2020</a:t>
+              <a:t>25/11/2020</a:t>
             </a:fld>
             <a:endParaRPr lang="en-GB"/>
           </a:p>
@@ -1314,7 +1322,7 @@
           <a:p>
             <a:fld id="{F74C8447-87D7-4742-A9AC-67521EFA977B}" type="slidenum">
               <a:rPr lang="en-GB" smtClean="0"/>
-              <a:t>‹#›</a:t>
+              <a:t>‹nº›</a:t>
             </a:fld>
             <a:endParaRPr lang="en-GB"/>
           </a:p>
@@ -2154,7 +2162,7 @@
           <a:p>
             <a:fld id="{80914C5D-ABDB-4AEE-9173-EE9A77300385}" type="datetimeFigureOut">
               <a:rPr lang="en-GB" smtClean="0"/>
-              <a:t>24/11/2020</a:t>
+              <a:t>25/11/2020</a:t>
             </a:fld>
             <a:endParaRPr lang="en-GB"/>
           </a:p>
@@ -2208,7 +2216,7 @@
           <a:p>
             <a:fld id="{F74C8447-87D7-4742-A9AC-67521EFA977B}" type="slidenum">
               <a:rPr lang="en-GB" smtClean="0"/>
-              <a:t>‹#›</a:t>
+              <a:t>‹nº›</a:t>
             </a:fld>
             <a:endParaRPr lang="en-GB"/>
           </a:p>
@@ -2422,7 +2430,7 @@
           <a:p>
             <a:fld id="{80914C5D-ABDB-4AEE-9173-EE9A77300385}" type="datetimeFigureOut">
               <a:rPr lang="en-GB" smtClean="0"/>
-              <a:t>24/11/2020</a:t>
+              <a:t>25/11/2020</a:t>
             </a:fld>
             <a:endParaRPr lang="en-GB"/>
           </a:p>
@@ -2476,7 +2484,7 @@
           <a:p>
             <a:fld id="{F74C8447-87D7-4742-A9AC-67521EFA977B}" type="slidenum">
               <a:rPr lang="en-GB" smtClean="0"/>
-              <a:t>‹#›</a:t>
+              <a:t>‹nº›</a:t>
             </a:fld>
             <a:endParaRPr lang="en-GB"/>
           </a:p>
@@ -2837,7 +2845,7 @@
           <a:p>
             <a:fld id="{80914C5D-ABDB-4AEE-9173-EE9A77300385}" type="datetimeFigureOut">
               <a:rPr lang="en-GB" smtClean="0"/>
-              <a:t>24/11/2020</a:t>
+              <a:t>25/11/2020</a:t>
             </a:fld>
             <a:endParaRPr lang="en-GB"/>
           </a:p>
@@ -2891,7 +2899,7 @@
           <a:p>
             <a:fld id="{F74C8447-87D7-4742-A9AC-67521EFA977B}" type="slidenum">
               <a:rPr lang="en-GB" smtClean="0"/>
-              <a:t>‹#›</a:t>
+              <a:t>‹nº›</a:t>
             </a:fld>
             <a:endParaRPr lang="en-GB"/>
           </a:p>
@@ -2979,7 +2987,7 @@
           <a:p>
             <a:fld id="{80914C5D-ABDB-4AEE-9173-EE9A77300385}" type="datetimeFigureOut">
               <a:rPr lang="en-GB" smtClean="0"/>
-              <a:t>24/11/2020</a:t>
+              <a:t>25/11/2020</a:t>
             </a:fld>
             <a:endParaRPr lang="en-GB"/>
           </a:p>
@@ -3033,7 +3041,7 @@
           <a:p>
             <a:fld id="{F74C8447-87D7-4742-A9AC-67521EFA977B}" type="slidenum">
               <a:rPr lang="en-GB" smtClean="0"/>
-              <a:t>‹#›</a:t>
+              <a:t>‹nº›</a:t>
             </a:fld>
             <a:endParaRPr lang="en-GB"/>
           </a:p>
@@ -3092,7 +3100,7 @@
           <a:p>
             <a:fld id="{80914C5D-ABDB-4AEE-9173-EE9A77300385}" type="datetimeFigureOut">
               <a:rPr lang="en-GB" smtClean="0"/>
-              <a:t>24/11/2020</a:t>
+              <a:t>25/11/2020</a:t>
             </a:fld>
             <a:endParaRPr lang="en-GB"/>
           </a:p>
@@ -3146,7 +3154,7 @@
           <a:p>
             <a:fld id="{F74C8447-87D7-4742-A9AC-67521EFA977B}" type="slidenum">
               <a:rPr lang="en-GB" smtClean="0"/>
-              <a:t>‹#›</a:t>
+              <a:t>‹nº›</a:t>
             </a:fld>
             <a:endParaRPr lang="en-GB"/>
           </a:p>
@@ -3405,7 +3413,7 @@
           <a:p>
             <a:fld id="{80914C5D-ABDB-4AEE-9173-EE9A77300385}" type="datetimeFigureOut">
               <a:rPr lang="en-GB" smtClean="0"/>
-              <a:t>24/11/2020</a:t>
+              <a:t>25/11/2020</a:t>
             </a:fld>
             <a:endParaRPr lang="en-GB"/>
           </a:p>
@@ -3459,7 +3467,7 @@
           <a:p>
             <a:fld id="{F74C8447-87D7-4742-A9AC-67521EFA977B}" type="slidenum">
               <a:rPr lang="en-GB" smtClean="0"/>
-              <a:t>‹#›</a:t>
+              <a:t>‹nº›</a:t>
             </a:fld>
             <a:endParaRPr lang="en-GB"/>
           </a:p>
@@ -3651,7 +3659,7 @@
           <a:p>
             <a:fld id="{80914C5D-ABDB-4AEE-9173-EE9A77300385}" type="datetimeFigureOut">
               <a:rPr lang="en-GB" smtClean="0"/>
-              <a:t>24/11/2020</a:t>
+              <a:t>25/11/2020</a:t>
             </a:fld>
             <a:endParaRPr lang="en-GB"/>
           </a:p>
@@ -3741,7 +3749,7 @@
           <a:p>
             <a:fld id="{F74C8447-87D7-4742-A9AC-67521EFA977B}" type="slidenum">
               <a:rPr lang="en-GB" smtClean="0"/>
-              <a:t>‹#›</a:t>
+              <a:t>‹nº›</a:t>
             </a:fld>
             <a:endParaRPr lang="en-GB"/>
           </a:p>
@@ -4528,6 +4536,433 @@
               </a:ext>
             </a:extLst>
           </p:cNvPr>
+          <p:cNvSpPr txBox="1"/>
+          <p:nvPr/>
+        </p:nvSpPr>
+        <p:spPr>
+          <a:xfrm>
+            <a:off x="4839419" y="2246885"/>
+            <a:ext cx="6368331" cy="3631763"/>
+          </a:xfrm>
+          <a:prstGeom prst="rect">
+            <a:avLst/>
+          </a:prstGeom>
+          <a:noFill/>
+          <a:ln>
+            <a:solidFill>
+              <a:srgbClr val="00B050"/>
+            </a:solidFill>
+          </a:ln>
+        </p:spPr>
+        <p:txBody>
+          <a:bodyPr wrap="square" rtlCol="0">
+            <a:spAutoFit/>
+          </a:bodyPr>
+          <a:lstStyle/>
+          <a:p>
+            <a:r>
+              <a:rPr lang="pt-BR" sz="1600" dirty="0">
+                <a:solidFill>
+                  <a:schemeClr val="bg1"/>
+                </a:solidFill>
+              </a:rPr>
+              <a:t>No topo temos as variáveis com maiores correlações e que podem contribuir para um modelo mais preciso.</a:t>
+            </a:r>
+          </a:p>
+          <a:p>
+            <a:endParaRPr lang="pt-BR" sz="1600" dirty="0">
+              <a:solidFill>
+                <a:schemeClr val="bg1"/>
+              </a:solidFill>
+            </a:endParaRPr>
+          </a:p>
+          <a:p>
+            <a:r>
+              <a:rPr lang="pt-BR" sz="1600" dirty="0">
+                <a:solidFill>
+                  <a:schemeClr val="bg1"/>
+                </a:solidFill>
+              </a:rPr>
+              <a:t>As variáveis de cheque sem fundo, dependentes e renda mensal são opções viáveis para o modelo (sendo necessário lidar com os valores nulos da renda mensal caso utilizada)</a:t>
+            </a:r>
+          </a:p>
+          <a:p>
+            <a:endParaRPr lang="pt-BR" sz="1600" dirty="0">
+              <a:solidFill>
+                <a:schemeClr val="bg1"/>
+              </a:solidFill>
+            </a:endParaRPr>
+          </a:p>
+          <a:p>
+            <a:r>
+              <a:rPr lang="pt-BR" sz="1600" dirty="0">
+                <a:solidFill>
+                  <a:schemeClr val="bg1"/>
+                </a:solidFill>
+              </a:rPr>
+              <a:t>O estado civil pode ser considerado mas com ressalvas pois a classificação numérica dos estados civis pode gerar um viés errado no modelo </a:t>
+            </a:r>
+            <a:r>
+              <a:rPr lang="pt-BR" sz="1600" dirty="0">
+                <a:solidFill>
+                  <a:schemeClr val="bg1"/>
+                </a:solidFill>
+                <a:sym typeface="Wingdings" panose="05000000000000000000" pitchFamily="2" charset="2"/>
+              </a:rPr>
+              <a:t> Caso isso ocorra uma consolidação dos valores poderia ser feita para reduzir a variabilidade (Ex.: Apenas solteiro, casado, separado e outros)</a:t>
+            </a:r>
+            <a:endParaRPr lang="pt-BR" sz="1600" dirty="0">
+              <a:solidFill>
+                <a:schemeClr val="bg1"/>
+              </a:solidFill>
+            </a:endParaRPr>
+          </a:p>
+          <a:p>
+            <a:endParaRPr lang="pt-BR" sz="1600" dirty="0">
+              <a:solidFill>
+                <a:schemeClr val="bg1"/>
+              </a:solidFill>
+            </a:endParaRPr>
+          </a:p>
+          <a:p>
+            <a:r>
+              <a:rPr lang="pt-BR" sz="1600" dirty="0">
+                <a:solidFill>
+                  <a:schemeClr val="bg1"/>
+                </a:solidFill>
+              </a:rPr>
+              <a:t>A variável ID é um número de identificação do tomador de empréstimo e é uma falsa correlação</a:t>
+            </a:r>
+          </a:p>
+        </p:txBody>
+      </p:sp>
+    </p:spTree>
+    <p:extLst>
+      <p:ext uri="{BB962C8B-B14F-4D97-AF65-F5344CB8AC3E}">
+        <p14:creationId xmlns:p14="http://schemas.microsoft.com/office/powerpoint/2010/main" val="2683603411"/>
+      </p:ext>
+    </p:extLst>
+  </p:cSld>
+  <p:clrMapOvr>
+    <a:masterClrMapping/>
+  </p:clrMapOvr>
+</p:sld>
+</file>
+
+<file path=ppt/slides/slide11.xml><?xml version="1.0" encoding="utf-8"?>
+<p:sld xmlns:a="http://schemas.openxmlformats.org/drawingml/2006/main" xmlns:r="http://schemas.openxmlformats.org/officeDocument/2006/relationships" xmlns:p="http://schemas.openxmlformats.org/presentationml/2006/main">
+  <p:cSld>
+    <p:spTree>
+      <p:nvGrpSpPr>
+        <p:cNvPr id="1" name=""/>
+        <p:cNvGrpSpPr/>
+        <p:nvPr/>
+      </p:nvGrpSpPr>
+      <p:grpSpPr>
+        <a:xfrm>
+          <a:off x="0" y="0"/>
+          <a:ext cx="0" cy="0"/>
+          <a:chOff x="0" y="0"/>
+          <a:chExt cx="0" cy="0"/>
+        </a:xfrm>
+      </p:grpSpPr>
+      <p:sp>
+        <p:nvSpPr>
+          <p:cNvPr id="2" name="Title 1">
+            <a:extLst>
+              <a:ext uri="{FF2B5EF4-FFF2-40B4-BE49-F238E27FC236}">
+                <a16:creationId xmlns:a16="http://schemas.microsoft.com/office/drawing/2014/main" id="{0C4EA2BE-D0A5-4284-88CF-D8F05AB32C9B}"/>
+              </a:ext>
+            </a:extLst>
+          </p:cNvPr>
+          <p:cNvSpPr>
+            <a:spLocks noGrp="1"/>
+          </p:cNvSpPr>
+          <p:nvPr>
+            <p:ph type="title"/>
+          </p:nvPr>
+        </p:nvSpPr>
+        <p:spPr/>
+        <p:txBody>
+          <a:bodyPr>
+            <a:normAutofit fontScale="90000"/>
+          </a:bodyPr>
+          <a:lstStyle/>
+          <a:p>
+            <a:r>
+              <a:rPr lang="pt-BR" dirty="0"/>
+              <a:t>VARIÁVEIS</a:t>
+            </a:r>
+          </a:p>
+        </p:txBody>
+      </p:sp>
+      <p:sp>
+        <p:nvSpPr>
+          <p:cNvPr id="3" name="Text Placeholder 2">
+            <a:extLst>
+              <a:ext uri="{FF2B5EF4-FFF2-40B4-BE49-F238E27FC236}">
+                <a16:creationId xmlns:a16="http://schemas.microsoft.com/office/drawing/2014/main" id="{677D843E-4D56-4BEF-A910-9CF851BDA4E6}"/>
+              </a:ext>
+            </a:extLst>
+          </p:cNvPr>
+          <p:cNvSpPr>
+            <a:spLocks noGrp="1"/>
+          </p:cNvSpPr>
+          <p:nvPr>
+            <p:ph type="body" sz="quarter" idx="10"/>
+          </p:nvPr>
+        </p:nvSpPr>
+        <p:spPr/>
+        <p:txBody>
+          <a:bodyPr/>
+          <a:lstStyle/>
+          <a:p>
+            <a:r>
+              <a:rPr lang="pt-BR" dirty="0"/>
+              <a:t>Elencando as variáveis de acordo com o módulo da correlação iniciamos o aprofundamento da seleção das variáveis do modelo</a:t>
+            </a:r>
+          </a:p>
+        </p:txBody>
+      </p:sp>
+      <p:pic>
+        <p:nvPicPr>
+          <p:cNvPr id="5" name="Picture 4">
+            <a:extLst>
+              <a:ext uri="{FF2B5EF4-FFF2-40B4-BE49-F238E27FC236}">
+                <a16:creationId xmlns:a16="http://schemas.microsoft.com/office/drawing/2014/main" id="{545BA80D-24E4-48BF-B4E9-BBC634A1BF94}"/>
+              </a:ext>
+            </a:extLst>
+          </p:cNvPr>
+          <p:cNvPicPr>
+            <a:picLocks noChangeAspect="1"/>
+          </p:cNvPicPr>
+          <p:nvPr/>
+        </p:nvPicPr>
+        <p:blipFill>
+          <a:blip r:embed="rId2"/>
+          <a:stretch>
+            <a:fillRect/>
+          </a:stretch>
+        </p:blipFill>
+        <p:spPr>
+          <a:xfrm>
+            <a:off x="691875" y="2080921"/>
+            <a:ext cx="3219450" cy="3371850"/>
+          </a:xfrm>
+          <a:prstGeom prst="rect">
+            <a:avLst/>
+          </a:prstGeom>
+        </p:spPr>
+      </p:pic>
+      <p:sp>
+        <p:nvSpPr>
+          <p:cNvPr id="7" name="Rectangle 6">
+            <a:extLst>
+              <a:ext uri="{FF2B5EF4-FFF2-40B4-BE49-F238E27FC236}">
+                <a16:creationId xmlns:a16="http://schemas.microsoft.com/office/drawing/2014/main" id="{1888F437-9812-4D31-9565-DED95A18D269}"/>
+              </a:ext>
+            </a:extLst>
+          </p:cNvPr>
+          <p:cNvSpPr/>
+          <p:nvPr/>
+        </p:nvSpPr>
+        <p:spPr>
+          <a:xfrm rot="5400000" flipH="1">
+            <a:off x="1757673" y="1015118"/>
+            <a:ext cx="1087850" cy="3219451"/>
+          </a:xfrm>
+          <a:prstGeom prst="rect">
+            <a:avLst/>
+          </a:prstGeom>
+          <a:noFill/>
+          <a:ln w="38100">
+            <a:solidFill>
+              <a:srgbClr val="00B050"/>
+            </a:solidFill>
+          </a:ln>
+        </p:spPr>
+        <p:style>
+          <a:lnRef idx="2">
+            <a:schemeClr val="accent1">
+              <a:shade val="50000"/>
+            </a:schemeClr>
+          </a:lnRef>
+          <a:fillRef idx="1">
+            <a:schemeClr val="accent1"/>
+          </a:fillRef>
+          <a:effectRef idx="0">
+            <a:schemeClr val="accent1"/>
+          </a:effectRef>
+          <a:fontRef idx="minor">
+            <a:schemeClr val="lt1"/>
+          </a:fontRef>
+        </p:style>
+        <p:txBody>
+          <a:bodyPr rtlCol="0" anchor="ctr"/>
+          <a:lstStyle/>
+          <a:p>
+            <a:pPr algn="ctr"/>
+            <a:endParaRPr lang="pt-BR"/>
+          </a:p>
+        </p:txBody>
+      </p:sp>
+      <p:sp>
+        <p:nvSpPr>
+          <p:cNvPr id="8" name="Rectangle 7">
+            <a:extLst>
+              <a:ext uri="{FF2B5EF4-FFF2-40B4-BE49-F238E27FC236}">
+                <a16:creationId xmlns:a16="http://schemas.microsoft.com/office/drawing/2014/main" id="{1F108A0A-8380-4C74-B215-A2580D74E6ED}"/>
+              </a:ext>
+            </a:extLst>
+          </p:cNvPr>
+          <p:cNvSpPr/>
+          <p:nvPr/>
+        </p:nvSpPr>
+        <p:spPr>
+          <a:xfrm rot="5400000" flipH="1">
+            <a:off x="1355567" y="2505073"/>
+            <a:ext cx="1892058" cy="3219451"/>
+          </a:xfrm>
+          <a:prstGeom prst="rect">
+            <a:avLst/>
+          </a:prstGeom>
+          <a:noFill/>
+          <a:ln w="38100">
+            <a:solidFill>
+              <a:srgbClr val="FFFF00"/>
+            </a:solidFill>
+          </a:ln>
+        </p:spPr>
+        <p:style>
+          <a:lnRef idx="2">
+            <a:schemeClr val="accent1">
+              <a:shade val="50000"/>
+            </a:schemeClr>
+          </a:lnRef>
+          <a:fillRef idx="1">
+            <a:schemeClr val="accent1"/>
+          </a:fillRef>
+          <a:effectRef idx="0">
+            <a:schemeClr val="accent1"/>
+          </a:effectRef>
+          <a:fontRef idx="minor">
+            <a:schemeClr val="lt1"/>
+          </a:fontRef>
+        </p:style>
+        <p:txBody>
+          <a:bodyPr rtlCol="0" anchor="ctr"/>
+          <a:lstStyle/>
+          <a:p>
+            <a:pPr algn="ctr"/>
+            <a:endParaRPr lang="pt-BR"/>
+          </a:p>
+        </p:txBody>
+      </p:sp>
+      <p:sp>
+        <p:nvSpPr>
+          <p:cNvPr id="9" name="Rectangle 8">
+            <a:extLst>
+              <a:ext uri="{FF2B5EF4-FFF2-40B4-BE49-F238E27FC236}">
+                <a16:creationId xmlns:a16="http://schemas.microsoft.com/office/drawing/2014/main" id="{B3FE84D9-BE86-4A1E-B200-EB3BBF663D73}"/>
+              </a:ext>
+            </a:extLst>
+          </p:cNvPr>
+          <p:cNvSpPr/>
+          <p:nvPr/>
+        </p:nvSpPr>
+        <p:spPr>
+          <a:xfrm rot="5400000" flipH="1">
+            <a:off x="2105626" y="3647074"/>
+            <a:ext cx="391941" cy="3219451"/>
+          </a:xfrm>
+          <a:prstGeom prst="rect">
+            <a:avLst/>
+          </a:prstGeom>
+          <a:noFill/>
+          <a:ln w="38100">
+            <a:solidFill>
+              <a:srgbClr val="FF0000"/>
+            </a:solidFill>
+          </a:ln>
+        </p:spPr>
+        <p:style>
+          <a:lnRef idx="2">
+            <a:schemeClr val="accent1">
+              <a:shade val="50000"/>
+            </a:schemeClr>
+          </a:lnRef>
+          <a:fillRef idx="1">
+            <a:schemeClr val="accent1"/>
+          </a:fillRef>
+          <a:effectRef idx="0">
+            <a:schemeClr val="accent1"/>
+          </a:effectRef>
+          <a:fontRef idx="minor">
+            <a:schemeClr val="lt1"/>
+          </a:fontRef>
+        </p:style>
+        <p:txBody>
+          <a:bodyPr rtlCol="0" anchor="ctr"/>
+          <a:lstStyle/>
+          <a:p>
+            <a:pPr algn="ctr"/>
+            <a:endParaRPr lang="pt-BR"/>
+          </a:p>
+        </p:txBody>
+      </p:sp>
+      <p:cxnSp>
+        <p:nvCxnSpPr>
+          <p:cNvPr id="11" name="Connector: Elbow 10">
+            <a:extLst>
+              <a:ext uri="{FF2B5EF4-FFF2-40B4-BE49-F238E27FC236}">
+                <a16:creationId xmlns:a16="http://schemas.microsoft.com/office/drawing/2014/main" id="{4DA275B6-FE11-4744-987B-5BAC7168CA69}"/>
+              </a:ext>
+            </a:extLst>
+          </p:cNvPr>
+          <p:cNvCxnSpPr>
+            <a:cxnSpLocks/>
+          </p:cNvCxnSpPr>
+          <p:nvPr/>
+        </p:nvCxnSpPr>
+        <p:spPr>
+          <a:xfrm>
+            <a:off x="3911322" y="2080918"/>
+            <a:ext cx="928097" cy="165967"/>
+          </a:xfrm>
+          <a:prstGeom prst="bentConnector3">
+            <a:avLst/>
+          </a:prstGeom>
+          <a:ln w="38100">
+            <a:solidFill>
+              <a:srgbClr val="00B050"/>
+            </a:solidFill>
+            <a:tailEnd type="triangle"/>
+          </a:ln>
+        </p:spPr>
+        <p:style>
+          <a:lnRef idx="1">
+            <a:schemeClr val="accent1"/>
+          </a:lnRef>
+          <a:fillRef idx="0">
+            <a:schemeClr val="accent1"/>
+          </a:fillRef>
+          <a:effectRef idx="0">
+            <a:schemeClr val="accent1"/>
+          </a:effectRef>
+          <a:fontRef idx="minor">
+            <a:schemeClr val="tx1"/>
+          </a:fontRef>
+        </p:style>
+      </p:cxnSp>
+      <p:sp>
+        <p:nvSpPr>
+          <p:cNvPr id="12" name="TextBox 11">
+            <a:extLst>
+              <a:ext uri="{FF2B5EF4-FFF2-40B4-BE49-F238E27FC236}">
+                <a16:creationId xmlns:a16="http://schemas.microsoft.com/office/drawing/2014/main" id="{B508432B-C12D-4D43-B2B2-4710431EC126}"/>
+              </a:ext>
+            </a:extLst>
+          </p:cNvPr>
           <p:cNvSpPr txBox="1">
             <a:spLocks/>
           </p:cNvSpPr>
@@ -4765,7 +5200,7 @@
 </p:sld>
 </file>
 
-<file path=ppt/slides/slide11.xml><?xml version="1.0" encoding="utf-8"?>
+<file path=ppt/slides/slide12.xml><?xml version="1.0" encoding="utf-8"?>
 <p:sld xmlns:a="http://schemas.openxmlformats.org/drawingml/2006/main" xmlns:r="http://schemas.openxmlformats.org/officeDocument/2006/relationships" xmlns:p="http://schemas.openxmlformats.org/presentationml/2006/main">
   <p:cSld>
     <p:spTree>
@@ -5193,7 +5628,7 @@
 </p:sld>
 </file>
 
-<file path=ppt/slides/slide12.xml><?xml version="1.0" encoding="utf-8"?>
+<file path=ppt/slides/slide13.xml><?xml version="1.0" encoding="utf-8"?>
 <p:sld xmlns:a="http://schemas.openxmlformats.org/drawingml/2006/main" xmlns:r="http://schemas.openxmlformats.org/officeDocument/2006/relationships" xmlns:p="http://schemas.openxmlformats.org/presentationml/2006/main">
   <p:cSld>
     <p:spTree>
@@ -5226,7 +5661,7 @@
         </p:nvGrpSpPr>
         <p:grpSpPr>
           <a:xfrm>
-            <a:off x="4681418" y="3749540"/>
+            <a:off x="4614230" y="3749540"/>
             <a:ext cx="6818707" cy="1905698"/>
             <a:chOff x="1296346" y="1888308"/>
             <a:chExt cx="10682003" cy="2985415"/>
@@ -5678,7 +6113,7 @@
         </p:nvCxnSpPr>
         <p:spPr>
           <a:xfrm>
-            <a:off x="4373593" y="2246884"/>
+            <a:off x="4364715" y="2238006"/>
             <a:ext cx="0" cy="2844000"/>
           </a:xfrm>
           <a:prstGeom prst="line">
@@ -5797,7 +6232,7 @@
 </p:sld>
 </file>
 
-<file path=ppt/slides/slide13.xml><?xml version="1.0" encoding="utf-8"?>
+<file path=ppt/slides/slide14.xml><?xml version="1.0" encoding="utf-8"?>
 <p:sld xmlns:a="http://schemas.openxmlformats.org/drawingml/2006/main" xmlns:r="http://schemas.openxmlformats.org/officeDocument/2006/relationships" xmlns:p="http://schemas.openxmlformats.org/presentationml/2006/main">
   <p:cSld>
     <p:spTree>
@@ -5814,133 +6249,12 @@
           <a:chExt cx="0" cy="0"/>
         </a:xfrm>
       </p:grpSpPr>
-      <p:grpSp>
-        <p:nvGrpSpPr>
-          <p:cNvPr id="4" name="Group 3">
-            <a:extLst>
-              <a:ext uri="{FF2B5EF4-FFF2-40B4-BE49-F238E27FC236}">
-                <a16:creationId xmlns:a16="http://schemas.microsoft.com/office/drawing/2014/main" id="{9488194A-E9BD-4068-9DD9-0FE37EF73EBB}"/>
-              </a:ext>
-            </a:extLst>
-          </p:cNvPr>
-          <p:cNvGrpSpPr/>
-          <p:nvPr/>
-        </p:nvGrpSpPr>
-        <p:grpSpPr>
-          <a:xfrm>
-            <a:off x="608948" y="2038350"/>
-            <a:ext cx="10682003" cy="2781300"/>
-            <a:chOff x="1296346" y="2092423"/>
-            <a:chExt cx="10682003" cy="2781300"/>
-          </a:xfrm>
-        </p:grpSpPr>
-        <p:sp>
-          <p:nvSpPr>
-            <p:cNvPr id="5" name="Rectangle 4">
-              <a:extLst>
-                <a:ext uri="{FF2B5EF4-FFF2-40B4-BE49-F238E27FC236}">
-                  <a16:creationId xmlns:a16="http://schemas.microsoft.com/office/drawing/2014/main" id="{82E922DA-0C6D-448A-AF4B-1F2D74D49566}"/>
-                </a:ext>
-              </a:extLst>
-            </p:cNvPr>
-            <p:cNvSpPr/>
-            <p:nvPr/>
-          </p:nvSpPr>
-          <p:spPr>
-            <a:xfrm>
-              <a:off x="1296347" y="2431915"/>
-              <a:ext cx="10614002" cy="2387376"/>
-            </a:xfrm>
-            <a:prstGeom prst="rect">
-              <a:avLst/>
-            </a:prstGeom>
-            <a:solidFill>
-              <a:schemeClr val="bg1">
-                <a:lumMod val="65000"/>
-                <a:alpha val="48000"/>
-              </a:schemeClr>
-            </a:solidFill>
-            <a:ln w="0">
-              <a:noFill/>
-            </a:ln>
-          </p:spPr>
-          <p:style>
-            <a:lnRef idx="2">
-              <a:schemeClr val="accent1">
-                <a:shade val="50000"/>
-              </a:schemeClr>
-            </a:lnRef>
-            <a:fillRef idx="1">
-              <a:schemeClr val="accent1"/>
-            </a:fillRef>
-            <a:effectRef idx="0">
-              <a:schemeClr val="accent1"/>
-            </a:effectRef>
-            <a:fontRef idx="minor">
-              <a:schemeClr val="lt1"/>
-            </a:fontRef>
-          </p:style>
-          <p:txBody>
-            <a:bodyPr rtlCol="0" anchor="ctr"/>
-            <a:lstStyle/>
-            <a:p>
-              <a:pPr algn="ctr"/>
-              <a:endParaRPr lang="pt-BR"/>
-            </a:p>
-          </p:txBody>
-        </p:sp>
-        <p:pic>
-          <p:nvPicPr>
-            <p:cNvPr id="3074" name="Picture 2">
-              <a:extLst>
-                <a:ext uri="{FF2B5EF4-FFF2-40B4-BE49-F238E27FC236}">
-                  <a16:creationId xmlns:a16="http://schemas.microsoft.com/office/drawing/2014/main" id="{5B13FF30-D50C-4F91-9740-A89AC9D34554}"/>
-                </a:ext>
-              </a:extLst>
-            </p:cNvPr>
-            <p:cNvPicPr>
-              <a:picLocks noChangeAspect="1" noChangeArrowheads="1"/>
-            </p:cNvPicPr>
-            <p:nvPr/>
-          </p:nvPicPr>
-          <p:blipFill rotWithShape="1">
-            <a:blip r:embed="rId2">
-              <a:extLst>
-                <a:ext uri="{28A0092B-C50C-407E-A947-70E740481C1C}">
-                  <a14:useLocalDpi xmlns:a14="http://schemas.microsoft.com/office/drawing/2010/main" val="0"/>
-                </a:ext>
-              </a:extLst>
-            </a:blip>
-            <a:srcRect l="9559"/>
-            <a:stretch/>
-          </p:blipFill>
-          <p:spPr bwMode="auto">
-            <a:xfrm>
-              <a:off x="1296346" y="2092423"/>
-              <a:ext cx="10682003" cy="2781300"/>
-            </a:xfrm>
-            <a:prstGeom prst="rect">
-              <a:avLst/>
-            </a:prstGeom>
-            <a:noFill/>
-            <a:extLst>
-              <a:ext uri="{909E8E84-426E-40DD-AFC4-6F175D3DCCD1}">
-                <a14:hiddenFill xmlns:a14="http://schemas.microsoft.com/office/drawing/2010/main">
-                  <a:solidFill>
-                    <a:srgbClr val="FFFFFF"/>
-                  </a:solidFill>
-                </a14:hiddenFill>
-              </a:ext>
-            </a:extLst>
-          </p:spPr>
-        </p:pic>
-      </p:grpSp>
       <p:sp>
         <p:nvSpPr>
           <p:cNvPr id="2" name="Title 1">
             <a:extLst>
               <a:ext uri="{FF2B5EF4-FFF2-40B4-BE49-F238E27FC236}">
-                <a16:creationId xmlns:a16="http://schemas.microsoft.com/office/drawing/2014/main" id="{42E47C92-7214-4014-81C1-8D18678ACA3C}"/>
+                <a16:creationId xmlns:a16="http://schemas.microsoft.com/office/drawing/2014/main" id="{0C4EA2BE-D0A5-4284-88CF-D8F05AB32C9B}"/>
               </a:ext>
             </a:extLst>
           </p:cNvPr>
@@ -5970,7 +6284,7 @@
           <p:cNvPr id="3" name="Text Placeholder 2">
             <a:extLst>
               <a:ext uri="{FF2B5EF4-FFF2-40B4-BE49-F238E27FC236}">
-                <a16:creationId xmlns:a16="http://schemas.microsoft.com/office/drawing/2014/main" id="{5BA0068A-B971-486A-AD27-01FE70D39325}"/>
+                <a16:creationId xmlns:a16="http://schemas.microsoft.com/office/drawing/2014/main" id="{677D843E-4D56-4BEF-A910-9CF851BDA4E6}"/>
               </a:ext>
             </a:extLst>
           </p:cNvPr>
@@ -5988,15 +6302,2295 @@
           <a:p>
             <a:r>
               <a:rPr lang="pt-BR" dirty="0"/>
-              <a:t>Aprofundando a relação entre a variável a ser prevista (Pago) com </a:t>
-            </a:r>
-          </a:p>
-        </p:txBody>
-      </p:sp>
+              <a:t>Elencando as variáveis de acordo com o módulo da correlação iniciamos o aprofundamento da seleção das variáveis do modelo</a:t>
+            </a:r>
+          </a:p>
+        </p:txBody>
+      </p:sp>
+      <p:pic>
+        <p:nvPicPr>
+          <p:cNvPr id="5" name="Picture 4">
+            <a:extLst>
+              <a:ext uri="{FF2B5EF4-FFF2-40B4-BE49-F238E27FC236}">
+                <a16:creationId xmlns:a16="http://schemas.microsoft.com/office/drawing/2014/main" id="{545BA80D-24E4-48BF-B4E9-BBC634A1BF94}"/>
+              </a:ext>
+            </a:extLst>
+          </p:cNvPr>
+          <p:cNvPicPr>
+            <a:picLocks noChangeAspect="1"/>
+          </p:cNvPicPr>
+          <p:nvPr/>
+        </p:nvPicPr>
+        <p:blipFill>
+          <a:blip r:embed="rId2"/>
+          <a:stretch>
+            <a:fillRect/>
+          </a:stretch>
+        </p:blipFill>
+        <p:spPr>
+          <a:xfrm>
+            <a:off x="691875" y="2080921"/>
+            <a:ext cx="3219450" cy="3371850"/>
+          </a:xfrm>
+          <a:prstGeom prst="rect">
+            <a:avLst/>
+          </a:prstGeom>
+        </p:spPr>
+      </p:pic>
+      <p:sp>
+        <p:nvSpPr>
+          <p:cNvPr id="16" name="Rectangle 5">
+            <a:extLst>
+              <a:ext uri="{FF2B5EF4-FFF2-40B4-BE49-F238E27FC236}">
+                <a16:creationId xmlns:a16="http://schemas.microsoft.com/office/drawing/2014/main" id="{199B755F-1A90-4A47-92C2-970BCB9E7B96}"/>
+              </a:ext>
+            </a:extLst>
+          </p:cNvPr>
+          <p:cNvSpPr/>
+          <p:nvPr/>
+        </p:nvSpPr>
+        <p:spPr>
+          <a:xfrm>
+            <a:off x="695864" y="2080921"/>
+            <a:ext cx="3215462" cy="386858"/>
+          </a:xfrm>
+          <a:prstGeom prst="rect">
+            <a:avLst/>
+          </a:prstGeom>
+          <a:solidFill>
+            <a:schemeClr val="bg1">
+              <a:lumMod val="50000"/>
+              <a:alpha val="92000"/>
+            </a:schemeClr>
+          </a:solidFill>
+          <a:ln w="0">
+            <a:noFill/>
+          </a:ln>
+        </p:spPr>
+        <p:style>
+          <a:lnRef idx="2">
+            <a:schemeClr val="accent1">
+              <a:shade val="50000"/>
+            </a:schemeClr>
+          </a:lnRef>
+          <a:fillRef idx="1">
+            <a:schemeClr val="accent1"/>
+          </a:fillRef>
+          <a:effectRef idx="0">
+            <a:schemeClr val="accent1"/>
+          </a:effectRef>
+          <a:fontRef idx="minor">
+            <a:schemeClr val="lt1"/>
+          </a:fontRef>
+        </p:style>
+        <p:txBody>
+          <a:bodyPr rtlCol="0" anchor="ctr"/>
+          <a:lstStyle/>
+          <a:p>
+            <a:pPr algn="ctr"/>
+            <a:endParaRPr lang="pt-BR"/>
+          </a:p>
+        </p:txBody>
+      </p:sp>
+      <p:sp>
+        <p:nvSpPr>
+          <p:cNvPr id="18" name="Rectangle 5">
+            <a:extLst>
+              <a:ext uri="{FF2B5EF4-FFF2-40B4-BE49-F238E27FC236}">
+                <a16:creationId xmlns:a16="http://schemas.microsoft.com/office/drawing/2014/main" id="{022625FC-90CA-47A9-8163-C3BDB3153E24}"/>
+              </a:ext>
+            </a:extLst>
+          </p:cNvPr>
+          <p:cNvSpPr/>
+          <p:nvPr/>
+        </p:nvSpPr>
+        <p:spPr>
+          <a:xfrm>
+            <a:off x="695864" y="5068112"/>
+            <a:ext cx="3215462" cy="384660"/>
+          </a:xfrm>
+          <a:prstGeom prst="rect">
+            <a:avLst/>
+          </a:prstGeom>
+          <a:solidFill>
+            <a:schemeClr val="bg1">
+              <a:lumMod val="50000"/>
+              <a:alpha val="92000"/>
+            </a:schemeClr>
+          </a:solidFill>
+          <a:ln w="0">
+            <a:noFill/>
+          </a:ln>
+        </p:spPr>
+        <p:style>
+          <a:lnRef idx="2">
+            <a:schemeClr val="accent1">
+              <a:shade val="50000"/>
+            </a:schemeClr>
+          </a:lnRef>
+          <a:fillRef idx="1">
+            <a:schemeClr val="accent1"/>
+          </a:fillRef>
+          <a:effectRef idx="0">
+            <a:schemeClr val="accent1"/>
+          </a:effectRef>
+          <a:fontRef idx="minor">
+            <a:schemeClr val="lt1"/>
+          </a:fontRef>
+        </p:style>
+        <p:txBody>
+          <a:bodyPr rtlCol="0" anchor="ctr"/>
+          <a:lstStyle/>
+          <a:p>
+            <a:pPr algn="ctr"/>
+            <a:endParaRPr lang="pt-BR"/>
+          </a:p>
+        </p:txBody>
+      </p:sp>
+      <p:sp>
+        <p:nvSpPr>
+          <p:cNvPr id="4" name="CaixaDeTexto 3">
+            <a:extLst>
+              <a:ext uri="{FF2B5EF4-FFF2-40B4-BE49-F238E27FC236}">
+                <a16:creationId xmlns:a16="http://schemas.microsoft.com/office/drawing/2014/main" id="{E8C9BC3E-6A24-49A1-838F-5B8513B2A09F}"/>
+              </a:ext>
+            </a:extLst>
+          </p:cNvPr>
+          <p:cNvSpPr txBox="1"/>
+          <p:nvPr/>
+        </p:nvSpPr>
+        <p:spPr>
+          <a:xfrm>
+            <a:off x="2354093" y="2966763"/>
+            <a:ext cx="300082" cy="369332"/>
+          </a:xfrm>
+          <a:prstGeom prst="rect">
+            <a:avLst/>
+          </a:prstGeom>
+          <a:noFill/>
+        </p:spPr>
+        <p:txBody>
+          <a:bodyPr wrap="none" rtlCol="0">
+            <a:spAutoFit/>
+          </a:bodyPr>
+          <a:lstStyle/>
+          <a:p>
+            <a:r>
+              <a:rPr lang="en-GB" dirty="0">
+                <a:solidFill>
+                  <a:srgbClr val="B93632"/>
+                </a:solidFill>
+              </a:rPr>
+              <a:t>*</a:t>
+            </a:r>
+            <a:endParaRPr lang="pt-BR" dirty="0">
+              <a:solidFill>
+                <a:srgbClr val="B93632"/>
+              </a:solidFill>
+            </a:endParaRPr>
+          </a:p>
+        </p:txBody>
+      </p:sp>
+      <p:sp>
+        <p:nvSpPr>
+          <p:cNvPr id="20" name="CaixaDeTexto 19">
+            <a:extLst>
+              <a:ext uri="{FF2B5EF4-FFF2-40B4-BE49-F238E27FC236}">
+                <a16:creationId xmlns:a16="http://schemas.microsoft.com/office/drawing/2014/main" id="{13328D2B-14BF-492B-BF50-1C4313D20EE5}"/>
+              </a:ext>
+            </a:extLst>
+          </p:cNvPr>
+          <p:cNvSpPr txBox="1"/>
+          <p:nvPr/>
+        </p:nvSpPr>
+        <p:spPr>
+          <a:xfrm>
+            <a:off x="1634246" y="3151015"/>
+            <a:ext cx="300082" cy="369332"/>
+          </a:xfrm>
+          <a:prstGeom prst="rect">
+            <a:avLst/>
+          </a:prstGeom>
+          <a:noFill/>
+        </p:spPr>
+        <p:txBody>
+          <a:bodyPr wrap="none" rtlCol="0">
+            <a:spAutoFit/>
+          </a:bodyPr>
+          <a:lstStyle/>
+          <a:p>
+            <a:r>
+              <a:rPr lang="en-GB" dirty="0">
+                <a:solidFill>
+                  <a:srgbClr val="B93632"/>
+                </a:solidFill>
+              </a:rPr>
+              <a:t>*</a:t>
+            </a:r>
+            <a:endParaRPr lang="pt-BR" dirty="0">
+              <a:solidFill>
+                <a:srgbClr val="B93632"/>
+              </a:solidFill>
+            </a:endParaRPr>
+          </a:p>
+        </p:txBody>
+      </p:sp>
+      <p:sp>
+        <p:nvSpPr>
+          <p:cNvPr id="23" name="CaixaDeTexto 22">
+            <a:extLst>
+              <a:ext uri="{FF2B5EF4-FFF2-40B4-BE49-F238E27FC236}">
+                <a16:creationId xmlns:a16="http://schemas.microsoft.com/office/drawing/2014/main" id="{0C355E6C-1252-4D36-9E8A-0596E92820C5}"/>
+              </a:ext>
+            </a:extLst>
+          </p:cNvPr>
+          <p:cNvSpPr txBox="1"/>
+          <p:nvPr/>
+        </p:nvSpPr>
+        <p:spPr>
+          <a:xfrm>
+            <a:off x="1844128" y="3314789"/>
+            <a:ext cx="300082" cy="369332"/>
+          </a:xfrm>
+          <a:prstGeom prst="rect">
+            <a:avLst/>
+          </a:prstGeom>
+          <a:noFill/>
+        </p:spPr>
+        <p:txBody>
+          <a:bodyPr wrap="none" rtlCol="0">
+            <a:spAutoFit/>
+          </a:bodyPr>
+          <a:lstStyle/>
+          <a:p>
+            <a:r>
+              <a:rPr lang="en-GB" dirty="0">
+                <a:solidFill>
+                  <a:srgbClr val="B93632"/>
+                </a:solidFill>
+              </a:rPr>
+              <a:t>*</a:t>
+            </a:r>
+            <a:endParaRPr lang="pt-BR" dirty="0">
+              <a:solidFill>
+                <a:srgbClr val="B93632"/>
+              </a:solidFill>
+            </a:endParaRPr>
+          </a:p>
+        </p:txBody>
+      </p:sp>
+      <p:sp>
+        <p:nvSpPr>
+          <p:cNvPr id="24" name="CaixaDeTexto 23">
+            <a:extLst>
+              <a:ext uri="{FF2B5EF4-FFF2-40B4-BE49-F238E27FC236}">
+                <a16:creationId xmlns:a16="http://schemas.microsoft.com/office/drawing/2014/main" id="{626498DE-9109-4ED7-B900-7E4FEFFEFEB1}"/>
+              </a:ext>
+            </a:extLst>
+          </p:cNvPr>
+          <p:cNvSpPr txBox="1"/>
+          <p:nvPr/>
+        </p:nvSpPr>
+        <p:spPr>
+          <a:xfrm>
+            <a:off x="2786499" y="3496793"/>
+            <a:ext cx="300082" cy="369332"/>
+          </a:xfrm>
+          <a:prstGeom prst="rect">
+            <a:avLst/>
+          </a:prstGeom>
+          <a:noFill/>
+        </p:spPr>
+        <p:txBody>
+          <a:bodyPr wrap="none" rtlCol="0">
+            <a:spAutoFit/>
+          </a:bodyPr>
+          <a:lstStyle/>
+          <a:p>
+            <a:r>
+              <a:rPr lang="en-GB" dirty="0">
+                <a:solidFill>
+                  <a:srgbClr val="B93632"/>
+                </a:solidFill>
+              </a:rPr>
+              <a:t>*</a:t>
+            </a:r>
+            <a:endParaRPr lang="pt-BR" dirty="0">
+              <a:solidFill>
+                <a:srgbClr val="B93632"/>
+              </a:solidFill>
+            </a:endParaRPr>
+          </a:p>
+        </p:txBody>
+      </p:sp>
+      <p:sp>
+        <p:nvSpPr>
+          <p:cNvPr id="25" name="TextBox 11">
+            <a:extLst>
+              <a:ext uri="{FF2B5EF4-FFF2-40B4-BE49-F238E27FC236}">
+                <a16:creationId xmlns:a16="http://schemas.microsoft.com/office/drawing/2014/main" id="{C9FA256A-DEFF-494E-9004-764B9556ABB1}"/>
+              </a:ext>
+            </a:extLst>
+          </p:cNvPr>
+          <p:cNvSpPr txBox="1"/>
+          <p:nvPr/>
+        </p:nvSpPr>
+        <p:spPr>
+          <a:xfrm>
+            <a:off x="4839419" y="2246885"/>
+            <a:ext cx="6368331" cy="3139321"/>
+          </a:xfrm>
+          <a:prstGeom prst="rect">
+            <a:avLst/>
+          </a:prstGeom>
+          <a:noFill/>
+          <a:ln>
+            <a:solidFill>
+              <a:schemeClr val="bg1"/>
+            </a:solidFill>
+          </a:ln>
+        </p:spPr>
+        <p:txBody>
+          <a:bodyPr wrap="square" rtlCol="0">
+            <a:spAutoFit/>
+          </a:bodyPr>
+          <a:lstStyle/>
+          <a:p>
+            <a:r>
+              <a:rPr lang="pt-BR" dirty="0">
+                <a:solidFill>
+                  <a:schemeClr val="bg1"/>
+                </a:solidFill>
+              </a:rPr>
+              <a:t>Considerando o contexto de negócio e as variáveis elencamos quais seriam possíveis inputs para um modelo de previsão de inadimplência</a:t>
+            </a:r>
+          </a:p>
+          <a:p>
+            <a:endParaRPr lang="pt-BR" dirty="0">
+              <a:solidFill>
+                <a:schemeClr val="bg1"/>
+              </a:solidFill>
+            </a:endParaRPr>
+          </a:p>
+          <a:p>
+            <a:r>
+              <a:rPr lang="pt-BR" dirty="0">
+                <a:solidFill>
+                  <a:schemeClr val="bg1"/>
+                </a:solidFill>
+              </a:rPr>
+              <a:t>As variáveis valor empréstimo e valor empréstimo atualizado são linearmente dependentes, portanto a de maior correlação foi escolhida como </a:t>
+            </a:r>
+            <a:r>
+              <a:rPr lang="pt-BR" dirty="0" err="1">
+                <a:solidFill>
+                  <a:schemeClr val="bg1"/>
+                </a:solidFill>
+              </a:rPr>
+              <a:t>regressora</a:t>
+            </a:r>
+            <a:endParaRPr lang="pt-BR" dirty="0">
+              <a:solidFill>
+                <a:schemeClr val="bg1"/>
+              </a:solidFill>
+            </a:endParaRPr>
+          </a:p>
+          <a:p>
+            <a:endParaRPr lang="pt-BR" dirty="0">
+              <a:solidFill>
+                <a:schemeClr val="bg1"/>
+              </a:solidFill>
+            </a:endParaRPr>
+          </a:p>
+          <a:p>
+            <a:endParaRPr lang="pt-BR" dirty="0">
+              <a:solidFill>
+                <a:schemeClr val="bg1"/>
+              </a:solidFill>
+            </a:endParaRPr>
+          </a:p>
+          <a:p>
+            <a:r>
+              <a:rPr lang="pt-BR" dirty="0">
+                <a:solidFill>
+                  <a:srgbClr val="B93632"/>
+                </a:solidFill>
+              </a:rPr>
+              <a:t>* Variáveis com valores nulos que devem ser tratados caso sejam utilizadas</a:t>
+            </a:r>
+          </a:p>
+        </p:txBody>
+      </p:sp>
+      <p:cxnSp>
+        <p:nvCxnSpPr>
+          <p:cNvPr id="26" name="Connector: Elbow 10">
+            <a:extLst>
+              <a:ext uri="{FF2B5EF4-FFF2-40B4-BE49-F238E27FC236}">
+                <a16:creationId xmlns:a16="http://schemas.microsoft.com/office/drawing/2014/main" id="{BCB77A2C-280D-43D9-8D6B-9EE7818E6733}"/>
+              </a:ext>
+            </a:extLst>
+          </p:cNvPr>
+          <p:cNvCxnSpPr>
+            <a:cxnSpLocks/>
+          </p:cNvCxnSpPr>
+          <p:nvPr/>
+        </p:nvCxnSpPr>
+        <p:spPr>
+          <a:xfrm flipV="1">
+            <a:off x="3911322" y="2246885"/>
+            <a:ext cx="928097" cy="921884"/>
+          </a:xfrm>
+          <a:prstGeom prst="bentConnector3">
+            <a:avLst/>
+          </a:prstGeom>
+          <a:ln w="38100">
+            <a:solidFill>
+              <a:schemeClr val="bg1"/>
+            </a:solidFill>
+            <a:tailEnd type="triangle"/>
+          </a:ln>
+        </p:spPr>
+        <p:style>
+          <a:lnRef idx="1">
+            <a:schemeClr val="accent1"/>
+          </a:lnRef>
+          <a:fillRef idx="0">
+            <a:schemeClr val="accent1"/>
+          </a:fillRef>
+          <a:effectRef idx="0">
+            <a:schemeClr val="accent1"/>
+          </a:effectRef>
+          <a:fontRef idx="minor">
+            <a:schemeClr val="tx1"/>
+          </a:fontRef>
+        </p:style>
+      </p:cxnSp>
+      <p:sp>
+        <p:nvSpPr>
+          <p:cNvPr id="14" name="Rectangle 5">
+            <a:extLst>
+              <a:ext uri="{FF2B5EF4-FFF2-40B4-BE49-F238E27FC236}">
+                <a16:creationId xmlns:a16="http://schemas.microsoft.com/office/drawing/2014/main" id="{04EC56AF-2AAF-4DC6-AEBF-93A91C363021}"/>
+              </a:ext>
+            </a:extLst>
+          </p:cNvPr>
+          <p:cNvSpPr/>
+          <p:nvPr/>
+        </p:nvSpPr>
+        <p:spPr>
+          <a:xfrm>
+            <a:off x="691866" y="4042413"/>
+            <a:ext cx="3215462" cy="182004"/>
+          </a:xfrm>
+          <a:prstGeom prst="rect">
+            <a:avLst/>
+          </a:prstGeom>
+          <a:solidFill>
+            <a:schemeClr val="bg1">
+              <a:lumMod val="50000"/>
+              <a:alpha val="92000"/>
+            </a:schemeClr>
+          </a:solidFill>
+          <a:ln w="0">
+            <a:noFill/>
+          </a:ln>
+        </p:spPr>
+        <p:style>
+          <a:lnRef idx="2">
+            <a:schemeClr val="accent1">
+              <a:shade val="50000"/>
+            </a:schemeClr>
+          </a:lnRef>
+          <a:fillRef idx="1">
+            <a:schemeClr val="accent1"/>
+          </a:fillRef>
+          <a:effectRef idx="0">
+            <a:schemeClr val="accent1"/>
+          </a:effectRef>
+          <a:fontRef idx="minor">
+            <a:schemeClr val="lt1"/>
+          </a:fontRef>
+        </p:style>
+        <p:txBody>
+          <a:bodyPr rtlCol="0" anchor="ctr"/>
+          <a:lstStyle/>
+          <a:p>
+            <a:pPr algn="ctr"/>
+            <a:endParaRPr lang="pt-BR"/>
+          </a:p>
+        </p:txBody>
+      </p:sp>
+      <p:sp>
+        <p:nvSpPr>
+          <p:cNvPr id="27" name="Rectangle 7">
+            <a:extLst>
+              <a:ext uri="{FF2B5EF4-FFF2-40B4-BE49-F238E27FC236}">
+                <a16:creationId xmlns:a16="http://schemas.microsoft.com/office/drawing/2014/main" id="{EADE4A9B-5734-4D07-A09C-E6BC9907E658}"/>
+              </a:ext>
+            </a:extLst>
+          </p:cNvPr>
+          <p:cNvSpPr/>
+          <p:nvPr/>
+        </p:nvSpPr>
+        <p:spPr>
+          <a:xfrm rot="5400000" flipH="1">
+            <a:off x="1514278" y="1645370"/>
+            <a:ext cx="1574634" cy="3219451"/>
+          </a:xfrm>
+          <a:prstGeom prst="rect">
+            <a:avLst/>
+          </a:prstGeom>
+          <a:noFill/>
+          <a:ln w="38100">
+            <a:solidFill>
+              <a:schemeClr val="bg1"/>
+            </a:solidFill>
+          </a:ln>
+        </p:spPr>
+        <p:style>
+          <a:lnRef idx="2">
+            <a:schemeClr val="accent1">
+              <a:shade val="50000"/>
+            </a:schemeClr>
+          </a:lnRef>
+          <a:fillRef idx="1">
+            <a:schemeClr val="accent1"/>
+          </a:fillRef>
+          <a:effectRef idx="0">
+            <a:schemeClr val="accent1"/>
+          </a:effectRef>
+          <a:fontRef idx="minor">
+            <a:schemeClr val="lt1"/>
+          </a:fontRef>
+        </p:style>
+        <p:txBody>
+          <a:bodyPr rtlCol="0" anchor="ctr"/>
+          <a:lstStyle/>
+          <a:p>
+            <a:pPr algn="ctr"/>
+            <a:endParaRPr lang="pt-BR"/>
+          </a:p>
+        </p:txBody>
+      </p:sp>
+      <p:sp>
+        <p:nvSpPr>
+          <p:cNvPr id="15" name="Rectangle 7">
+            <a:extLst>
+              <a:ext uri="{FF2B5EF4-FFF2-40B4-BE49-F238E27FC236}">
+                <a16:creationId xmlns:a16="http://schemas.microsoft.com/office/drawing/2014/main" id="{661EC3B3-714B-4DA0-9B47-106C85ACD3D8}"/>
+              </a:ext>
+            </a:extLst>
+          </p:cNvPr>
+          <p:cNvSpPr/>
+          <p:nvPr/>
+        </p:nvSpPr>
+        <p:spPr>
+          <a:xfrm rot="5400000" flipH="1">
+            <a:off x="1881040" y="3035246"/>
+            <a:ext cx="841110" cy="3219451"/>
+          </a:xfrm>
+          <a:prstGeom prst="rect">
+            <a:avLst/>
+          </a:prstGeom>
+          <a:noFill/>
+          <a:ln w="38100">
+            <a:solidFill>
+              <a:schemeClr val="bg1"/>
+            </a:solidFill>
+          </a:ln>
+        </p:spPr>
+        <p:style>
+          <a:lnRef idx="2">
+            <a:schemeClr val="accent1">
+              <a:shade val="50000"/>
+            </a:schemeClr>
+          </a:lnRef>
+          <a:fillRef idx="1">
+            <a:schemeClr val="accent1"/>
+          </a:fillRef>
+          <a:effectRef idx="0">
+            <a:schemeClr val="accent1"/>
+          </a:effectRef>
+          <a:fontRef idx="minor">
+            <a:schemeClr val="lt1"/>
+          </a:fontRef>
+        </p:style>
+        <p:txBody>
+          <a:bodyPr rtlCol="0" anchor="ctr"/>
+          <a:lstStyle/>
+          <a:p>
+            <a:pPr algn="ctr"/>
+            <a:endParaRPr lang="pt-BR"/>
+          </a:p>
+        </p:txBody>
+      </p:sp>
+      <p:cxnSp>
+        <p:nvCxnSpPr>
+          <p:cNvPr id="17" name="Straight Connector 21">
+            <a:extLst>
+              <a:ext uri="{FF2B5EF4-FFF2-40B4-BE49-F238E27FC236}">
+                <a16:creationId xmlns:a16="http://schemas.microsoft.com/office/drawing/2014/main" id="{BF10DD9D-86DD-4083-A19C-1208755491D9}"/>
+              </a:ext>
+            </a:extLst>
+          </p:cNvPr>
+          <p:cNvCxnSpPr>
+            <a:cxnSpLocks/>
+          </p:cNvCxnSpPr>
+          <p:nvPr/>
+        </p:nvCxnSpPr>
+        <p:spPr>
+          <a:xfrm>
+            <a:off x="4373593" y="3159891"/>
+            <a:ext cx="0" cy="1922115"/>
+          </a:xfrm>
+          <a:prstGeom prst="line">
+            <a:avLst/>
+          </a:prstGeom>
+          <a:ln w="38100">
+            <a:solidFill>
+              <a:schemeClr val="bg1"/>
+            </a:solidFill>
+          </a:ln>
+        </p:spPr>
+        <p:style>
+          <a:lnRef idx="1">
+            <a:schemeClr val="accent1"/>
+          </a:lnRef>
+          <a:fillRef idx="0">
+            <a:schemeClr val="accent1"/>
+          </a:fillRef>
+          <a:effectRef idx="0">
+            <a:schemeClr val="accent1"/>
+          </a:effectRef>
+          <a:fontRef idx="minor">
+            <a:schemeClr val="tx1"/>
+          </a:fontRef>
+        </p:style>
+      </p:cxnSp>
+      <p:cxnSp>
+        <p:nvCxnSpPr>
+          <p:cNvPr id="19" name="Straight Connector 20">
+            <a:extLst>
+              <a:ext uri="{FF2B5EF4-FFF2-40B4-BE49-F238E27FC236}">
+                <a16:creationId xmlns:a16="http://schemas.microsoft.com/office/drawing/2014/main" id="{7EA74889-B34A-4EB9-BF3C-75695F49A6E6}"/>
+              </a:ext>
+            </a:extLst>
+          </p:cNvPr>
+          <p:cNvCxnSpPr/>
+          <p:nvPr/>
+        </p:nvCxnSpPr>
+        <p:spPr>
+          <a:xfrm>
+            <a:off x="3902696" y="5069706"/>
+            <a:ext cx="470897" cy="0"/>
+          </a:xfrm>
+          <a:prstGeom prst="line">
+            <a:avLst/>
+          </a:prstGeom>
+          <a:ln w="38100">
+            <a:solidFill>
+              <a:schemeClr val="bg1"/>
+            </a:solidFill>
+          </a:ln>
+        </p:spPr>
+        <p:style>
+          <a:lnRef idx="1">
+            <a:schemeClr val="accent1"/>
+          </a:lnRef>
+          <a:fillRef idx="0">
+            <a:schemeClr val="accent1"/>
+          </a:fillRef>
+          <a:effectRef idx="0">
+            <a:schemeClr val="accent1"/>
+          </a:effectRef>
+          <a:fontRef idx="minor">
+            <a:schemeClr val="tx1"/>
+          </a:fontRef>
+        </p:style>
+      </p:cxnSp>
+    </p:spTree>
+    <p:extLst>
+      <p:ext uri="{BB962C8B-B14F-4D97-AF65-F5344CB8AC3E}">
+        <p14:creationId xmlns:p14="http://schemas.microsoft.com/office/powerpoint/2010/main" val="271486366"/>
+      </p:ext>
+    </p:extLst>
+  </p:cSld>
+  <p:clrMapOvr>
+    <a:masterClrMapping/>
+  </p:clrMapOvr>
+</p:sld>
+</file>
+
+<file path=ppt/slides/slide15.xml><?xml version="1.0" encoding="utf-8"?>
+<p:sld xmlns:a="http://schemas.openxmlformats.org/drawingml/2006/main" xmlns:r="http://schemas.openxmlformats.org/officeDocument/2006/relationships" xmlns:p="http://schemas.openxmlformats.org/presentationml/2006/main">
+  <p:cSld>
+    <p:spTree>
+      <p:nvGrpSpPr>
+        <p:cNvPr id="1" name=""/>
+        <p:cNvGrpSpPr/>
+        <p:nvPr/>
+      </p:nvGrpSpPr>
+      <p:grpSpPr>
+        <a:xfrm>
+          <a:off x="0" y="0"/>
+          <a:ext cx="0" cy="0"/>
+          <a:chOff x="0" y="0"/>
+          <a:chExt cx="0" cy="0"/>
+        </a:xfrm>
+      </p:grpSpPr>
+      <p:sp>
+        <p:nvSpPr>
+          <p:cNvPr id="2" name="Title 1">
+            <a:extLst>
+              <a:ext uri="{FF2B5EF4-FFF2-40B4-BE49-F238E27FC236}">
+                <a16:creationId xmlns:a16="http://schemas.microsoft.com/office/drawing/2014/main" id="{42E47C92-7214-4014-81C1-8D18678ACA3C}"/>
+              </a:ext>
+            </a:extLst>
+          </p:cNvPr>
+          <p:cNvSpPr>
+            <a:spLocks noGrp="1"/>
+          </p:cNvSpPr>
+          <p:nvPr>
+            <p:ph type="title"/>
+          </p:nvPr>
+        </p:nvSpPr>
+        <p:spPr/>
+        <p:txBody>
+          <a:bodyPr>
+            <a:normAutofit fontScale="90000"/>
+          </a:bodyPr>
+          <a:lstStyle/>
+          <a:p>
+            <a:r>
+              <a:rPr lang="pt-BR" dirty="0"/>
+              <a:t>OUTLIERS</a:t>
+            </a:r>
+          </a:p>
+        </p:txBody>
+      </p:sp>
+      <p:sp>
+        <p:nvSpPr>
+          <p:cNvPr id="3" name="Text Placeholder 2">
+            <a:extLst>
+              <a:ext uri="{FF2B5EF4-FFF2-40B4-BE49-F238E27FC236}">
+                <a16:creationId xmlns:a16="http://schemas.microsoft.com/office/drawing/2014/main" id="{5BA0068A-B971-486A-AD27-01FE70D39325}"/>
+              </a:ext>
+            </a:extLst>
+          </p:cNvPr>
+          <p:cNvSpPr>
+            <a:spLocks noGrp="1"/>
+          </p:cNvSpPr>
+          <p:nvPr>
+            <p:ph type="body" sz="quarter" idx="10"/>
+          </p:nvPr>
+        </p:nvSpPr>
+        <p:spPr/>
+        <p:txBody>
+          <a:bodyPr/>
+          <a:lstStyle/>
+          <a:p>
+            <a:r>
+              <a:rPr lang="pt-BR" dirty="0"/>
+              <a:t>Tendo definido as possíveis variáveis para o modelo avaliamos os dados com a função </a:t>
+            </a:r>
+            <a:r>
+              <a:rPr lang="pt-BR" dirty="0" err="1"/>
+              <a:t>describe</a:t>
+            </a:r>
+            <a:r>
+              <a:rPr lang="pt-BR" dirty="0"/>
+              <a:t>(), identificando possíveis outliers nas variáveis de renda mensal e valor de empréstimo (e seus correlatos)</a:t>
+            </a:r>
+          </a:p>
+        </p:txBody>
+      </p:sp>
+      <p:pic>
+        <p:nvPicPr>
+          <p:cNvPr id="14" name="Imagem 13">
+            <a:extLst>
+              <a:ext uri="{FF2B5EF4-FFF2-40B4-BE49-F238E27FC236}">
+                <a16:creationId xmlns:a16="http://schemas.microsoft.com/office/drawing/2014/main" id="{8D0C8D67-03BC-4736-B2BC-57E6B6CDD279}"/>
+              </a:ext>
+            </a:extLst>
+          </p:cNvPr>
+          <p:cNvPicPr>
+            <a:picLocks noChangeAspect="1"/>
+          </p:cNvPicPr>
+          <p:nvPr/>
+        </p:nvPicPr>
+        <p:blipFill>
+          <a:blip r:embed="rId2"/>
+          <a:stretch>
+            <a:fillRect/>
+          </a:stretch>
+        </p:blipFill>
+        <p:spPr>
+          <a:xfrm>
+            <a:off x="1905588" y="2388816"/>
+            <a:ext cx="8380823" cy="2917082"/>
+          </a:xfrm>
+          <a:prstGeom prst="rect">
+            <a:avLst/>
+          </a:prstGeom>
+          <a:ln>
+            <a:solidFill>
+              <a:schemeClr val="bg1"/>
+            </a:solidFill>
+          </a:ln>
+        </p:spPr>
+      </p:pic>
     </p:spTree>
     <p:extLst>
       <p:ext uri="{BB962C8B-B14F-4D97-AF65-F5344CB8AC3E}">
         <p14:creationId xmlns:p14="http://schemas.microsoft.com/office/powerpoint/2010/main" val="2869314075"/>
+      </p:ext>
+    </p:extLst>
+  </p:cSld>
+  <p:clrMapOvr>
+    <a:masterClrMapping/>
+  </p:clrMapOvr>
+</p:sld>
+</file>
+
+<file path=ppt/slides/slide16.xml><?xml version="1.0" encoding="utf-8"?>
+<p:sld xmlns:a="http://schemas.openxmlformats.org/drawingml/2006/main" xmlns:r="http://schemas.openxmlformats.org/officeDocument/2006/relationships" xmlns:p="http://schemas.openxmlformats.org/presentationml/2006/main">
+  <p:cSld>
+    <p:spTree>
+      <p:nvGrpSpPr>
+        <p:cNvPr id="1" name=""/>
+        <p:cNvGrpSpPr/>
+        <p:nvPr/>
+      </p:nvGrpSpPr>
+      <p:grpSpPr>
+        <a:xfrm>
+          <a:off x="0" y="0"/>
+          <a:ext cx="0" cy="0"/>
+          <a:chOff x="0" y="0"/>
+          <a:chExt cx="0" cy="0"/>
+        </a:xfrm>
+      </p:grpSpPr>
+      <p:sp>
+        <p:nvSpPr>
+          <p:cNvPr id="2" name="Title 1">
+            <a:extLst>
+              <a:ext uri="{FF2B5EF4-FFF2-40B4-BE49-F238E27FC236}">
+                <a16:creationId xmlns:a16="http://schemas.microsoft.com/office/drawing/2014/main" id="{42E47C92-7214-4014-81C1-8D18678ACA3C}"/>
+              </a:ext>
+            </a:extLst>
+          </p:cNvPr>
+          <p:cNvSpPr>
+            <a:spLocks noGrp="1"/>
+          </p:cNvSpPr>
+          <p:nvPr>
+            <p:ph type="title"/>
+          </p:nvPr>
+        </p:nvSpPr>
+        <p:spPr/>
+        <p:txBody>
+          <a:bodyPr>
+            <a:normAutofit fontScale="90000"/>
+          </a:bodyPr>
+          <a:lstStyle/>
+          <a:p>
+            <a:r>
+              <a:rPr lang="pt-BR" dirty="0"/>
+              <a:t>OUTLIERS</a:t>
+            </a:r>
+          </a:p>
+        </p:txBody>
+      </p:sp>
+      <p:sp>
+        <p:nvSpPr>
+          <p:cNvPr id="3" name="Text Placeholder 2">
+            <a:extLst>
+              <a:ext uri="{FF2B5EF4-FFF2-40B4-BE49-F238E27FC236}">
+                <a16:creationId xmlns:a16="http://schemas.microsoft.com/office/drawing/2014/main" id="{5BA0068A-B971-486A-AD27-01FE70D39325}"/>
+              </a:ext>
+            </a:extLst>
+          </p:cNvPr>
+          <p:cNvSpPr>
+            <a:spLocks noGrp="1"/>
+          </p:cNvSpPr>
+          <p:nvPr>
+            <p:ph type="body" sz="quarter" idx="10"/>
+          </p:nvPr>
+        </p:nvSpPr>
+        <p:spPr/>
+        <p:txBody>
+          <a:bodyPr/>
+          <a:lstStyle/>
+          <a:p>
+            <a:r>
+              <a:rPr lang="pt-BR" dirty="0"/>
+              <a:t>Usando a função </a:t>
+            </a:r>
+            <a:r>
+              <a:rPr lang="pt-BR" dirty="0" err="1"/>
+              <a:t>describe</a:t>
+            </a:r>
+            <a:r>
+              <a:rPr lang="pt-BR" dirty="0"/>
+              <a:t>() podemos identificar a presença de possíveis outliers nos dados, em particular nos dados de renda mensal e valor de empréstimo (e seus correlatos)</a:t>
+            </a:r>
+          </a:p>
+        </p:txBody>
+      </p:sp>
+      <p:sp>
+        <p:nvSpPr>
+          <p:cNvPr id="8" name="Rectangle 5">
+            <a:extLst>
+              <a:ext uri="{FF2B5EF4-FFF2-40B4-BE49-F238E27FC236}">
+                <a16:creationId xmlns:a16="http://schemas.microsoft.com/office/drawing/2014/main" id="{7B58B58E-A563-4839-BFED-35058CA00F0B}"/>
+              </a:ext>
+            </a:extLst>
+          </p:cNvPr>
+          <p:cNvSpPr/>
+          <p:nvPr/>
+        </p:nvSpPr>
+        <p:spPr>
+          <a:xfrm>
+            <a:off x="123079" y="2025271"/>
+            <a:ext cx="8375515" cy="3916114"/>
+          </a:xfrm>
+          <a:prstGeom prst="rect">
+            <a:avLst/>
+          </a:prstGeom>
+          <a:solidFill>
+            <a:schemeClr val="bg1">
+              <a:lumMod val="65000"/>
+              <a:alpha val="48000"/>
+            </a:schemeClr>
+          </a:solidFill>
+          <a:ln w="0">
+            <a:noFill/>
+          </a:ln>
+        </p:spPr>
+        <p:style>
+          <a:lnRef idx="2">
+            <a:schemeClr val="accent1">
+              <a:shade val="50000"/>
+            </a:schemeClr>
+          </a:lnRef>
+          <a:fillRef idx="1">
+            <a:schemeClr val="accent1"/>
+          </a:fillRef>
+          <a:effectRef idx="0">
+            <a:schemeClr val="accent1"/>
+          </a:effectRef>
+          <a:fontRef idx="minor">
+            <a:schemeClr val="lt1"/>
+          </a:fontRef>
+        </p:style>
+        <p:txBody>
+          <a:bodyPr rtlCol="0" anchor="ctr"/>
+          <a:lstStyle/>
+          <a:p>
+            <a:pPr algn="r"/>
+            <a:endParaRPr lang="pt-BR"/>
+          </a:p>
+        </p:txBody>
+      </p:sp>
+      <p:pic>
+        <p:nvPicPr>
+          <p:cNvPr id="11" name="Imagem 10">
+            <a:extLst>
+              <a:ext uri="{FF2B5EF4-FFF2-40B4-BE49-F238E27FC236}">
+                <a16:creationId xmlns:a16="http://schemas.microsoft.com/office/drawing/2014/main" id="{301D411C-7DC6-47F6-947D-2C5A76956F98}"/>
+              </a:ext>
+            </a:extLst>
+          </p:cNvPr>
+          <p:cNvPicPr>
+            <a:picLocks noChangeAspect="1"/>
+          </p:cNvPicPr>
+          <p:nvPr/>
+        </p:nvPicPr>
+        <p:blipFill>
+          <a:blip r:embed="rId2">
+            <a:extLst>
+              <a:ext uri="{28A0092B-C50C-407E-A947-70E740481C1C}">
+                <a14:useLocalDpi xmlns:a14="http://schemas.microsoft.com/office/drawing/2010/main" val="0"/>
+              </a:ext>
+            </a:extLst>
+          </a:blip>
+          <a:stretch>
+            <a:fillRect/>
+          </a:stretch>
+        </p:blipFill>
+        <p:spPr>
+          <a:xfrm rot="19152625" flipH="1" flipV="1">
+            <a:off x="8649695" y="2293286"/>
+            <a:ext cx="736365" cy="736365"/>
+          </a:xfrm>
+          <a:prstGeom prst="rect">
+            <a:avLst/>
+          </a:prstGeom>
+        </p:spPr>
+      </p:pic>
+      <p:sp>
+        <p:nvSpPr>
+          <p:cNvPr id="12" name="CaixaDeTexto 11">
+            <a:extLst>
+              <a:ext uri="{FF2B5EF4-FFF2-40B4-BE49-F238E27FC236}">
+                <a16:creationId xmlns:a16="http://schemas.microsoft.com/office/drawing/2014/main" id="{EC65C331-36BD-4F7F-B5CA-D6B9FD8EB187}"/>
+              </a:ext>
+            </a:extLst>
+          </p:cNvPr>
+          <p:cNvSpPr txBox="1"/>
+          <p:nvPr/>
+        </p:nvSpPr>
+        <p:spPr>
+          <a:xfrm>
+            <a:off x="8907432" y="2728623"/>
+            <a:ext cx="3161489" cy="1938992"/>
+          </a:xfrm>
+          <a:prstGeom prst="rect">
+            <a:avLst/>
+          </a:prstGeom>
+          <a:noFill/>
+          <a:ln>
+            <a:solidFill>
+              <a:srgbClr val="EA4F3E"/>
+            </a:solidFill>
+          </a:ln>
+        </p:spPr>
+        <p:txBody>
+          <a:bodyPr wrap="square" rtlCol="0">
+            <a:spAutoFit/>
+          </a:bodyPr>
+          <a:lstStyle/>
+          <a:p>
+            <a:pPr marL="285750" indent="-285750">
+              <a:buFont typeface="Arial" panose="020B0604020202020204" pitchFamily="34" charset="0"/>
+              <a:buChar char="•"/>
+            </a:pPr>
+            <a:r>
+              <a:rPr lang="en-GB" sz="1200" dirty="0">
+                <a:solidFill>
+                  <a:schemeClr val="bg1"/>
+                </a:solidFill>
+              </a:rPr>
+              <a:t>Para a </a:t>
+            </a:r>
+            <a:r>
+              <a:rPr lang="en-GB" sz="1200" dirty="0" err="1">
+                <a:solidFill>
+                  <a:schemeClr val="bg1"/>
+                </a:solidFill>
+              </a:rPr>
+              <a:t>vari</a:t>
+            </a:r>
+            <a:r>
+              <a:rPr lang="pt-BR" sz="1200" dirty="0" err="1">
+                <a:solidFill>
+                  <a:schemeClr val="bg1"/>
+                </a:solidFill>
+              </a:rPr>
+              <a:t>ável</a:t>
+            </a:r>
+            <a:r>
+              <a:rPr lang="pt-BR" sz="1200" dirty="0">
+                <a:solidFill>
+                  <a:schemeClr val="bg1"/>
+                </a:solidFill>
+              </a:rPr>
+              <a:t> Renda, podemos identificar os outliers de maneira mais efetiva segmentando a visão pela escolaridade (alta correlação) e podemos notar outliers acima dos R$50k</a:t>
+            </a:r>
+          </a:p>
+          <a:p>
+            <a:pPr marL="285750" indent="-285750">
+              <a:buFont typeface="Arial" panose="020B0604020202020204" pitchFamily="34" charset="0"/>
+              <a:buChar char="•"/>
+            </a:pPr>
+            <a:endParaRPr lang="pt-BR" sz="1200" dirty="0">
+              <a:solidFill>
+                <a:schemeClr val="bg1"/>
+              </a:solidFill>
+            </a:endParaRPr>
+          </a:p>
+          <a:p>
+            <a:pPr marL="285750" indent="-285750">
+              <a:buFont typeface="Arial" panose="020B0604020202020204" pitchFamily="34" charset="0"/>
+              <a:buChar char="•"/>
+            </a:pPr>
+            <a:r>
+              <a:rPr lang="pt-BR" sz="1200" dirty="0">
+                <a:solidFill>
+                  <a:schemeClr val="bg1"/>
+                </a:solidFill>
+              </a:rPr>
+              <a:t>O valor do empréstimo (e suas correlatas) possuem mais outliers, no entanto um corte na faixa dos R$40k seria um corte de menos de 8% dos inputs</a:t>
+            </a:r>
+          </a:p>
+        </p:txBody>
+      </p:sp>
+      <p:pic>
+        <p:nvPicPr>
+          <p:cNvPr id="1030" name="Picture 6">
+            <a:extLst>
+              <a:ext uri="{FF2B5EF4-FFF2-40B4-BE49-F238E27FC236}">
+                <a16:creationId xmlns:a16="http://schemas.microsoft.com/office/drawing/2014/main" id="{A4ACDC64-E58D-4188-AF74-65D204397D65}"/>
+              </a:ext>
+            </a:extLst>
+          </p:cNvPr>
+          <p:cNvPicPr>
+            <a:picLocks noChangeAspect="1" noChangeArrowheads="1"/>
+          </p:cNvPicPr>
+          <p:nvPr/>
+        </p:nvPicPr>
+        <p:blipFill>
+          <a:blip r:embed="rId3">
+            <a:extLst>
+              <a:ext uri="{28A0092B-C50C-407E-A947-70E740481C1C}">
+                <a14:useLocalDpi xmlns:a14="http://schemas.microsoft.com/office/drawing/2010/main" val="0"/>
+              </a:ext>
+            </a:extLst>
+          </a:blip>
+          <a:srcRect/>
+          <a:stretch>
+            <a:fillRect/>
+          </a:stretch>
+        </p:blipFill>
+        <p:spPr bwMode="auto">
+          <a:xfrm>
+            <a:off x="-587038" y="1435399"/>
+            <a:ext cx="9124545" cy="4525440"/>
+          </a:xfrm>
+          <a:prstGeom prst="rect">
+            <a:avLst/>
+          </a:prstGeom>
+          <a:noFill/>
+          <a:extLst>
+            <a:ext uri="{909E8E84-426E-40DD-AFC4-6F175D3DCCD1}">
+              <a14:hiddenFill xmlns:a14="http://schemas.microsoft.com/office/drawing/2010/main">
+                <a:solidFill>
+                  <a:srgbClr val="FFFFFF"/>
+                </a:solidFill>
+              </a14:hiddenFill>
+            </a:ext>
+          </a:extLst>
+        </p:spPr>
+      </p:pic>
+    </p:spTree>
+    <p:extLst>
+      <p:ext uri="{BB962C8B-B14F-4D97-AF65-F5344CB8AC3E}">
+        <p14:creationId xmlns:p14="http://schemas.microsoft.com/office/powerpoint/2010/main" val="3357590066"/>
+      </p:ext>
+    </p:extLst>
+  </p:cSld>
+  <p:clrMapOvr>
+    <a:masterClrMapping/>
+  </p:clrMapOvr>
+</p:sld>
+</file>
+
+<file path=ppt/slides/slide17.xml><?xml version="1.0" encoding="utf-8"?>
+<p:sld xmlns:a="http://schemas.openxmlformats.org/drawingml/2006/main" xmlns:r="http://schemas.openxmlformats.org/officeDocument/2006/relationships" xmlns:p="http://schemas.openxmlformats.org/presentationml/2006/main">
+  <p:cSld>
+    <p:spTree>
+      <p:nvGrpSpPr>
+        <p:cNvPr id="1" name=""/>
+        <p:cNvGrpSpPr/>
+        <p:nvPr/>
+      </p:nvGrpSpPr>
+      <p:grpSpPr>
+        <a:xfrm>
+          <a:off x="0" y="0"/>
+          <a:ext cx="0" cy="0"/>
+          <a:chOff x="0" y="0"/>
+          <a:chExt cx="0" cy="0"/>
+        </a:xfrm>
+      </p:grpSpPr>
+      <p:sp>
+        <p:nvSpPr>
+          <p:cNvPr id="2" name="Title 1">
+            <a:extLst>
+              <a:ext uri="{FF2B5EF4-FFF2-40B4-BE49-F238E27FC236}">
+                <a16:creationId xmlns:a16="http://schemas.microsoft.com/office/drawing/2014/main" id="{42E47C92-7214-4014-81C1-8D18678ACA3C}"/>
+              </a:ext>
+            </a:extLst>
+          </p:cNvPr>
+          <p:cNvSpPr>
+            <a:spLocks noGrp="1"/>
+          </p:cNvSpPr>
+          <p:nvPr>
+            <p:ph type="title"/>
+          </p:nvPr>
+        </p:nvSpPr>
+        <p:spPr/>
+        <p:txBody>
+          <a:bodyPr>
+            <a:normAutofit fontScale="90000"/>
+          </a:bodyPr>
+          <a:lstStyle/>
+          <a:p>
+            <a:r>
+              <a:rPr lang="pt-BR" dirty="0"/>
+              <a:t>MODELAGEM</a:t>
+            </a:r>
+          </a:p>
+        </p:txBody>
+      </p:sp>
+      <p:sp>
+        <p:nvSpPr>
+          <p:cNvPr id="3" name="Text Placeholder 2">
+            <a:extLst>
+              <a:ext uri="{FF2B5EF4-FFF2-40B4-BE49-F238E27FC236}">
+                <a16:creationId xmlns:a16="http://schemas.microsoft.com/office/drawing/2014/main" id="{5BA0068A-B971-486A-AD27-01FE70D39325}"/>
+              </a:ext>
+            </a:extLst>
+          </p:cNvPr>
+          <p:cNvSpPr>
+            <a:spLocks noGrp="1"/>
+          </p:cNvSpPr>
+          <p:nvPr>
+            <p:ph type="body" sz="quarter" idx="10"/>
+          </p:nvPr>
+        </p:nvSpPr>
+        <p:spPr>
+          <a:xfrm>
+            <a:off x="692150" y="782346"/>
+            <a:ext cx="10515600" cy="1561359"/>
+          </a:xfrm>
+        </p:spPr>
+        <p:txBody>
+          <a:bodyPr>
+            <a:normAutofit fontScale="77500" lnSpcReduction="20000"/>
+          </a:bodyPr>
+          <a:lstStyle/>
+          <a:p>
+            <a:r>
+              <a:rPr lang="pt-BR" dirty="0"/>
+              <a:t>Como uma forma de validar as escolhas, um modelo simples de Floresta Aleatória foi treinado e testado com as variáveis escolhidas</a:t>
+            </a:r>
+          </a:p>
+          <a:p>
+            <a:endParaRPr lang="pt-BR" dirty="0"/>
+          </a:p>
+          <a:p>
+            <a:r>
+              <a:rPr lang="pt-BR" dirty="0"/>
+              <a:t>As variáveis com valores nulos foram descartadas (caso necessárias poderia se determinar os valores utilizando uma regressão com variáveis correlatas)</a:t>
+            </a:r>
+          </a:p>
+        </p:txBody>
+      </p:sp>
+      <p:graphicFrame>
+        <p:nvGraphicFramePr>
+          <p:cNvPr id="4" name="Tabela 4">
+            <a:extLst>
+              <a:ext uri="{FF2B5EF4-FFF2-40B4-BE49-F238E27FC236}">
+                <a16:creationId xmlns:a16="http://schemas.microsoft.com/office/drawing/2014/main" id="{56668427-F55A-4934-BC16-EC0EA00A8DD0}"/>
+              </a:ext>
+            </a:extLst>
+          </p:cNvPr>
+          <p:cNvGraphicFramePr>
+            <a:graphicFrameLocks noGrp="1"/>
+          </p:cNvGraphicFramePr>
+          <p:nvPr>
+            <p:extLst>
+              <p:ext uri="{D42A27DB-BD31-4B8C-83A1-F6EECF244321}">
+                <p14:modId xmlns:p14="http://schemas.microsoft.com/office/powerpoint/2010/main" val="1651432971"/>
+              </p:ext>
+            </p:extLst>
+          </p:nvPr>
+        </p:nvGraphicFramePr>
+        <p:xfrm>
+          <a:off x="2093874" y="2687943"/>
+          <a:ext cx="2290877" cy="1482112"/>
+        </p:xfrm>
+        <a:graphic>
+          <a:graphicData uri="http://schemas.openxmlformats.org/drawingml/2006/table">
+            <a:tbl>
+              <a:tblPr firstRow="1" bandRow="1">
+                <a:tableStyleId>{5C22544A-7EE6-4342-B048-85BDC9FD1C3A}</a:tableStyleId>
+              </a:tblPr>
+              <a:tblGrid>
+                <a:gridCol w="349378">
+                  <a:extLst>
+                    <a:ext uri="{9D8B030D-6E8A-4147-A177-3AD203B41FA5}">
+                      <a16:colId xmlns:a16="http://schemas.microsoft.com/office/drawing/2014/main" val="2403269665"/>
+                    </a:ext>
+                  </a:extLst>
+                </a:gridCol>
+                <a:gridCol w="573499">
+                  <a:extLst>
+                    <a:ext uri="{9D8B030D-6E8A-4147-A177-3AD203B41FA5}">
+                      <a16:colId xmlns:a16="http://schemas.microsoft.com/office/drawing/2014/main" val="1758029154"/>
+                    </a:ext>
+                  </a:extLst>
+                </a:gridCol>
+                <a:gridCol w="684000">
+                  <a:extLst>
+                    <a:ext uri="{9D8B030D-6E8A-4147-A177-3AD203B41FA5}">
+                      <a16:colId xmlns:a16="http://schemas.microsoft.com/office/drawing/2014/main" val="1334181195"/>
+                    </a:ext>
+                  </a:extLst>
+                </a:gridCol>
+                <a:gridCol w="684000">
+                  <a:extLst>
+                    <a:ext uri="{9D8B030D-6E8A-4147-A177-3AD203B41FA5}">
+                      <a16:colId xmlns:a16="http://schemas.microsoft.com/office/drawing/2014/main" val="717645300"/>
+                    </a:ext>
+                  </a:extLst>
+                </a:gridCol>
+              </a:tblGrid>
+              <a:tr h="371572">
+                <a:tc>
+                  <a:txBody>
+                    <a:bodyPr/>
+                    <a:lstStyle/>
+                    <a:p>
+                      <a:pPr algn="ctr"/>
+                      <a:endParaRPr lang="pt-BR" sz="1400" dirty="0"/>
+                    </a:p>
+                  </a:txBody>
+                  <a:tcPr marL="90874" marR="90874" marT="45437" marB="45437" anchor="ctr">
+                    <a:lnL w="12700" cmpd="sng">
+                      <a:noFill/>
+                    </a:lnL>
+                    <a:lnR w="12700" cmpd="sng">
+                      <a:noFill/>
+                    </a:lnR>
+                    <a:lnT w="12700" cmpd="sng">
+                      <a:noFill/>
+                    </a:lnT>
+                    <a:lnB w="38100" cmpd="sng">
+                      <a:noFill/>
+                    </a:lnB>
+                    <a:lnTlToBr w="12700" cmpd="sng">
+                      <a:noFill/>
+                      <a:prstDash val="solid"/>
+                    </a:lnTlToBr>
+                    <a:lnBlToTr w="12700" cmpd="sng">
+                      <a:noFill/>
+                      <a:prstDash val="solid"/>
+                    </a:lnBlToTr>
+                    <a:solidFill>
+                      <a:srgbClr val="13232C"/>
+                    </a:solidFill>
+                  </a:tcPr>
+                </a:tc>
+                <a:tc>
+                  <a:txBody>
+                    <a:bodyPr/>
+                    <a:lstStyle/>
+                    <a:p>
+                      <a:pPr algn="ctr"/>
+                      <a:endParaRPr lang="pt-BR" sz="1400" dirty="0"/>
+                    </a:p>
+                  </a:txBody>
+                  <a:tcPr marL="90874" marR="90874" marT="45437" marB="45437" anchor="ctr">
+                    <a:lnL w="12700" cmpd="sng">
+                      <a:noFill/>
+                    </a:lnL>
+                    <a:lnR w="12700" cmpd="sng">
+                      <a:noFill/>
+                    </a:lnR>
+                    <a:lnT w="12700" cmpd="sng">
+                      <a:noFill/>
+                    </a:lnT>
+                    <a:lnB w="38100" cmpd="sng">
+                      <a:noFill/>
+                    </a:lnB>
+                    <a:lnTlToBr w="12700" cmpd="sng">
+                      <a:noFill/>
+                      <a:prstDash val="solid"/>
+                    </a:lnTlToBr>
+                    <a:lnBlToTr w="12700" cmpd="sng">
+                      <a:noFill/>
+                      <a:prstDash val="solid"/>
+                    </a:lnBlToTr>
+                    <a:solidFill>
+                      <a:srgbClr val="13232C"/>
+                    </a:solidFill>
+                  </a:tcPr>
+                </a:tc>
+                <a:tc gridSpan="2">
+                  <a:txBody>
+                    <a:bodyPr/>
+                    <a:lstStyle/>
+                    <a:p>
+                      <a:pPr algn="ctr"/>
+                      <a:r>
+                        <a:rPr lang="pt-BR" sz="1400" dirty="0"/>
+                        <a:t>Previsto</a:t>
+                      </a:r>
+                    </a:p>
+                  </a:txBody>
+                  <a:tcPr marL="92264" marR="92264" marT="46132" marB="46132" anchor="ctr">
+                    <a:lnL w="12700" cmpd="sng">
+                      <a:noFill/>
+                    </a:lnL>
+                    <a:lnR w="12700" cmpd="sng">
+                      <a:noFill/>
+                    </a:lnR>
+                    <a:lnT w="12700" cmpd="sng">
+                      <a:noFill/>
+                    </a:lnT>
+                    <a:lnB w="38100" cmpd="sng">
+                      <a:noFill/>
+                    </a:lnB>
+                    <a:lnTlToBr w="12700" cmpd="sng">
+                      <a:noFill/>
+                      <a:prstDash val="solid"/>
+                    </a:lnTlToBr>
+                    <a:lnBlToTr w="12700" cmpd="sng">
+                      <a:noFill/>
+                      <a:prstDash val="solid"/>
+                    </a:lnBlToTr>
+                    <a:solidFill>
+                      <a:schemeClr val="tx1"/>
+                    </a:solidFill>
+                  </a:tcPr>
+                </a:tc>
+                <a:tc hMerge="1">
+                  <a:txBody>
+                    <a:bodyPr/>
+                    <a:lstStyle/>
+                    <a:p>
+                      <a:endParaRPr lang="pt-BR" dirty="0"/>
+                    </a:p>
+                  </a:txBody>
+                  <a:tcPr/>
+                </a:tc>
+                <a:extLst>
+                  <a:ext uri="{0D108BD9-81ED-4DB2-BD59-A6C34878D82A}">
+                    <a16:rowId xmlns:a16="http://schemas.microsoft.com/office/drawing/2014/main" val="2582523528"/>
+                  </a:ext>
+                </a:extLst>
+              </a:tr>
+              <a:tr h="370180">
+                <a:tc>
+                  <a:txBody>
+                    <a:bodyPr/>
+                    <a:lstStyle/>
+                    <a:p>
+                      <a:pPr algn="ctr"/>
+                      <a:endParaRPr lang="pt-BR" sz="1400" dirty="0"/>
+                    </a:p>
+                  </a:txBody>
+                  <a:tcPr marL="90874" marR="90874" marT="45437" marB="45437" vert="vert270" anchor="ctr">
+                    <a:lnL w="12700" cmpd="sng">
+                      <a:noFill/>
+                    </a:lnL>
+                    <a:lnR w="12700" cmpd="sng">
+                      <a:noFill/>
+                    </a:lnR>
+                    <a:lnT w="38100" cmpd="sng">
+                      <a:noFill/>
+                    </a:lnT>
+                    <a:lnB w="12700" cmpd="sng">
+                      <a:noFill/>
+                    </a:lnB>
+                    <a:lnTlToBr w="12700" cmpd="sng">
+                      <a:noFill/>
+                      <a:prstDash val="solid"/>
+                    </a:lnTlToBr>
+                    <a:lnBlToTr w="12700" cmpd="sng">
+                      <a:noFill/>
+                      <a:prstDash val="solid"/>
+                    </a:lnBlToTr>
+                    <a:solidFill>
+                      <a:srgbClr val="13232C"/>
+                    </a:solidFill>
+                  </a:tcPr>
+                </a:tc>
+                <a:tc>
+                  <a:txBody>
+                    <a:bodyPr/>
+                    <a:lstStyle/>
+                    <a:p>
+                      <a:pPr algn="ctr"/>
+                      <a:endParaRPr lang="pt-BR" sz="1400" dirty="0"/>
+                    </a:p>
+                  </a:txBody>
+                  <a:tcPr marL="90874" marR="90874" marT="45437" marB="45437" anchor="ctr">
+                    <a:lnL w="12700" cmpd="sng">
+                      <a:noFill/>
+                    </a:lnL>
+                    <a:lnR w="12700" cmpd="sng">
+                      <a:noFill/>
+                    </a:lnR>
+                    <a:lnT w="38100" cmpd="sng">
+                      <a:noFill/>
+                    </a:lnT>
+                    <a:lnB w="12700" cmpd="sng">
+                      <a:noFill/>
+                    </a:lnB>
+                    <a:lnTlToBr w="12700" cmpd="sng">
+                      <a:noFill/>
+                      <a:prstDash val="solid"/>
+                    </a:lnTlToBr>
+                    <a:lnBlToTr w="12700" cmpd="sng">
+                      <a:noFill/>
+                      <a:prstDash val="solid"/>
+                    </a:lnBlToTr>
+                    <a:solidFill>
+                      <a:srgbClr val="13232C"/>
+                    </a:solidFill>
+                  </a:tcPr>
+                </a:tc>
+                <a:tc>
+                  <a:txBody>
+                    <a:bodyPr/>
+                    <a:lstStyle/>
+                    <a:p>
+                      <a:pPr algn="ctr"/>
+                      <a:r>
+                        <a:rPr lang="pt-BR" sz="1400" dirty="0">
+                          <a:solidFill>
+                            <a:schemeClr val="bg1"/>
+                          </a:solidFill>
+                        </a:rPr>
+                        <a:t>Sim</a:t>
+                      </a:r>
+                    </a:p>
+                  </a:txBody>
+                  <a:tcPr marL="90874" marR="90874" marT="45437" marB="45437" anchor="ctr">
+                    <a:lnL w="12700" cmpd="sng">
+                      <a:noFill/>
+                    </a:lnL>
+                    <a:lnR w="12700" cmpd="sng">
+                      <a:noFill/>
+                    </a:lnR>
+                    <a:lnT w="38100" cmpd="sng">
+                      <a:noFill/>
+                    </a:lnT>
+                    <a:lnB w="12700" cmpd="sng">
+                      <a:noFill/>
+                    </a:lnB>
+                    <a:lnTlToBr w="12700" cmpd="sng">
+                      <a:noFill/>
+                      <a:prstDash val="solid"/>
+                    </a:lnTlToBr>
+                    <a:lnBlToTr w="12700" cmpd="sng">
+                      <a:noFill/>
+                      <a:prstDash val="solid"/>
+                    </a:lnBlToTr>
+                    <a:solidFill>
+                      <a:schemeClr val="tx1"/>
+                    </a:solidFill>
+                  </a:tcPr>
+                </a:tc>
+                <a:tc>
+                  <a:txBody>
+                    <a:bodyPr/>
+                    <a:lstStyle/>
+                    <a:p>
+                      <a:pPr algn="ctr"/>
+                      <a:r>
+                        <a:rPr lang="pt-BR" sz="1400" dirty="0">
+                          <a:solidFill>
+                            <a:schemeClr val="bg1"/>
+                          </a:solidFill>
+                        </a:rPr>
+                        <a:t>Não</a:t>
+                      </a:r>
+                    </a:p>
+                  </a:txBody>
+                  <a:tcPr marL="90874" marR="90874" marT="45437" marB="45437" anchor="ctr">
+                    <a:lnL w="12700" cmpd="sng">
+                      <a:noFill/>
+                    </a:lnL>
+                    <a:lnR w="12700" cmpd="sng">
+                      <a:noFill/>
+                    </a:lnR>
+                    <a:lnT w="38100" cmpd="sng">
+                      <a:noFill/>
+                    </a:lnT>
+                    <a:lnB w="12700" cmpd="sng">
+                      <a:noFill/>
+                    </a:lnB>
+                    <a:lnTlToBr w="12700" cmpd="sng">
+                      <a:noFill/>
+                      <a:prstDash val="solid"/>
+                    </a:lnTlToBr>
+                    <a:lnBlToTr w="12700" cmpd="sng">
+                      <a:noFill/>
+                      <a:prstDash val="solid"/>
+                    </a:lnBlToTr>
+                    <a:solidFill>
+                      <a:schemeClr val="tx1"/>
+                    </a:solidFill>
+                  </a:tcPr>
+                </a:tc>
+                <a:extLst>
+                  <a:ext uri="{0D108BD9-81ED-4DB2-BD59-A6C34878D82A}">
+                    <a16:rowId xmlns:a16="http://schemas.microsoft.com/office/drawing/2014/main" val="4071388590"/>
+                  </a:ext>
+                </a:extLst>
+              </a:tr>
+              <a:tr h="370180">
+                <a:tc rowSpan="2">
+                  <a:txBody>
+                    <a:bodyPr/>
+                    <a:lstStyle/>
+                    <a:p>
+                      <a:pPr algn="ctr"/>
+                      <a:r>
+                        <a:rPr lang="pt-BR" sz="1400" dirty="0">
+                          <a:solidFill>
+                            <a:schemeClr val="bg1"/>
+                          </a:solidFill>
+                        </a:rPr>
+                        <a:t>Real</a:t>
+                      </a:r>
+                    </a:p>
+                  </a:txBody>
+                  <a:tcPr marL="92264" marR="92264" marT="46132" marB="46132" vert="vert270" anchor="ctr">
+                    <a:lnL w="12700" cmpd="sng">
+                      <a:noFill/>
+                    </a:lnL>
+                    <a:lnR w="12700" cmpd="sng">
+                      <a:noFill/>
+                    </a:lnR>
+                    <a:lnT w="12700" cmpd="sng">
+                      <a:noFill/>
+                    </a:lnT>
+                    <a:lnB w="12700" cmpd="sng">
+                      <a:noFill/>
+                    </a:lnB>
+                    <a:lnTlToBr w="12700" cmpd="sng">
+                      <a:noFill/>
+                      <a:prstDash val="solid"/>
+                    </a:lnTlToBr>
+                    <a:lnBlToTr w="12700" cmpd="sng">
+                      <a:noFill/>
+                      <a:prstDash val="solid"/>
+                    </a:lnBlToTr>
+                    <a:solidFill>
+                      <a:schemeClr val="tx1"/>
+                    </a:solidFill>
+                  </a:tcPr>
+                </a:tc>
+                <a:tc>
+                  <a:txBody>
+                    <a:bodyPr/>
+                    <a:lstStyle/>
+                    <a:p>
+                      <a:pPr algn="ctr"/>
+                      <a:r>
+                        <a:rPr lang="pt-BR" sz="1400" dirty="0">
+                          <a:solidFill>
+                            <a:schemeClr val="bg1"/>
+                          </a:solidFill>
+                        </a:rPr>
+                        <a:t>Sim</a:t>
+                      </a:r>
+                    </a:p>
+                  </a:txBody>
+                  <a:tcPr marL="90874" marR="90874" marT="45437" marB="45437" anchor="ctr">
+                    <a:lnL w="12700" cmpd="sng">
+                      <a:noFill/>
+                    </a:lnL>
+                    <a:lnR w="12700" cmpd="sng">
+                      <a:noFill/>
+                    </a:lnR>
+                    <a:lnT w="12700" cmpd="sng">
+                      <a:noFill/>
+                    </a:lnT>
+                    <a:lnB w="12700" cmpd="sng">
+                      <a:noFill/>
+                    </a:lnB>
+                    <a:lnTlToBr w="12700" cmpd="sng">
+                      <a:noFill/>
+                      <a:prstDash val="solid"/>
+                    </a:lnTlToBr>
+                    <a:lnBlToTr w="12700" cmpd="sng">
+                      <a:noFill/>
+                      <a:prstDash val="solid"/>
+                    </a:lnBlToTr>
+                    <a:solidFill>
+                      <a:schemeClr val="tx1"/>
+                    </a:solidFill>
+                  </a:tcPr>
+                </a:tc>
+                <a:tc>
+                  <a:txBody>
+                    <a:bodyPr/>
+                    <a:lstStyle/>
+                    <a:p>
+                      <a:pPr algn="ctr"/>
+                      <a:r>
+                        <a:rPr lang="pt-BR" sz="1400" dirty="0"/>
+                        <a:t>1323</a:t>
+                      </a:r>
+                    </a:p>
+                  </a:txBody>
+                  <a:tcPr marL="90874" marR="90874" marT="45437" marB="45437" anchor="ctr">
+                    <a:lnL w="12700" cmpd="sng">
+                      <a:noFill/>
+                    </a:lnL>
+                    <a:lnT w="12700" cmpd="sng">
+                      <a:noFill/>
+                    </a:lnT>
+                    <a:solidFill>
+                      <a:schemeClr val="bg1">
+                        <a:lumMod val="65000"/>
+                      </a:schemeClr>
+                    </a:solidFill>
+                  </a:tcPr>
+                </a:tc>
+                <a:tc>
+                  <a:txBody>
+                    <a:bodyPr/>
+                    <a:lstStyle/>
+                    <a:p>
+                      <a:pPr algn="ctr"/>
+                      <a:r>
+                        <a:rPr lang="pt-BR" sz="1400" dirty="0"/>
+                        <a:t>1284</a:t>
+                      </a:r>
+                    </a:p>
+                  </a:txBody>
+                  <a:tcPr marL="90874" marR="90874" marT="45437" marB="45437" anchor="ctr">
+                    <a:lnT w="12700" cmpd="sng">
+                      <a:noFill/>
+                    </a:lnT>
+                    <a:solidFill>
+                      <a:schemeClr val="bg1">
+                        <a:lumMod val="65000"/>
+                      </a:schemeClr>
+                    </a:solidFill>
+                  </a:tcPr>
+                </a:tc>
+                <a:extLst>
+                  <a:ext uri="{0D108BD9-81ED-4DB2-BD59-A6C34878D82A}">
+                    <a16:rowId xmlns:a16="http://schemas.microsoft.com/office/drawing/2014/main" val="3102169189"/>
+                  </a:ext>
+                </a:extLst>
+              </a:tr>
+              <a:tr h="370180">
+                <a:tc vMerge="1">
+                  <a:txBody>
+                    <a:bodyPr/>
+                    <a:lstStyle/>
+                    <a:p>
+                      <a:endParaRPr lang="pt-BR" dirty="0"/>
+                    </a:p>
+                  </a:txBody>
+                  <a:tcPr vert="vert270"/>
+                </a:tc>
+                <a:tc>
+                  <a:txBody>
+                    <a:bodyPr/>
+                    <a:lstStyle/>
+                    <a:p>
+                      <a:pPr algn="ctr"/>
+                      <a:r>
+                        <a:rPr lang="pt-BR" sz="1400" dirty="0">
+                          <a:solidFill>
+                            <a:schemeClr val="bg1"/>
+                          </a:solidFill>
+                        </a:rPr>
+                        <a:t>Não</a:t>
+                      </a:r>
+                    </a:p>
+                  </a:txBody>
+                  <a:tcPr marL="90874" marR="90874" marT="45437" marB="45437" anchor="ctr">
+                    <a:lnL w="12700" cmpd="sng">
+                      <a:noFill/>
+                    </a:lnL>
+                    <a:lnR w="12700" cmpd="sng">
+                      <a:noFill/>
+                    </a:lnR>
+                    <a:lnT w="12700" cmpd="sng">
+                      <a:noFill/>
+                    </a:lnT>
+                    <a:lnB w="12700" cmpd="sng">
+                      <a:noFill/>
+                    </a:lnB>
+                    <a:lnTlToBr w="12700" cmpd="sng">
+                      <a:noFill/>
+                      <a:prstDash val="solid"/>
+                    </a:lnTlToBr>
+                    <a:lnBlToTr w="12700" cmpd="sng">
+                      <a:noFill/>
+                      <a:prstDash val="solid"/>
+                    </a:lnBlToTr>
+                    <a:solidFill>
+                      <a:schemeClr val="tx1"/>
+                    </a:solidFill>
+                  </a:tcPr>
+                </a:tc>
+                <a:tc>
+                  <a:txBody>
+                    <a:bodyPr/>
+                    <a:lstStyle/>
+                    <a:p>
+                      <a:pPr algn="ctr"/>
+                      <a:r>
+                        <a:rPr lang="pt-BR" sz="1400" dirty="0"/>
+                        <a:t>565</a:t>
+                      </a:r>
+                    </a:p>
+                  </a:txBody>
+                  <a:tcPr marL="90874" marR="90874" marT="45437" marB="45437" anchor="ctr">
+                    <a:lnL w="12700" cmpd="sng">
+                      <a:noFill/>
+                    </a:lnL>
+                    <a:solidFill>
+                      <a:schemeClr val="bg1">
+                        <a:lumMod val="65000"/>
+                      </a:schemeClr>
+                    </a:solidFill>
+                  </a:tcPr>
+                </a:tc>
+                <a:tc>
+                  <a:txBody>
+                    <a:bodyPr/>
+                    <a:lstStyle/>
+                    <a:p>
+                      <a:pPr algn="ctr"/>
+                      <a:r>
+                        <a:rPr lang="pt-BR" sz="1400" dirty="0"/>
+                        <a:t>10801</a:t>
+                      </a:r>
+                    </a:p>
+                  </a:txBody>
+                  <a:tcPr marL="90874" marR="90874" marT="45437" marB="45437" anchor="ctr">
+                    <a:solidFill>
+                      <a:schemeClr val="bg1">
+                        <a:lumMod val="65000"/>
+                      </a:schemeClr>
+                    </a:solidFill>
+                  </a:tcPr>
+                </a:tc>
+                <a:extLst>
+                  <a:ext uri="{0D108BD9-81ED-4DB2-BD59-A6C34878D82A}">
+                    <a16:rowId xmlns:a16="http://schemas.microsoft.com/office/drawing/2014/main" val="2622233420"/>
+                  </a:ext>
+                </a:extLst>
+              </a:tr>
+            </a:tbl>
+          </a:graphicData>
+        </a:graphic>
+      </p:graphicFrame>
+      <p:pic>
+        <p:nvPicPr>
+          <p:cNvPr id="7" name="Imagem 6">
+            <a:extLst>
+              <a:ext uri="{FF2B5EF4-FFF2-40B4-BE49-F238E27FC236}">
+                <a16:creationId xmlns:a16="http://schemas.microsoft.com/office/drawing/2014/main" id="{F6E86BC6-105F-47DF-B1E9-09308235578F}"/>
+              </a:ext>
+            </a:extLst>
+          </p:cNvPr>
+          <p:cNvPicPr>
+            <a:picLocks noChangeAspect="1"/>
+          </p:cNvPicPr>
+          <p:nvPr/>
+        </p:nvPicPr>
+        <p:blipFill>
+          <a:blip r:embed="rId2"/>
+          <a:stretch>
+            <a:fillRect/>
+          </a:stretch>
+        </p:blipFill>
+        <p:spPr>
+          <a:xfrm>
+            <a:off x="6478625" y="2814637"/>
+            <a:ext cx="3619500" cy="1228725"/>
+          </a:xfrm>
+          <a:prstGeom prst="rect">
+            <a:avLst/>
+          </a:prstGeom>
+        </p:spPr>
+      </p:pic>
+      <p:sp>
+        <p:nvSpPr>
+          <p:cNvPr id="13" name="TextBox 9">
+            <a:extLst>
+              <a:ext uri="{FF2B5EF4-FFF2-40B4-BE49-F238E27FC236}">
+                <a16:creationId xmlns:a16="http://schemas.microsoft.com/office/drawing/2014/main" id="{12A87B29-1313-4251-80BE-0AE7CEE39294}"/>
+              </a:ext>
+            </a:extLst>
+          </p:cNvPr>
+          <p:cNvSpPr txBox="1"/>
+          <p:nvPr/>
+        </p:nvSpPr>
+        <p:spPr>
+          <a:xfrm>
+            <a:off x="692426" y="4875325"/>
+            <a:ext cx="10515599" cy="1200329"/>
+          </a:xfrm>
+          <a:prstGeom prst="rect">
+            <a:avLst/>
+          </a:prstGeom>
+          <a:noFill/>
+          <a:ln>
+            <a:solidFill>
+              <a:schemeClr val="bg1"/>
+            </a:solidFill>
+          </a:ln>
+        </p:spPr>
+        <p:txBody>
+          <a:bodyPr wrap="square" rtlCol="0">
+            <a:spAutoFit/>
+          </a:bodyPr>
+          <a:lstStyle/>
+          <a:p>
+            <a:pPr algn="ctr"/>
+            <a:r>
+              <a:rPr lang="pt-BR" dirty="0">
+                <a:solidFill>
+                  <a:schemeClr val="bg1"/>
+                </a:solidFill>
+              </a:rPr>
+              <a:t>Observamos um resultado bom para o modelo, no entanto com um viés voltado para o “Pago”, o que não é ideal para uma análise financeira</a:t>
+            </a:r>
+          </a:p>
+          <a:p>
+            <a:pPr algn="ctr"/>
+            <a:r>
+              <a:rPr lang="pt-BR" dirty="0">
+                <a:solidFill>
+                  <a:schemeClr val="bg1"/>
+                </a:solidFill>
+              </a:rPr>
+              <a:t>Pode-se otimizar o modelo através de um </a:t>
+            </a:r>
+            <a:r>
+              <a:rPr lang="pt-BR" dirty="0" err="1">
+                <a:solidFill>
+                  <a:schemeClr val="bg1"/>
+                </a:solidFill>
+              </a:rPr>
+              <a:t>GridSearchCV</a:t>
+            </a:r>
+            <a:r>
+              <a:rPr lang="pt-BR" dirty="0">
+                <a:solidFill>
+                  <a:schemeClr val="bg1"/>
+                </a:solidFill>
+              </a:rPr>
+              <a:t> para </a:t>
+            </a:r>
+            <a:r>
+              <a:rPr lang="pt-BR" dirty="0" err="1">
+                <a:solidFill>
+                  <a:schemeClr val="bg1"/>
+                </a:solidFill>
+              </a:rPr>
+              <a:t>tunagem</a:t>
+            </a:r>
+            <a:r>
+              <a:rPr lang="pt-BR" dirty="0">
+                <a:solidFill>
+                  <a:schemeClr val="bg1"/>
+                </a:solidFill>
+              </a:rPr>
+              <a:t> de </a:t>
+            </a:r>
+            <a:r>
+              <a:rPr lang="pt-BR" dirty="0" err="1">
+                <a:solidFill>
+                  <a:schemeClr val="bg1"/>
+                </a:solidFill>
+              </a:rPr>
+              <a:t>hiperparâmetros</a:t>
+            </a:r>
+            <a:r>
+              <a:rPr lang="pt-BR" dirty="0">
+                <a:solidFill>
+                  <a:schemeClr val="bg1"/>
+                </a:solidFill>
+              </a:rPr>
+              <a:t> ou também a modelagem das variáveis com valores </a:t>
+            </a:r>
+            <a:r>
+              <a:rPr lang="pt-BR" dirty="0" err="1">
+                <a:solidFill>
+                  <a:schemeClr val="bg1"/>
+                </a:solidFill>
+              </a:rPr>
+              <a:t>nuçps</a:t>
+            </a:r>
+            <a:endParaRPr lang="pt-BR" dirty="0">
+              <a:solidFill>
+                <a:schemeClr val="bg1"/>
+              </a:solidFill>
+            </a:endParaRPr>
+          </a:p>
+        </p:txBody>
+      </p:sp>
+    </p:spTree>
+    <p:extLst>
+      <p:ext uri="{BB962C8B-B14F-4D97-AF65-F5344CB8AC3E}">
+        <p14:creationId xmlns:p14="http://schemas.microsoft.com/office/powerpoint/2010/main" val="3912332752"/>
+      </p:ext>
+    </p:extLst>
+  </p:cSld>
+  <p:clrMapOvr>
+    <a:masterClrMapping/>
+  </p:clrMapOvr>
+</p:sld>
+</file>
+
+<file path=ppt/slides/slide18.xml><?xml version="1.0" encoding="utf-8"?>
+<p:sld xmlns:a="http://schemas.openxmlformats.org/drawingml/2006/main" xmlns:r="http://schemas.openxmlformats.org/officeDocument/2006/relationships" xmlns:p="http://schemas.openxmlformats.org/presentationml/2006/main">
+  <p:cSld>
+    <p:spTree>
+      <p:nvGrpSpPr>
+        <p:cNvPr id="1" name=""/>
+        <p:cNvGrpSpPr/>
+        <p:nvPr/>
+      </p:nvGrpSpPr>
+      <p:grpSpPr>
+        <a:xfrm>
+          <a:off x="0" y="0"/>
+          <a:ext cx="0" cy="0"/>
+          <a:chOff x="0" y="0"/>
+          <a:chExt cx="0" cy="0"/>
+        </a:xfrm>
+      </p:grpSpPr>
+      <p:sp>
+        <p:nvSpPr>
+          <p:cNvPr id="2" name="Title 1">
+            <a:extLst>
+              <a:ext uri="{FF2B5EF4-FFF2-40B4-BE49-F238E27FC236}">
+                <a16:creationId xmlns:a16="http://schemas.microsoft.com/office/drawing/2014/main" id="{42E47C92-7214-4014-81C1-8D18678ACA3C}"/>
+              </a:ext>
+            </a:extLst>
+          </p:cNvPr>
+          <p:cNvSpPr>
+            <a:spLocks noGrp="1"/>
+          </p:cNvSpPr>
+          <p:nvPr>
+            <p:ph type="title"/>
+          </p:nvPr>
+        </p:nvSpPr>
+        <p:spPr/>
+        <p:txBody>
+          <a:bodyPr>
+            <a:normAutofit fontScale="90000"/>
+          </a:bodyPr>
+          <a:lstStyle/>
+          <a:p>
+            <a:r>
+              <a:rPr lang="pt-BR" dirty="0"/>
+              <a:t>MODELAGEM</a:t>
+            </a:r>
+          </a:p>
+        </p:txBody>
+      </p:sp>
+      <p:sp>
+        <p:nvSpPr>
+          <p:cNvPr id="3" name="Text Placeholder 2">
+            <a:extLst>
+              <a:ext uri="{FF2B5EF4-FFF2-40B4-BE49-F238E27FC236}">
+                <a16:creationId xmlns:a16="http://schemas.microsoft.com/office/drawing/2014/main" id="{5BA0068A-B971-486A-AD27-01FE70D39325}"/>
+              </a:ext>
+            </a:extLst>
+          </p:cNvPr>
+          <p:cNvSpPr>
+            <a:spLocks noGrp="1"/>
+          </p:cNvSpPr>
+          <p:nvPr>
+            <p:ph type="body" sz="quarter" idx="10"/>
+          </p:nvPr>
+        </p:nvSpPr>
+        <p:spPr>
+          <a:xfrm>
+            <a:off x="692150" y="782346"/>
+            <a:ext cx="10515600" cy="1561359"/>
+          </a:xfrm>
+        </p:spPr>
+        <p:txBody>
+          <a:bodyPr>
+            <a:normAutofit lnSpcReduction="10000"/>
+          </a:bodyPr>
+          <a:lstStyle/>
+          <a:p>
+            <a:r>
+              <a:rPr lang="pt-BR" dirty="0"/>
+              <a:t>Além da classificação final o modelo também oferece a probabilidade de cada tomador de empréstimo ser inadimplente, o que também pode ser utilizado como input no cálculo de juros e outras análises de risco</a:t>
+            </a:r>
+          </a:p>
+        </p:txBody>
+      </p:sp>
+      <p:grpSp>
+        <p:nvGrpSpPr>
+          <p:cNvPr id="8" name="Agrupar 7">
+            <a:extLst>
+              <a:ext uri="{FF2B5EF4-FFF2-40B4-BE49-F238E27FC236}">
+                <a16:creationId xmlns:a16="http://schemas.microsoft.com/office/drawing/2014/main" id="{0911F422-DA3B-4E31-970C-120153646B13}"/>
+              </a:ext>
+            </a:extLst>
+          </p:cNvPr>
+          <p:cNvGrpSpPr/>
+          <p:nvPr/>
+        </p:nvGrpSpPr>
+        <p:grpSpPr>
+          <a:xfrm>
+            <a:off x="2473187" y="2219418"/>
+            <a:ext cx="6953525" cy="3533775"/>
+            <a:chOff x="559481" y="2343705"/>
+            <a:chExt cx="6953525" cy="3533775"/>
+          </a:xfrm>
+        </p:grpSpPr>
+        <p:grpSp>
+          <p:nvGrpSpPr>
+            <p:cNvPr id="5" name="Agrupar 4">
+              <a:extLst>
+                <a:ext uri="{FF2B5EF4-FFF2-40B4-BE49-F238E27FC236}">
+                  <a16:creationId xmlns:a16="http://schemas.microsoft.com/office/drawing/2014/main" id="{1576A90B-0B16-431C-B4CC-CFE7083142CB}"/>
+                </a:ext>
+              </a:extLst>
+            </p:cNvPr>
+            <p:cNvGrpSpPr/>
+            <p:nvPr/>
+          </p:nvGrpSpPr>
+          <p:grpSpPr>
+            <a:xfrm>
+              <a:off x="559481" y="2343705"/>
+              <a:ext cx="6953525" cy="3533775"/>
+              <a:chOff x="2619100" y="1662113"/>
+              <a:chExt cx="6953525" cy="3533775"/>
+            </a:xfrm>
+          </p:grpSpPr>
+          <p:sp>
+            <p:nvSpPr>
+              <p:cNvPr id="9" name="Rectangle 5">
+                <a:extLst>
+                  <a:ext uri="{FF2B5EF4-FFF2-40B4-BE49-F238E27FC236}">
+                    <a16:creationId xmlns:a16="http://schemas.microsoft.com/office/drawing/2014/main" id="{CE5F23A6-6466-42AD-BB20-F338FAA31162}"/>
+                  </a:ext>
+                </a:extLst>
+              </p:cNvPr>
+              <p:cNvSpPr/>
+              <p:nvPr/>
+            </p:nvSpPr>
+            <p:spPr>
+              <a:xfrm>
+                <a:off x="2619100" y="1734204"/>
+                <a:ext cx="6882226" cy="3461683"/>
+              </a:xfrm>
+              <a:prstGeom prst="rect">
+                <a:avLst/>
+              </a:prstGeom>
+              <a:solidFill>
+                <a:schemeClr val="bg1">
+                  <a:lumMod val="65000"/>
+                  <a:alpha val="48000"/>
+                </a:schemeClr>
+              </a:solidFill>
+              <a:ln w="0">
+                <a:noFill/>
+              </a:ln>
+            </p:spPr>
+            <p:style>
+              <a:lnRef idx="2">
+                <a:schemeClr val="accent1">
+                  <a:shade val="50000"/>
+                </a:schemeClr>
+              </a:lnRef>
+              <a:fillRef idx="1">
+                <a:schemeClr val="accent1"/>
+              </a:fillRef>
+              <a:effectRef idx="0">
+                <a:schemeClr val="accent1"/>
+              </a:effectRef>
+              <a:fontRef idx="minor">
+                <a:schemeClr val="lt1"/>
+              </a:fontRef>
+            </p:style>
+            <p:txBody>
+              <a:bodyPr rtlCol="0" anchor="ctr"/>
+              <a:lstStyle/>
+              <a:p>
+                <a:pPr algn="r"/>
+                <a:endParaRPr lang="pt-BR" dirty="0"/>
+              </a:p>
+            </p:txBody>
+          </p:sp>
+          <p:pic>
+            <p:nvPicPr>
+              <p:cNvPr id="1028" name="Picture 4">
+                <a:extLst>
+                  <a:ext uri="{FF2B5EF4-FFF2-40B4-BE49-F238E27FC236}">
+                    <a16:creationId xmlns:a16="http://schemas.microsoft.com/office/drawing/2014/main" id="{5FC6792D-8F4B-4596-A8EE-05CB2C513CC7}"/>
+                  </a:ext>
+                </a:extLst>
+              </p:cNvPr>
+              <p:cNvPicPr>
+                <a:picLocks noChangeAspect="1" noChangeArrowheads="1"/>
+              </p:cNvPicPr>
+              <p:nvPr/>
+            </p:nvPicPr>
+            <p:blipFill>
+              <a:blip r:embed="rId2">
+                <a:extLst>
+                  <a:ext uri="{28A0092B-C50C-407E-A947-70E740481C1C}">
+                    <a14:useLocalDpi xmlns:a14="http://schemas.microsoft.com/office/drawing/2010/main" val="0"/>
+                  </a:ext>
+                </a:extLst>
+              </a:blip>
+              <a:srcRect/>
+              <a:stretch>
+                <a:fillRect/>
+              </a:stretch>
+            </p:blipFill>
+            <p:spPr bwMode="auto">
+              <a:xfrm>
+                <a:off x="2619375" y="1662113"/>
+                <a:ext cx="6953250" cy="3533775"/>
+              </a:xfrm>
+              <a:prstGeom prst="rect">
+                <a:avLst/>
+              </a:prstGeom>
+              <a:noFill/>
+              <a:extLst>
+                <a:ext uri="{909E8E84-426E-40DD-AFC4-6F175D3DCCD1}">
+                  <a14:hiddenFill xmlns:a14="http://schemas.microsoft.com/office/drawing/2010/main">
+                    <a:solidFill>
+                      <a:srgbClr val="FFFFFF"/>
+                    </a:solidFill>
+                  </a14:hiddenFill>
+                </a:ext>
+              </a:extLst>
+            </p:spPr>
+          </p:pic>
+        </p:grpSp>
+        <p:sp>
+          <p:nvSpPr>
+            <p:cNvPr id="6" name="CaixaDeTexto 5">
+              <a:extLst>
+                <a:ext uri="{FF2B5EF4-FFF2-40B4-BE49-F238E27FC236}">
+                  <a16:creationId xmlns:a16="http://schemas.microsoft.com/office/drawing/2014/main" id="{873BCA08-FAD2-4B9E-AAAF-0776CC569C4A}"/>
+                </a:ext>
+              </a:extLst>
+            </p:cNvPr>
+            <p:cNvSpPr txBox="1"/>
+            <p:nvPr/>
+          </p:nvSpPr>
+          <p:spPr>
+            <a:xfrm>
+              <a:off x="2078312" y="2437072"/>
+              <a:ext cx="3916137" cy="369332"/>
+            </a:xfrm>
+            <a:prstGeom prst="rect">
+              <a:avLst/>
+            </a:prstGeom>
+            <a:noFill/>
+          </p:spPr>
+          <p:txBody>
+            <a:bodyPr wrap="none" rtlCol="0">
+              <a:spAutoFit/>
+            </a:bodyPr>
+            <a:lstStyle/>
+            <a:p>
+              <a:r>
+                <a:rPr lang="pt-BR" dirty="0"/>
+                <a:t>Distribuição das Probabilidades de Pago</a:t>
+              </a:r>
+            </a:p>
+          </p:txBody>
+        </p:sp>
+      </p:grpSp>
+    </p:spTree>
+    <p:extLst>
+      <p:ext uri="{BB962C8B-B14F-4D97-AF65-F5344CB8AC3E}">
+        <p14:creationId xmlns:p14="http://schemas.microsoft.com/office/powerpoint/2010/main" val="2923715461"/>
       </p:ext>
     </p:extLst>
   </p:cSld>
@@ -7049,6 +9643,377 @@
       </p:grpSpPr>
       <p:sp>
         <p:nvSpPr>
+          <p:cNvPr id="2" name="Título 1">
+            <a:extLst>
+              <a:ext uri="{FF2B5EF4-FFF2-40B4-BE49-F238E27FC236}">
+                <a16:creationId xmlns:a16="http://schemas.microsoft.com/office/drawing/2014/main" id="{744D785F-69B1-423F-A147-74BC60CD14F4}"/>
+              </a:ext>
+            </a:extLst>
+          </p:cNvPr>
+          <p:cNvSpPr>
+            <a:spLocks noGrp="1"/>
+          </p:cNvSpPr>
+          <p:nvPr>
+            <p:ph type="title"/>
+          </p:nvPr>
+        </p:nvSpPr>
+        <p:spPr/>
+        <p:txBody>
+          <a:bodyPr>
+            <a:normAutofit fontScale="90000"/>
+          </a:bodyPr>
+          <a:lstStyle/>
+          <a:p>
+            <a:r>
+              <a:rPr lang="en-GB" dirty="0"/>
+              <a:t>VARI</a:t>
+            </a:r>
+            <a:r>
+              <a:rPr lang="pt-BR" dirty="0"/>
+              <a:t>ÁVEIS</a:t>
+            </a:r>
+          </a:p>
+        </p:txBody>
+      </p:sp>
+      <p:sp>
+        <p:nvSpPr>
+          <p:cNvPr id="3" name="Espaço Reservado para Texto 2">
+            <a:extLst>
+              <a:ext uri="{FF2B5EF4-FFF2-40B4-BE49-F238E27FC236}">
+                <a16:creationId xmlns:a16="http://schemas.microsoft.com/office/drawing/2014/main" id="{72931CAC-37D3-4A86-9DA2-3CB7B4D25A67}"/>
+              </a:ext>
+            </a:extLst>
+          </p:cNvPr>
+          <p:cNvSpPr>
+            <a:spLocks noGrp="1"/>
+          </p:cNvSpPr>
+          <p:nvPr>
+            <p:ph type="body" sz="quarter" idx="10"/>
+          </p:nvPr>
+        </p:nvSpPr>
+        <p:spPr/>
+        <p:txBody>
+          <a:bodyPr/>
+          <a:lstStyle/>
+          <a:p>
+            <a:r>
+              <a:rPr lang="pt-BR" dirty="0"/>
+              <a:t>Analisando a distribuição e relação de algumas variáveis </a:t>
+            </a:r>
+          </a:p>
+        </p:txBody>
+      </p:sp>
+      <p:grpSp>
+        <p:nvGrpSpPr>
+          <p:cNvPr id="4" name="Agrupar 3">
+            <a:extLst>
+              <a:ext uri="{FF2B5EF4-FFF2-40B4-BE49-F238E27FC236}">
+                <a16:creationId xmlns:a16="http://schemas.microsoft.com/office/drawing/2014/main" id="{0D9C000A-A2A2-4808-AD91-CE7AF9F0F8C1}"/>
+              </a:ext>
+            </a:extLst>
+          </p:cNvPr>
+          <p:cNvGrpSpPr/>
+          <p:nvPr/>
+        </p:nvGrpSpPr>
+        <p:grpSpPr>
+          <a:xfrm>
+            <a:off x="357808" y="1566450"/>
+            <a:ext cx="6424733" cy="3968777"/>
+            <a:chOff x="331175" y="1619716"/>
+            <a:chExt cx="6424733" cy="3968777"/>
+          </a:xfrm>
+        </p:grpSpPr>
+        <p:sp>
+          <p:nvSpPr>
+            <p:cNvPr id="6" name="Rectangle 5">
+              <a:extLst>
+                <a:ext uri="{FF2B5EF4-FFF2-40B4-BE49-F238E27FC236}">
+                  <a16:creationId xmlns:a16="http://schemas.microsoft.com/office/drawing/2014/main" id="{3A009BBA-62E4-4611-A7B4-52CC04367A79}"/>
+                </a:ext>
+              </a:extLst>
+            </p:cNvPr>
+            <p:cNvSpPr/>
+            <p:nvPr/>
+          </p:nvSpPr>
+          <p:spPr>
+            <a:xfrm>
+              <a:off x="331175" y="1642024"/>
+              <a:ext cx="6389222" cy="3937591"/>
+            </a:xfrm>
+            <a:prstGeom prst="rect">
+              <a:avLst/>
+            </a:prstGeom>
+            <a:solidFill>
+              <a:schemeClr val="bg1">
+                <a:lumMod val="65000"/>
+                <a:alpha val="48000"/>
+              </a:schemeClr>
+            </a:solidFill>
+            <a:ln w="0">
+              <a:noFill/>
+            </a:ln>
+          </p:spPr>
+          <p:style>
+            <a:lnRef idx="2">
+              <a:schemeClr val="accent1">
+                <a:shade val="50000"/>
+              </a:schemeClr>
+            </a:lnRef>
+            <a:fillRef idx="1">
+              <a:schemeClr val="accent1"/>
+            </a:fillRef>
+            <a:effectRef idx="0">
+              <a:schemeClr val="accent1"/>
+            </a:effectRef>
+            <a:fontRef idx="minor">
+              <a:schemeClr val="lt1"/>
+            </a:fontRef>
+          </p:style>
+          <p:txBody>
+            <a:bodyPr rtlCol="0" anchor="ctr"/>
+            <a:lstStyle/>
+            <a:p>
+              <a:pPr algn="ctr"/>
+              <a:endParaRPr lang="pt-BR"/>
+            </a:p>
+          </p:txBody>
+        </p:sp>
+        <p:pic>
+          <p:nvPicPr>
+            <p:cNvPr id="2052" name="Picture 4">
+              <a:extLst>
+                <a:ext uri="{FF2B5EF4-FFF2-40B4-BE49-F238E27FC236}">
+                  <a16:creationId xmlns:a16="http://schemas.microsoft.com/office/drawing/2014/main" id="{1CA4FB35-7E6B-4450-B87B-6A540BCF97A1}"/>
+                </a:ext>
+              </a:extLst>
+            </p:cNvPr>
+            <p:cNvPicPr>
+              <a:picLocks noChangeAspect="1" noChangeArrowheads="1"/>
+            </p:cNvPicPr>
+            <p:nvPr/>
+          </p:nvPicPr>
+          <p:blipFill>
+            <a:blip r:embed="rId2">
+              <a:extLst>
+                <a:ext uri="{28A0092B-C50C-407E-A947-70E740481C1C}">
+                  <a14:useLocalDpi xmlns:a14="http://schemas.microsoft.com/office/drawing/2010/main" val="0"/>
+                </a:ext>
+              </a:extLst>
+            </a:blip>
+            <a:srcRect/>
+            <a:stretch>
+              <a:fillRect/>
+            </a:stretch>
+          </p:blipFill>
+          <p:spPr bwMode="auto">
+            <a:xfrm>
+              <a:off x="331450" y="1619716"/>
+              <a:ext cx="6424458" cy="3968777"/>
+            </a:xfrm>
+            <a:prstGeom prst="rect">
+              <a:avLst/>
+            </a:prstGeom>
+            <a:noFill/>
+            <a:extLst>
+              <a:ext uri="{909E8E84-426E-40DD-AFC4-6F175D3DCCD1}">
+                <a14:hiddenFill xmlns:a14="http://schemas.microsoft.com/office/drawing/2010/main">
+                  <a:solidFill>
+                    <a:srgbClr val="FFFFFF"/>
+                  </a:solidFill>
+                </a14:hiddenFill>
+              </a:ext>
+            </a:extLst>
+          </p:spPr>
+        </p:pic>
+      </p:grpSp>
+      <p:sp>
+        <p:nvSpPr>
+          <p:cNvPr id="8" name="TextBox 8">
+            <a:extLst>
+              <a:ext uri="{FF2B5EF4-FFF2-40B4-BE49-F238E27FC236}">
+                <a16:creationId xmlns:a16="http://schemas.microsoft.com/office/drawing/2014/main" id="{027DBE3B-5576-4B55-AD06-C984773BB59B}"/>
+              </a:ext>
+            </a:extLst>
+          </p:cNvPr>
+          <p:cNvSpPr txBox="1"/>
+          <p:nvPr/>
+        </p:nvSpPr>
+        <p:spPr>
+          <a:xfrm>
+            <a:off x="6924583" y="1566450"/>
+            <a:ext cx="4820495" cy="3785652"/>
+          </a:xfrm>
+          <a:prstGeom prst="rect">
+            <a:avLst/>
+          </a:prstGeom>
+          <a:noFill/>
+        </p:spPr>
+        <p:txBody>
+          <a:bodyPr wrap="square" rtlCol="0">
+            <a:spAutoFit/>
+          </a:bodyPr>
+          <a:lstStyle/>
+          <a:p>
+            <a:r>
+              <a:rPr lang="pt-BR" sz="2000" dirty="0">
+                <a:solidFill>
+                  <a:schemeClr val="bg1"/>
+                </a:solidFill>
+              </a:rPr>
+              <a:t>Pode-se observar:</a:t>
+            </a:r>
+            <a:endParaRPr lang="en-GB" sz="2000" dirty="0">
+              <a:solidFill>
+                <a:schemeClr val="bg1"/>
+              </a:solidFill>
+            </a:endParaRPr>
+          </a:p>
+          <a:p>
+            <a:endParaRPr lang="en-GB" sz="2000" dirty="0">
+              <a:solidFill>
+                <a:schemeClr val="bg1"/>
+              </a:solidFill>
+            </a:endParaRPr>
+          </a:p>
+          <a:p>
+            <a:pPr marL="457200" indent="-285750">
+              <a:buFont typeface="Arial" panose="020B0604020202020204" pitchFamily="34" charset="0"/>
+              <a:buChar char="•"/>
+            </a:pPr>
+            <a:r>
+              <a:rPr lang="pt-BR" sz="2000" dirty="0">
+                <a:solidFill>
+                  <a:schemeClr val="bg1"/>
+                </a:solidFill>
+              </a:rPr>
+              <a:t>Grande concentração de jovens adultos</a:t>
+            </a:r>
+          </a:p>
+          <a:p>
+            <a:pPr marL="457200" indent="-285750">
+              <a:buFont typeface="Arial" panose="020B0604020202020204" pitchFamily="34" charset="0"/>
+              <a:buChar char="•"/>
+            </a:pPr>
+            <a:endParaRPr lang="pt-BR" sz="2000" dirty="0">
+              <a:solidFill>
+                <a:schemeClr val="bg1"/>
+              </a:solidFill>
+            </a:endParaRPr>
+          </a:p>
+          <a:p>
+            <a:pPr marL="457200" indent="-285750">
+              <a:buFont typeface="Arial" panose="020B0604020202020204" pitchFamily="34" charset="0"/>
+              <a:buChar char="•"/>
+            </a:pPr>
+            <a:r>
+              <a:rPr lang="pt-BR" sz="2000" dirty="0">
+                <a:solidFill>
+                  <a:schemeClr val="bg1"/>
+                </a:solidFill>
+              </a:rPr>
+              <a:t>Maioria de empréstimos com valores baixos e possíveis outliers</a:t>
+            </a:r>
+          </a:p>
+          <a:p>
+            <a:pPr marL="457200" indent="-285750">
+              <a:buFont typeface="Arial" panose="020B0604020202020204" pitchFamily="34" charset="0"/>
+              <a:buChar char="•"/>
+            </a:pPr>
+            <a:endParaRPr lang="pt-BR" sz="2000" dirty="0">
+              <a:solidFill>
+                <a:schemeClr val="bg1"/>
+              </a:solidFill>
+            </a:endParaRPr>
+          </a:p>
+          <a:p>
+            <a:pPr marL="457200" indent="-285750">
+              <a:buFont typeface="Arial" panose="020B0604020202020204" pitchFamily="34" charset="0"/>
+              <a:buChar char="•"/>
+            </a:pPr>
+            <a:r>
+              <a:rPr lang="pt-BR" sz="2000" dirty="0">
+                <a:solidFill>
+                  <a:schemeClr val="bg1"/>
+                </a:solidFill>
+              </a:rPr>
+              <a:t>Distribuição desbalanceada da variável “PAGO” </a:t>
+            </a:r>
+            <a:r>
+              <a:rPr lang="pt-BR" sz="2000" dirty="0">
+                <a:solidFill>
+                  <a:schemeClr val="bg1"/>
+                </a:solidFill>
+                <a:sym typeface="Wingdings" panose="05000000000000000000" pitchFamily="2" charset="2"/>
+              </a:rPr>
+              <a:t> Possível viés no modelo</a:t>
+            </a:r>
+          </a:p>
+          <a:p>
+            <a:pPr marL="457200" indent="-285750">
+              <a:buFont typeface="Arial" panose="020B0604020202020204" pitchFamily="34" charset="0"/>
+              <a:buChar char="•"/>
+            </a:pPr>
+            <a:endParaRPr lang="pt-BR" sz="2000" dirty="0">
+              <a:solidFill>
+                <a:schemeClr val="bg1"/>
+              </a:solidFill>
+              <a:sym typeface="Wingdings" panose="05000000000000000000" pitchFamily="2" charset="2"/>
+            </a:endParaRPr>
+          </a:p>
+          <a:p>
+            <a:pPr marL="457200" indent="-285750">
+              <a:buFont typeface="Arial" panose="020B0604020202020204" pitchFamily="34" charset="0"/>
+              <a:buChar char="•"/>
+            </a:pPr>
+            <a:r>
+              <a:rPr lang="pt-BR" sz="2000" dirty="0">
+                <a:solidFill>
+                  <a:schemeClr val="bg1"/>
+                </a:solidFill>
+                <a:sym typeface="Wingdings" panose="05000000000000000000" pitchFamily="2" charset="2"/>
+              </a:rPr>
+              <a:t>Distribuição homogênea da base nos estados</a:t>
+            </a:r>
+            <a:endParaRPr lang="pt-BR" sz="2000" dirty="0">
+              <a:solidFill>
+                <a:schemeClr val="bg1"/>
+              </a:solidFill>
+            </a:endParaRPr>
+          </a:p>
+        </p:txBody>
+      </p:sp>
+    </p:spTree>
+    <p:extLst>
+      <p:ext uri="{BB962C8B-B14F-4D97-AF65-F5344CB8AC3E}">
+        <p14:creationId xmlns:p14="http://schemas.microsoft.com/office/powerpoint/2010/main" val="962332870"/>
+      </p:ext>
+    </p:extLst>
+  </p:cSld>
+  <p:clrMapOvr>
+    <a:masterClrMapping/>
+  </p:clrMapOvr>
+</p:sld>
+</file>
+
+<file path=ppt/slides/slide6.xml><?xml version="1.0" encoding="utf-8"?>
+<p:sld xmlns:a="http://schemas.openxmlformats.org/drawingml/2006/main" xmlns:r="http://schemas.openxmlformats.org/officeDocument/2006/relationships" xmlns:p="http://schemas.openxmlformats.org/presentationml/2006/main">
+  <p:cSld>
+    <p:spTree>
+      <p:nvGrpSpPr>
+        <p:cNvPr id="1" name=""/>
+        <p:cNvGrpSpPr/>
+        <p:nvPr/>
+      </p:nvGrpSpPr>
+      <p:grpSpPr>
+        <a:xfrm>
+          <a:off x="0" y="0"/>
+          <a:ext cx="0" cy="0"/>
+          <a:chOff x="0" y="0"/>
+          <a:chExt cx="0" cy="0"/>
+        </a:xfrm>
+      </p:grpSpPr>
+      <p:sp>
+        <p:nvSpPr>
           <p:cNvPr id="2" name="Title 1">
             <a:extLst>
               <a:ext uri="{FF2B5EF4-FFF2-40B4-BE49-F238E27FC236}">
@@ -7595,7 +10560,7 @@
 </p:sld>
 </file>
 
-<file path=ppt/slides/slide6.xml><?xml version="1.0" encoding="utf-8"?>
+<file path=ppt/slides/slide7.xml><?xml version="1.0" encoding="utf-8"?>
 <p:sld xmlns:a="http://schemas.openxmlformats.org/drawingml/2006/main" xmlns:r="http://schemas.openxmlformats.org/officeDocument/2006/relationships" xmlns:p="http://schemas.openxmlformats.org/presentationml/2006/main">
   <p:cSld>
     <p:spTree>
@@ -8157,7 +11122,7 @@
 </p:sld>
 </file>
 
-<file path=ppt/slides/slide7.xml><?xml version="1.0" encoding="utf-8"?>
+<file path=ppt/slides/slide8.xml><?xml version="1.0" encoding="utf-8"?>
 <p:sld xmlns:a="http://schemas.openxmlformats.org/drawingml/2006/main" xmlns:r="http://schemas.openxmlformats.org/officeDocument/2006/relationships" xmlns:p="http://schemas.openxmlformats.org/presentationml/2006/main">
   <p:cSld>
     <p:spTree>
@@ -8712,7 +11677,7 @@
 </p:sld>
 </file>
 
-<file path=ppt/slides/slide8.xml><?xml version="1.0" encoding="utf-8"?>
+<file path=ppt/slides/slide9.xml><?xml version="1.0" encoding="utf-8"?>
 <p:sld xmlns:a="http://schemas.openxmlformats.org/drawingml/2006/main" xmlns:r="http://schemas.openxmlformats.org/officeDocument/2006/relationships" xmlns:p="http://schemas.openxmlformats.org/presentationml/2006/main">
   <p:cSld>
     <p:spTree>
@@ -9280,433 +12245,6 @@
       <p:bldP spid="23" grpId="0" animBg="1"/>
     </p:bldLst>
   </p:timing>
-</p:sld>
-</file>
-
-<file path=ppt/slides/slide9.xml><?xml version="1.0" encoding="utf-8"?>
-<p:sld xmlns:a="http://schemas.openxmlformats.org/drawingml/2006/main" xmlns:r="http://schemas.openxmlformats.org/officeDocument/2006/relationships" xmlns:p="http://schemas.openxmlformats.org/presentationml/2006/main">
-  <p:cSld>
-    <p:spTree>
-      <p:nvGrpSpPr>
-        <p:cNvPr id="1" name=""/>
-        <p:cNvGrpSpPr/>
-        <p:nvPr/>
-      </p:nvGrpSpPr>
-      <p:grpSpPr>
-        <a:xfrm>
-          <a:off x="0" y="0"/>
-          <a:ext cx="0" cy="0"/>
-          <a:chOff x="0" y="0"/>
-          <a:chExt cx="0" cy="0"/>
-        </a:xfrm>
-      </p:grpSpPr>
-      <p:sp>
-        <p:nvSpPr>
-          <p:cNvPr id="2" name="Title 1">
-            <a:extLst>
-              <a:ext uri="{FF2B5EF4-FFF2-40B4-BE49-F238E27FC236}">
-                <a16:creationId xmlns:a16="http://schemas.microsoft.com/office/drawing/2014/main" id="{0C4EA2BE-D0A5-4284-88CF-D8F05AB32C9B}"/>
-              </a:ext>
-            </a:extLst>
-          </p:cNvPr>
-          <p:cNvSpPr>
-            <a:spLocks noGrp="1"/>
-          </p:cNvSpPr>
-          <p:nvPr>
-            <p:ph type="title"/>
-          </p:nvPr>
-        </p:nvSpPr>
-        <p:spPr/>
-        <p:txBody>
-          <a:bodyPr>
-            <a:normAutofit fontScale="90000"/>
-          </a:bodyPr>
-          <a:lstStyle/>
-          <a:p>
-            <a:r>
-              <a:rPr lang="pt-BR" dirty="0"/>
-              <a:t>VARIÁVEIS</a:t>
-            </a:r>
-          </a:p>
-        </p:txBody>
-      </p:sp>
-      <p:sp>
-        <p:nvSpPr>
-          <p:cNvPr id="3" name="Text Placeholder 2">
-            <a:extLst>
-              <a:ext uri="{FF2B5EF4-FFF2-40B4-BE49-F238E27FC236}">
-                <a16:creationId xmlns:a16="http://schemas.microsoft.com/office/drawing/2014/main" id="{677D843E-4D56-4BEF-A910-9CF851BDA4E6}"/>
-              </a:ext>
-            </a:extLst>
-          </p:cNvPr>
-          <p:cNvSpPr>
-            <a:spLocks noGrp="1"/>
-          </p:cNvSpPr>
-          <p:nvPr>
-            <p:ph type="body" sz="quarter" idx="10"/>
-          </p:nvPr>
-        </p:nvSpPr>
-        <p:spPr/>
-        <p:txBody>
-          <a:bodyPr/>
-          <a:lstStyle/>
-          <a:p>
-            <a:r>
-              <a:rPr lang="pt-BR" dirty="0"/>
-              <a:t>Elencando as variáveis de acordo com o módulo da correlação iniciamos o aprofundamento da seleção das variáveis do modelo</a:t>
-            </a:r>
-          </a:p>
-        </p:txBody>
-      </p:sp>
-      <p:pic>
-        <p:nvPicPr>
-          <p:cNvPr id="5" name="Picture 4">
-            <a:extLst>
-              <a:ext uri="{FF2B5EF4-FFF2-40B4-BE49-F238E27FC236}">
-                <a16:creationId xmlns:a16="http://schemas.microsoft.com/office/drawing/2014/main" id="{545BA80D-24E4-48BF-B4E9-BBC634A1BF94}"/>
-              </a:ext>
-            </a:extLst>
-          </p:cNvPr>
-          <p:cNvPicPr>
-            <a:picLocks noChangeAspect="1"/>
-          </p:cNvPicPr>
-          <p:nvPr/>
-        </p:nvPicPr>
-        <p:blipFill>
-          <a:blip r:embed="rId2"/>
-          <a:stretch>
-            <a:fillRect/>
-          </a:stretch>
-        </p:blipFill>
-        <p:spPr>
-          <a:xfrm>
-            <a:off x="691875" y="2080921"/>
-            <a:ext cx="3219450" cy="3371850"/>
-          </a:xfrm>
-          <a:prstGeom prst="rect">
-            <a:avLst/>
-          </a:prstGeom>
-        </p:spPr>
-      </p:pic>
-      <p:sp>
-        <p:nvSpPr>
-          <p:cNvPr id="7" name="Rectangle 6">
-            <a:extLst>
-              <a:ext uri="{FF2B5EF4-FFF2-40B4-BE49-F238E27FC236}">
-                <a16:creationId xmlns:a16="http://schemas.microsoft.com/office/drawing/2014/main" id="{1888F437-9812-4D31-9565-DED95A18D269}"/>
-              </a:ext>
-            </a:extLst>
-          </p:cNvPr>
-          <p:cNvSpPr/>
-          <p:nvPr/>
-        </p:nvSpPr>
-        <p:spPr>
-          <a:xfrm rot="5400000" flipH="1">
-            <a:off x="1757673" y="1015118"/>
-            <a:ext cx="1087850" cy="3219451"/>
-          </a:xfrm>
-          <a:prstGeom prst="rect">
-            <a:avLst/>
-          </a:prstGeom>
-          <a:noFill/>
-          <a:ln w="38100">
-            <a:solidFill>
-              <a:srgbClr val="00B050"/>
-            </a:solidFill>
-          </a:ln>
-        </p:spPr>
-        <p:style>
-          <a:lnRef idx="2">
-            <a:schemeClr val="accent1">
-              <a:shade val="50000"/>
-            </a:schemeClr>
-          </a:lnRef>
-          <a:fillRef idx="1">
-            <a:schemeClr val="accent1"/>
-          </a:fillRef>
-          <a:effectRef idx="0">
-            <a:schemeClr val="accent1"/>
-          </a:effectRef>
-          <a:fontRef idx="minor">
-            <a:schemeClr val="lt1"/>
-          </a:fontRef>
-        </p:style>
-        <p:txBody>
-          <a:bodyPr rtlCol="0" anchor="ctr"/>
-          <a:lstStyle/>
-          <a:p>
-            <a:pPr algn="ctr"/>
-            <a:endParaRPr lang="pt-BR"/>
-          </a:p>
-        </p:txBody>
-      </p:sp>
-      <p:sp>
-        <p:nvSpPr>
-          <p:cNvPr id="8" name="Rectangle 7">
-            <a:extLst>
-              <a:ext uri="{FF2B5EF4-FFF2-40B4-BE49-F238E27FC236}">
-                <a16:creationId xmlns:a16="http://schemas.microsoft.com/office/drawing/2014/main" id="{1F108A0A-8380-4C74-B215-A2580D74E6ED}"/>
-              </a:ext>
-            </a:extLst>
-          </p:cNvPr>
-          <p:cNvSpPr/>
-          <p:nvPr/>
-        </p:nvSpPr>
-        <p:spPr>
-          <a:xfrm rot="5400000" flipH="1">
-            <a:off x="1355567" y="2505073"/>
-            <a:ext cx="1892058" cy="3219451"/>
-          </a:xfrm>
-          <a:prstGeom prst="rect">
-            <a:avLst/>
-          </a:prstGeom>
-          <a:noFill/>
-          <a:ln w="38100">
-            <a:solidFill>
-              <a:srgbClr val="FFFF00"/>
-            </a:solidFill>
-          </a:ln>
-        </p:spPr>
-        <p:style>
-          <a:lnRef idx="2">
-            <a:schemeClr val="accent1">
-              <a:shade val="50000"/>
-            </a:schemeClr>
-          </a:lnRef>
-          <a:fillRef idx="1">
-            <a:schemeClr val="accent1"/>
-          </a:fillRef>
-          <a:effectRef idx="0">
-            <a:schemeClr val="accent1"/>
-          </a:effectRef>
-          <a:fontRef idx="minor">
-            <a:schemeClr val="lt1"/>
-          </a:fontRef>
-        </p:style>
-        <p:txBody>
-          <a:bodyPr rtlCol="0" anchor="ctr"/>
-          <a:lstStyle/>
-          <a:p>
-            <a:pPr algn="ctr"/>
-            <a:endParaRPr lang="pt-BR"/>
-          </a:p>
-        </p:txBody>
-      </p:sp>
-      <p:sp>
-        <p:nvSpPr>
-          <p:cNvPr id="9" name="Rectangle 8">
-            <a:extLst>
-              <a:ext uri="{FF2B5EF4-FFF2-40B4-BE49-F238E27FC236}">
-                <a16:creationId xmlns:a16="http://schemas.microsoft.com/office/drawing/2014/main" id="{B3FE84D9-BE86-4A1E-B200-EB3BBF663D73}"/>
-              </a:ext>
-            </a:extLst>
-          </p:cNvPr>
-          <p:cNvSpPr/>
-          <p:nvPr/>
-        </p:nvSpPr>
-        <p:spPr>
-          <a:xfrm rot="5400000" flipH="1">
-            <a:off x="2105626" y="3647074"/>
-            <a:ext cx="391941" cy="3219451"/>
-          </a:xfrm>
-          <a:prstGeom prst="rect">
-            <a:avLst/>
-          </a:prstGeom>
-          <a:noFill/>
-          <a:ln w="38100">
-            <a:solidFill>
-              <a:srgbClr val="FF0000"/>
-            </a:solidFill>
-          </a:ln>
-        </p:spPr>
-        <p:style>
-          <a:lnRef idx="2">
-            <a:schemeClr val="accent1">
-              <a:shade val="50000"/>
-            </a:schemeClr>
-          </a:lnRef>
-          <a:fillRef idx="1">
-            <a:schemeClr val="accent1"/>
-          </a:fillRef>
-          <a:effectRef idx="0">
-            <a:schemeClr val="accent1"/>
-          </a:effectRef>
-          <a:fontRef idx="minor">
-            <a:schemeClr val="lt1"/>
-          </a:fontRef>
-        </p:style>
-        <p:txBody>
-          <a:bodyPr rtlCol="0" anchor="ctr"/>
-          <a:lstStyle/>
-          <a:p>
-            <a:pPr algn="ctr"/>
-            <a:endParaRPr lang="pt-BR"/>
-          </a:p>
-        </p:txBody>
-      </p:sp>
-      <p:cxnSp>
-        <p:nvCxnSpPr>
-          <p:cNvPr id="11" name="Connector: Elbow 10">
-            <a:extLst>
-              <a:ext uri="{FF2B5EF4-FFF2-40B4-BE49-F238E27FC236}">
-                <a16:creationId xmlns:a16="http://schemas.microsoft.com/office/drawing/2014/main" id="{4DA275B6-FE11-4744-987B-5BAC7168CA69}"/>
-              </a:ext>
-            </a:extLst>
-          </p:cNvPr>
-          <p:cNvCxnSpPr>
-            <a:cxnSpLocks/>
-          </p:cNvCxnSpPr>
-          <p:nvPr/>
-        </p:nvCxnSpPr>
-        <p:spPr>
-          <a:xfrm>
-            <a:off x="3911322" y="2080918"/>
-            <a:ext cx="928097" cy="165967"/>
-          </a:xfrm>
-          <a:prstGeom prst="bentConnector3">
-            <a:avLst/>
-          </a:prstGeom>
-          <a:ln w="38100">
-            <a:solidFill>
-              <a:srgbClr val="00B050"/>
-            </a:solidFill>
-            <a:tailEnd type="triangle"/>
-          </a:ln>
-        </p:spPr>
-        <p:style>
-          <a:lnRef idx="1">
-            <a:schemeClr val="accent1"/>
-          </a:lnRef>
-          <a:fillRef idx="0">
-            <a:schemeClr val="accent1"/>
-          </a:fillRef>
-          <a:effectRef idx="0">
-            <a:schemeClr val="accent1"/>
-          </a:effectRef>
-          <a:fontRef idx="minor">
-            <a:schemeClr val="tx1"/>
-          </a:fontRef>
-        </p:style>
-      </p:cxnSp>
-      <p:sp>
-        <p:nvSpPr>
-          <p:cNvPr id="12" name="TextBox 11">
-            <a:extLst>
-              <a:ext uri="{FF2B5EF4-FFF2-40B4-BE49-F238E27FC236}">
-                <a16:creationId xmlns:a16="http://schemas.microsoft.com/office/drawing/2014/main" id="{B508432B-C12D-4D43-B2B2-4710431EC126}"/>
-              </a:ext>
-            </a:extLst>
-          </p:cNvPr>
-          <p:cNvSpPr txBox="1"/>
-          <p:nvPr/>
-        </p:nvSpPr>
-        <p:spPr>
-          <a:xfrm>
-            <a:off x="4839419" y="2246885"/>
-            <a:ext cx="6368331" cy="3631763"/>
-          </a:xfrm>
-          <a:prstGeom prst="rect">
-            <a:avLst/>
-          </a:prstGeom>
-          <a:noFill/>
-          <a:ln>
-            <a:solidFill>
-              <a:srgbClr val="00B050"/>
-            </a:solidFill>
-          </a:ln>
-        </p:spPr>
-        <p:txBody>
-          <a:bodyPr wrap="square" rtlCol="0">
-            <a:spAutoFit/>
-          </a:bodyPr>
-          <a:lstStyle/>
-          <a:p>
-            <a:r>
-              <a:rPr lang="pt-BR" sz="1600" dirty="0">
-                <a:solidFill>
-                  <a:schemeClr val="bg1"/>
-                </a:solidFill>
-              </a:rPr>
-              <a:t>No topo temos as variáveis com maiores correlações e que podem contribuir para um modelo mais preciso.</a:t>
-            </a:r>
-          </a:p>
-          <a:p>
-            <a:endParaRPr lang="pt-BR" sz="1600" dirty="0">
-              <a:solidFill>
-                <a:schemeClr val="bg1"/>
-              </a:solidFill>
-            </a:endParaRPr>
-          </a:p>
-          <a:p>
-            <a:r>
-              <a:rPr lang="pt-BR" sz="1600" dirty="0">
-                <a:solidFill>
-                  <a:schemeClr val="bg1"/>
-                </a:solidFill>
-              </a:rPr>
-              <a:t>As variáveis de cheque sem fundo, dependentes e renda mensal são opções viáveis para o modelo (sendo necessário lidar com os valores nulos da renda mensal caso utilizada)</a:t>
-            </a:r>
-          </a:p>
-          <a:p>
-            <a:endParaRPr lang="pt-BR" sz="1600" dirty="0">
-              <a:solidFill>
-                <a:schemeClr val="bg1"/>
-              </a:solidFill>
-            </a:endParaRPr>
-          </a:p>
-          <a:p>
-            <a:r>
-              <a:rPr lang="pt-BR" sz="1600" dirty="0">
-                <a:solidFill>
-                  <a:schemeClr val="bg1"/>
-                </a:solidFill>
-              </a:rPr>
-              <a:t>O estado civil pode ser considerado mas com ressalvas pois a classificação numérica dos estados civis pode gerar um viés errado no modelo </a:t>
-            </a:r>
-            <a:r>
-              <a:rPr lang="pt-BR" sz="1600" dirty="0">
-                <a:solidFill>
-                  <a:schemeClr val="bg1"/>
-                </a:solidFill>
-                <a:sym typeface="Wingdings" panose="05000000000000000000" pitchFamily="2" charset="2"/>
-              </a:rPr>
-              <a:t> Caso isso ocorra uma consolidação dos valores poderia ser feita para reduzir a variabilidade (Ex.: Apenas solteiro, casado, separado e outros)</a:t>
-            </a:r>
-            <a:endParaRPr lang="pt-BR" sz="1600" dirty="0">
-              <a:solidFill>
-                <a:schemeClr val="bg1"/>
-              </a:solidFill>
-            </a:endParaRPr>
-          </a:p>
-          <a:p>
-            <a:endParaRPr lang="pt-BR" sz="1600" dirty="0">
-              <a:solidFill>
-                <a:schemeClr val="bg1"/>
-              </a:solidFill>
-            </a:endParaRPr>
-          </a:p>
-          <a:p>
-            <a:r>
-              <a:rPr lang="pt-BR" sz="1600" dirty="0">
-                <a:solidFill>
-                  <a:schemeClr val="bg1"/>
-                </a:solidFill>
-              </a:rPr>
-              <a:t>A variável ID é um número de identificação do tomador de empréstimo e é uma falsa correlação</a:t>
-            </a:r>
-          </a:p>
-        </p:txBody>
-      </p:sp>
-    </p:spTree>
-    <p:extLst>
-      <p:ext uri="{BB962C8B-B14F-4D97-AF65-F5344CB8AC3E}">
-        <p14:creationId xmlns:p14="http://schemas.microsoft.com/office/powerpoint/2010/main" val="2683603411"/>
-      </p:ext>
-    </p:extLst>
-  </p:cSld>
-  <p:clrMapOvr>
-    <a:masterClrMapping/>
-  </p:clrMapOvr>
 </p:sld>
 </file>
 

</xml_diff>

<commit_message>
Final Presentation and script
</commit_message>
<xml_diff>
--- a/Apresentação-JoãoVictorSpadão.pptx
+++ b/Apresentação-JoãoVictorSpadão.pptx
@@ -5,27 +5,29 @@
     <p:sldMasterId id="2147483648" r:id="rId1"/>
   </p:sldMasterIdLst>
   <p:handoutMasterIdLst>
-    <p:handoutMasterId r:id="rId20"/>
+    <p:handoutMasterId r:id="rId22"/>
   </p:handoutMasterIdLst>
   <p:sldIdLst>
     <p:sldId id="256" r:id="rId2"/>
-    <p:sldId id="257" r:id="rId3"/>
-    <p:sldId id="258" r:id="rId4"/>
-    <p:sldId id="259" r:id="rId5"/>
-    <p:sldId id="274" r:id="rId6"/>
-    <p:sldId id="260" r:id="rId7"/>
-    <p:sldId id="262" r:id="rId8"/>
-    <p:sldId id="261" r:id="rId9"/>
-    <p:sldId id="268" r:id="rId10"/>
-    <p:sldId id="265" r:id="rId11"/>
-    <p:sldId id="266" r:id="rId12"/>
-    <p:sldId id="267" r:id="rId13"/>
-    <p:sldId id="269" r:id="rId14"/>
-    <p:sldId id="271" r:id="rId15"/>
-    <p:sldId id="263" r:id="rId16"/>
-    <p:sldId id="270" r:id="rId17"/>
-    <p:sldId id="272" r:id="rId18"/>
-    <p:sldId id="273" r:id="rId19"/>
+    <p:sldId id="276" r:id="rId3"/>
+    <p:sldId id="257" r:id="rId4"/>
+    <p:sldId id="258" r:id="rId5"/>
+    <p:sldId id="259" r:id="rId6"/>
+    <p:sldId id="274" r:id="rId7"/>
+    <p:sldId id="260" r:id="rId8"/>
+    <p:sldId id="262" r:id="rId9"/>
+    <p:sldId id="261" r:id="rId10"/>
+    <p:sldId id="268" r:id="rId11"/>
+    <p:sldId id="265" r:id="rId12"/>
+    <p:sldId id="266" r:id="rId13"/>
+    <p:sldId id="267" r:id="rId14"/>
+    <p:sldId id="269" r:id="rId15"/>
+    <p:sldId id="271" r:id="rId16"/>
+    <p:sldId id="263" r:id="rId17"/>
+    <p:sldId id="270" r:id="rId18"/>
+    <p:sldId id="275" r:id="rId19"/>
+    <p:sldId id="272" r:id="rId20"/>
+    <p:sldId id="273" r:id="rId21"/>
   </p:sldIdLst>
   <p:sldSz cx="12192000" cy="6858000"/>
   <p:notesSz cx="6858000" cy="9144000"/>
@@ -229,7 +231,7 @@
           <a:p>
             <a:fld id="{76F990C6-0F2C-4B49-B9D8-A6A41684FFEB}" type="datetimeFigureOut">
               <a:rPr lang="pt-BR" smtClean="0"/>
-              <a:t>25/11/2020</a:t>
+              <a:t>26/11/2020</a:t>
             </a:fld>
             <a:endParaRPr lang="pt-BR"/>
           </a:p>
@@ -490,7 +492,7 @@
             <a:fld id="{80914C5D-ABDB-4AEE-9173-EE9A77300385}" type="datetimeFigureOut">
               <a:rPr lang="en-GB" smtClean="0"/>
               <a:pPr/>
-              <a:t>25/11/2020</a:t>
+              <a:t>26/11/2020</a:t>
             </a:fld>
             <a:endParaRPr lang="en-GB" b="1" dirty="0"/>
           </a:p>
@@ -858,7 +860,7 @@
           <a:p>
             <a:fld id="{80914C5D-ABDB-4AEE-9173-EE9A77300385}" type="datetimeFigureOut">
               <a:rPr lang="en-GB" smtClean="0"/>
-              <a:t>25/11/2020</a:t>
+              <a:t>26/11/2020</a:t>
             </a:fld>
             <a:endParaRPr lang="en-GB"/>
           </a:p>
@@ -1058,7 +1060,7 @@
           <a:p>
             <a:fld id="{80914C5D-ABDB-4AEE-9173-EE9A77300385}" type="datetimeFigureOut">
               <a:rPr lang="en-GB" smtClean="0"/>
-              <a:t>25/11/2020</a:t>
+              <a:t>26/11/2020</a:t>
             </a:fld>
             <a:endParaRPr lang="en-GB"/>
           </a:p>
@@ -1268,7 +1270,7 @@
           <a:p>
             <a:fld id="{80914C5D-ABDB-4AEE-9173-EE9A77300385}" type="datetimeFigureOut">
               <a:rPr lang="en-GB" smtClean="0"/>
-              <a:t>25/11/2020</a:t>
+              <a:t>26/11/2020</a:t>
             </a:fld>
             <a:endParaRPr lang="en-GB"/>
           </a:p>
@@ -2162,7 +2164,7 @@
           <a:p>
             <a:fld id="{80914C5D-ABDB-4AEE-9173-EE9A77300385}" type="datetimeFigureOut">
               <a:rPr lang="en-GB" smtClean="0"/>
-              <a:t>25/11/2020</a:t>
+              <a:t>26/11/2020</a:t>
             </a:fld>
             <a:endParaRPr lang="en-GB"/>
           </a:p>
@@ -2430,7 +2432,7 @@
           <a:p>
             <a:fld id="{80914C5D-ABDB-4AEE-9173-EE9A77300385}" type="datetimeFigureOut">
               <a:rPr lang="en-GB" smtClean="0"/>
-              <a:t>25/11/2020</a:t>
+              <a:t>26/11/2020</a:t>
             </a:fld>
             <a:endParaRPr lang="en-GB"/>
           </a:p>
@@ -2845,7 +2847,7 @@
           <a:p>
             <a:fld id="{80914C5D-ABDB-4AEE-9173-EE9A77300385}" type="datetimeFigureOut">
               <a:rPr lang="en-GB" smtClean="0"/>
-              <a:t>25/11/2020</a:t>
+              <a:t>26/11/2020</a:t>
             </a:fld>
             <a:endParaRPr lang="en-GB"/>
           </a:p>
@@ -2987,7 +2989,7 @@
           <a:p>
             <a:fld id="{80914C5D-ABDB-4AEE-9173-EE9A77300385}" type="datetimeFigureOut">
               <a:rPr lang="en-GB" smtClean="0"/>
-              <a:t>25/11/2020</a:t>
+              <a:t>26/11/2020</a:t>
             </a:fld>
             <a:endParaRPr lang="en-GB"/>
           </a:p>
@@ -3100,7 +3102,7 @@
           <a:p>
             <a:fld id="{80914C5D-ABDB-4AEE-9173-EE9A77300385}" type="datetimeFigureOut">
               <a:rPr lang="en-GB" smtClean="0"/>
-              <a:t>25/11/2020</a:t>
+              <a:t>26/11/2020</a:t>
             </a:fld>
             <a:endParaRPr lang="en-GB"/>
           </a:p>
@@ -3413,7 +3415,7 @@
           <a:p>
             <a:fld id="{80914C5D-ABDB-4AEE-9173-EE9A77300385}" type="datetimeFigureOut">
               <a:rPr lang="en-GB" smtClean="0"/>
-              <a:t>25/11/2020</a:t>
+              <a:t>26/11/2020</a:t>
             </a:fld>
             <a:endParaRPr lang="en-GB"/>
           </a:p>
@@ -3659,7 +3661,7 @@
           <a:p>
             <a:fld id="{80914C5D-ABDB-4AEE-9173-EE9A77300385}" type="datetimeFigureOut">
               <a:rPr lang="en-GB" smtClean="0"/>
-              <a:t>25/11/2020</a:t>
+              <a:t>26/11/2020</a:t>
             </a:fld>
             <a:endParaRPr lang="en-GB"/>
           </a:p>
@@ -4201,7 +4203,7 @@
             <a:r>
               <a:rPr lang="pt-BR" dirty="0">
                 <a:solidFill>
-                  <a:schemeClr val="bg1"/>
+                  <a:srgbClr val="EA4F3E"/>
                 </a:solidFill>
               </a:rPr>
               <a:t>24/11/2020</a:t>
@@ -4223,6 +4225,577 @@
 </file>
 
 <file path=ppt/slides/slide10.xml><?xml version="1.0" encoding="utf-8"?>
+<p:sld xmlns:a="http://schemas.openxmlformats.org/drawingml/2006/main" xmlns:r="http://schemas.openxmlformats.org/officeDocument/2006/relationships" xmlns:p="http://schemas.openxmlformats.org/presentationml/2006/main">
+  <p:cSld>
+    <p:spTree>
+      <p:nvGrpSpPr>
+        <p:cNvPr id="1" name=""/>
+        <p:cNvGrpSpPr/>
+        <p:nvPr/>
+      </p:nvGrpSpPr>
+      <p:grpSpPr>
+        <a:xfrm>
+          <a:off x="0" y="0"/>
+          <a:ext cx="0" cy="0"/>
+          <a:chOff x="0" y="0"/>
+          <a:chExt cx="0" cy="0"/>
+        </a:xfrm>
+      </p:grpSpPr>
+      <p:sp>
+        <p:nvSpPr>
+          <p:cNvPr id="2" name="Title 1">
+            <a:extLst>
+              <a:ext uri="{FF2B5EF4-FFF2-40B4-BE49-F238E27FC236}">
+                <a16:creationId xmlns:a16="http://schemas.microsoft.com/office/drawing/2014/main" id="{EF8B6E40-6DA4-406B-8073-1BBEF28FC7D3}"/>
+              </a:ext>
+            </a:extLst>
+          </p:cNvPr>
+          <p:cNvSpPr>
+            <a:spLocks noGrp="1"/>
+          </p:cNvSpPr>
+          <p:nvPr>
+            <p:ph type="title"/>
+          </p:nvPr>
+        </p:nvSpPr>
+        <p:spPr/>
+        <p:txBody>
+          <a:bodyPr>
+            <a:normAutofit fontScale="90000"/>
+          </a:bodyPr>
+          <a:lstStyle/>
+          <a:p>
+            <a:r>
+              <a:rPr lang="pt-BR" dirty="0"/>
+              <a:t>VARIÁVEIS</a:t>
+            </a:r>
+          </a:p>
+        </p:txBody>
+      </p:sp>
+      <p:sp>
+        <p:nvSpPr>
+          <p:cNvPr id="3" name="Text Placeholder 2">
+            <a:extLst>
+              <a:ext uri="{FF2B5EF4-FFF2-40B4-BE49-F238E27FC236}">
+                <a16:creationId xmlns:a16="http://schemas.microsoft.com/office/drawing/2014/main" id="{07BF83B4-B389-4038-A73D-4CC6F7BCA408}"/>
+              </a:ext>
+            </a:extLst>
+          </p:cNvPr>
+          <p:cNvSpPr>
+            <a:spLocks noGrp="1"/>
+          </p:cNvSpPr>
+          <p:nvPr>
+            <p:ph type="body" sz="quarter" idx="10"/>
+          </p:nvPr>
+        </p:nvSpPr>
+        <p:spPr>
+          <a:xfrm>
+            <a:off x="692150" y="782346"/>
+            <a:ext cx="10515600" cy="1298575"/>
+          </a:xfrm>
+        </p:spPr>
+        <p:txBody>
+          <a:bodyPr/>
+          <a:lstStyle/>
+          <a:p>
+            <a:r>
+              <a:rPr lang="pt-BR" dirty="0"/>
+              <a:t>Iniciamos a análise das variáveis com uma análise da correlação</a:t>
+            </a:r>
+          </a:p>
+        </p:txBody>
+      </p:sp>
+      <p:grpSp>
+        <p:nvGrpSpPr>
+          <p:cNvPr id="4" name="Group 3">
+            <a:extLst>
+              <a:ext uri="{FF2B5EF4-FFF2-40B4-BE49-F238E27FC236}">
+                <a16:creationId xmlns:a16="http://schemas.microsoft.com/office/drawing/2014/main" id="{657DAAAF-98AA-49EE-92AD-108EEEA864D9}"/>
+              </a:ext>
+            </a:extLst>
+          </p:cNvPr>
+          <p:cNvGrpSpPr/>
+          <p:nvPr/>
+        </p:nvGrpSpPr>
+        <p:grpSpPr>
+          <a:xfrm>
+            <a:off x="145336" y="1318459"/>
+            <a:ext cx="5522648" cy="4757195"/>
+            <a:chOff x="-3" y="1435260"/>
+            <a:chExt cx="5522648" cy="4757195"/>
+          </a:xfrm>
+        </p:grpSpPr>
+        <p:sp>
+          <p:nvSpPr>
+            <p:cNvPr id="9" name="Rectangle 8">
+              <a:extLst>
+                <a:ext uri="{FF2B5EF4-FFF2-40B4-BE49-F238E27FC236}">
+                  <a16:creationId xmlns:a16="http://schemas.microsoft.com/office/drawing/2014/main" id="{FF14658B-69C4-412A-B3E0-F2FEB7F7E49B}"/>
+                </a:ext>
+              </a:extLst>
+            </p:cNvPr>
+            <p:cNvSpPr/>
+            <p:nvPr/>
+          </p:nvSpPr>
+          <p:spPr>
+            <a:xfrm rot="5400000">
+              <a:off x="-1208220" y="2643478"/>
+              <a:ext cx="3645697" cy="1229263"/>
+            </a:xfrm>
+            <a:prstGeom prst="rect">
+              <a:avLst/>
+            </a:prstGeom>
+            <a:solidFill>
+              <a:schemeClr val="bg1">
+                <a:lumMod val="65000"/>
+                <a:alpha val="48000"/>
+              </a:schemeClr>
+            </a:solidFill>
+            <a:ln w="0">
+              <a:solidFill>
+                <a:srgbClr val="596166"/>
+              </a:solidFill>
+            </a:ln>
+          </p:spPr>
+          <p:style>
+            <a:lnRef idx="2">
+              <a:schemeClr val="accent1">
+                <a:shade val="50000"/>
+              </a:schemeClr>
+            </a:lnRef>
+            <a:fillRef idx="1">
+              <a:schemeClr val="accent1"/>
+            </a:fillRef>
+            <a:effectRef idx="0">
+              <a:schemeClr val="accent1"/>
+            </a:effectRef>
+            <a:fontRef idx="minor">
+              <a:schemeClr val="lt1"/>
+            </a:fontRef>
+          </p:style>
+          <p:txBody>
+            <a:bodyPr rtlCol="0" anchor="ctr"/>
+            <a:lstStyle/>
+            <a:p>
+              <a:pPr algn="ctr"/>
+              <a:endParaRPr lang="pt-BR"/>
+            </a:p>
+          </p:txBody>
+        </p:sp>
+        <p:sp>
+          <p:nvSpPr>
+            <p:cNvPr id="8" name="Rectangle 7">
+              <a:extLst>
+                <a:ext uri="{FF2B5EF4-FFF2-40B4-BE49-F238E27FC236}">
+                  <a16:creationId xmlns:a16="http://schemas.microsoft.com/office/drawing/2014/main" id="{B7ACA159-CA64-4DE5-B724-DF914133FD91}"/>
+                </a:ext>
+              </a:extLst>
+            </p:cNvPr>
+            <p:cNvSpPr/>
+            <p:nvPr/>
+          </p:nvSpPr>
+          <p:spPr>
+            <a:xfrm>
+              <a:off x="1229262" y="5080958"/>
+              <a:ext cx="4260013" cy="1111497"/>
+            </a:xfrm>
+            <a:prstGeom prst="rect">
+              <a:avLst/>
+            </a:prstGeom>
+            <a:solidFill>
+              <a:schemeClr val="bg1">
+                <a:lumMod val="65000"/>
+                <a:alpha val="48000"/>
+              </a:schemeClr>
+            </a:solidFill>
+            <a:ln w="0">
+              <a:noFill/>
+            </a:ln>
+          </p:spPr>
+          <p:style>
+            <a:lnRef idx="2">
+              <a:schemeClr val="accent1">
+                <a:shade val="50000"/>
+              </a:schemeClr>
+            </a:lnRef>
+            <a:fillRef idx="1">
+              <a:schemeClr val="accent1"/>
+            </a:fillRef>
+            <a:effectRef idx="0">
+              <a:schemeClr val="accent1"/>
+            </a:effectRef>
+            <a:fontRef idx="minor">
+              <a:schemeClr val="lt1"/>
+            </a:fontRef>
+          </p:style>
+          <p:txBody>
+            <a:bodyPr rtlCol="0" anchor="ctr"/>
+            <a:lstStyle/>
+            <a:p>
+              <a:pPr algn="ctr"/>
+              <a:endParaRPr lang="pt-BR"/>
+            </a:p>
+          </p:txBody>
+        </p:sp>
+        <p:pic>
+          <p:nvPicPr>
+            <p:cNvPr id="2056" name="Picture 8">
+              <a:extLst>
+                <a:ext uri="{FF2B5EF4-FFF2-40B4-BE49-F238E27FC236}">
+                  <a16:creationId xmlns:a16="http://schemas.microsoft.com/office/drawing/2014/main" id="{F1EE69BB-985D-424D-AFF4-D87F4494B9A7}"/>
+                </a:ext>
+              </a:extLst>
+            </p:cNvPr>
+            <p:cNvPicPr>
+              <a:picLocks noChangeAspect="1" noChangeArrowheads="1"/>
+            </p:cNvPicPr>
+            <p:nvPr/>
+          </p:nvPicPr>
+          <p:blipFill>
+            <a:blip r:embed="rId2">
+              <a:extLst>
+                <a:ext uri="{28A0092B-C50C-407E-A947-70E740481C1C}">
+                  <a14:useLocalDpi xmlns:a14="http://schemas.microsoft.com/office/drawing/2010/main" val="0"/>
+                </a:ext>
+              </a:extLst>
+            </a:blip>
+            <a:srcRect/>
+            <a:stretch>
+              <a:fillRect/>
+            </a:stretch>
+          </p:blipFill>
+          <p:spPr bwMode="auto">
+            <a:xfrm>
+              <a:off x="0" y="1435260"/>
+              <a:ext cx="5522645" cy="4757195"/>
+            </a:xfrm>
+            <a:prstGeom prst="rect">
+              <a:avLst/>
+            </a:prstGeom>
+            <a:noFill/>
+            <a:extLst>
+              <a:ext uri="{909E8E84-426E-40DD-AFC4-6F175D3DCCD1}">
+                <a14:hiddenFill xmlns:a14="http://schemas.microsoft.com/office/drawing/2010/main">
+                  <a:solidFill>
+                    <a:srgbClr val="FFFFFF"/>
+                  </a:solidFill>
+                </a14:hiddenFill>
+              </a:ext>
+            </a:extLst>
+          </p:spPr>
+        </p:pic>
+      </p:grpSp>
+      <p:sp>
+        <p:nvSpPr>
+          <p:cNvPr id="5" name="Rectangle 4">
+            <a:extLst>
+              <a:ext uri="{FF2B5EF4-FFF2-40B4-BE49-F238E27FC236}">
+                <a16:creationId xmlns:a16="http://schemas.microsoft.com/office/drawing/2014/main" id="{72EF741D-EC3E-4520-A797-0D3C1EB10736}"/>
+              </a:ext>
+            </a:extLst>
+          </p:cNvPr>
+          <p:cNvSpPr/>
+          <p:nvPr/>
+        </p:nvSpPr>
+        <p:spPr>
+          <a:xfrm rot="5400000" flipH="1">
+            <a:off x="2673624" y="142909"/>
+            <a:ext cx="432704" cy="5489280"/>
+          </a:xfrm>
+          <a:prstGeom prst="rect">
+            <a:avLst/>
+          </a:prstGeom>
+          <a:noFill/>
+          <a:ln w="38100">
+            <a:solidFill>
+              <a:schemeClr val="bg1"/>
+            </a:solidFill>
+          </a:ln>
+        </p:spPr>
+        <p:style>
+          <a:lnRef idx="2">
+            <a:schemeClr val="accent1">
+              <a:shade val="50000"/>
+            </a:schemeClr>
+          </a:lnRef>
+          <a:fillRef idx="1">
+            <a:schemeClr val="accent1"/>
+          </a:fillRef>
+          <a:effectRef idx="0">
+            <a:schemeClr val="accent1"/>
+          </a:effectRef>
+          <a:fontRef idx="minor">
+            <a:schemeClr val="lt1"/>
+          </a:fontRef>
+        </p:style>
+        <p:txBody>
+          <a:bodyPr rtlCol="0" anchor="ctr"/>
+          <a:lstStyle/>
+          <a:p>
+            <a:pPr algn="ctr"/>
+            <a:endParaRPr lang="pt-BR"/>
+          </a:p>
+        </p:txBody>
+      </p:sp>
+      <p:sp>
+        <p:nvSpPr>
+          <p:cNvPr id="24" name="TextBox 23">
+            <a:extLst>
+              <a:ext uri="{FF2B5EF4-FFF2-40B4-BE49-F238E27FC236}">
+                <a16:creationId xmlns:a16="http://schemas.microsoft.com/office/drawing/2014/main" id="{73A9D265-CD53-4BA0-8EFA-2CA1F7A2DF5F}"/>
+              </a:ext>
+            </a:extLst>
+          </p:cNvPr>
+          <p:cNvSpPr txBox="1"/>
+          <p:nvPr/>
+        </p:nvSpPr>
+        <p:spPr>
+          <a:xfrm>
+            <a:off x="5761736" y="1318459"/>
+            <a:ext cx="6284926" cy="1200329"/>
+          </a:xfrm>
+          <a:prstGeom prst="rect">
+            <a:avLst/>
+          </a:prstGeom>
+          <a:noFill/>
+        </p:spPr>
+        <p:txBody>
+          <a:bodyPr wrap="square" rtlCol="0">
+            <a:spAutoFit/>
+          </a:bodyPr>
+          <a:lstStyle/>
+          <a:p>
+            <a:r>
+              <a:rPr lang="pt-BR" sz="2400" dirty="0">
+                <a:solidFill>
+                  <a:schemeClr val="bg1"/>
+                </a:solidFill>
+              </a:rPr>
+              <a:t>Analisando o mapa de correlação podemos identificar:</a:t>
+            </a:r>
+          </a:p>
+          <a:p>
+            <a:endParaRPr lang="pt-BR" sz="2400" dirty="0">
+              <a:solidFill>
+                <a:schemeClr val="bg1"/>
+              </a:solidFill>
+            </a:endParaRPr>
+          </a:p>
+        </p:txBody>
+      </p:sp>
+      <p:sp>
+        <p:nvSpPr>
+          <p:cNvPr id="23" name="Callout: Bent Line 22">
+            <a:extLst>
+              <a:ext uri="{FF2B5EF4-FFF2-40B4-BE49-F238E27FC236}">
+                <a16:creationId xmlns:a16="http://schemas.microsoft.com/office/drawing/2014/main" id="{D2E531F3-D9A8-44F1-B899-91A149E52607}"/>
+              </a:ext>
+            </a:extLst>
+          </p:cNvPr>
+          <p:cNvSpPr/>
+          <p:nvPr/>
+        </p:nvSpPr>
+        <p:spPr>
+          <a:xfrm>
+            <a:off x="6983510" y="3080779"/>
+            <a:ext cx="4511187" cy="2129575"/>
+          </a:xfrm>
+          <a:prstGeom prst="borderCallout2">
+            <a:avLst>
+              <a:gd name="adj1" fmla="val 18750"/>
+              <a:gd name="adj2" fmla="val -8333"/>
+              <a:gd name="adj3" fmla="val 18750"/>
+              <a:gd name="adj4" fmla="val -16667"/>
+              <a:gd name="adj5" fmla="val -8954"/>
+              <a:gd name="adj6" fmla="val -29456"/>
+            </a:avLst>
+          </a:prstGeom>
+          <a:noFill/>
+          <a:ln>
+            <a:solidFill>
+              <a:schemeClr val="bg1"/>
+            </a:solidFill>
+          </a:ln>
+        </p:spPr>
+        <p:style>
+          <a:lnRef idx="2">
+            <a:schemeClr val="accent1">
+              <a:shade val="50000"/>
+            </a:schemeClr>
+          </a:lnRef>
+          <a:fillRef idx="1">
+            <a:schemeClr val="accent1"/>
+          </a:fillRef>
+          <a:effectRef idx="0">
+            <a:schemeClr val="accent1"/>
+          </a:effectRef>
+          <a:fontRef idx="minor">
+            <a:schemeClr val="lt1"/>
+          </a:fontRef>
+        </p:style>
+        <p:txBody>
+          <a:bodyPr rtlCol="0" anchor="ctr"/>
+          <a:lstStyle/>
+          <a:p>
+            <a:pPr marL="285750" indent="-285750">
+              <a:buFont typeface="Arial" panose="020B0604020202020204" pitchFamily="34" charset="0"/>
+              <a:buChar char="•"/>
+            </a:pPr>
+            <a:r>
+              <a:rPr lang="pt-BR" dirty="0"/>
+              <a:t>Para as variáveis </a:t>
+            </a:r>
+            <a:r>
+              <a:rPr lang="pt-BR" dirty="0" err="1"/>
+              <a:t>Qtde</a:t>
+            </a:r>
+            <a:r>
+              <a:rPr lang="pt-BR" dirty="0"/>
+              <a:t> adiantamento e </a:t>
+            </a:r>
+            <a:r>
+              <a:rPr lang="pt-BR" dirty="0" err="1"/>
+              <a:t>Qtde</a:t>
+            </a:r>
+            <a:r>
+              <a:rPr lang="pt-BR" dirty="0"/>
+              <a:t> fonte de renda as correlações são menos expressivas</a:t>
+            </a:r>
+          </a:p>
+          <a:p>
+            <a:pPr marL="285750" indent="-285750">
+              <a:buFont typeface="Arial" panose="020B0604020202020204" pitchFamily="34" charset="0"/>
+              <a:buChar char="•"/>
+            </a:pPr>
+            <a:r>
+              <a:rPr lang="pt-BR" dirty="0"/>
+              <a:t>Um modelo auxiliar para corrigir os valores nulos será potencialmente menos preciso</a:t>
+            </a:r>
+          </a:p>
+        </p:txBody>
+      </p:sp>
+    </p:spTree>
+    <p:extLst>
+      <p:ext uri="{BB962C8B-B14F-4D97-AF65-F5344CB8AC3E}">
+        <p14:creationId xmlns:p14="http://schemas.microsoft.com/office/powerpoint/2010/main" val="1923640337"/>
+      </p:ext>
+    </p:extLst>
+  </p:cSld>
+  <p:clrMapOvr>
+    <a:masterClrMapping/>
+  </p:clrMapOvr>
+  <p:timing>
+    <p:tnLst>
+      <p:par>
+        <p:cTn id="1" dur="indefinite" restart="never" nodeType="tmRoot">
+          <p:childTnLst>
+            <p:seq concurrent="1" nextAc="seek">
+              <p:cTn id="2" dur="indefinite" nodeType="mainSeq">
+                <p:childTnLst>
+                  <p:par>
+                    <p:cTn id="3" fill="hold">
+                      <p:stCondLst>
+                        <p:cond delay="indefinite"/>
+                        <p:cond evt="onBegin" delay="0">
+                          <p:tn val="2"/>
+                        </p:cond>
+                      </p:stCondLst>
+                      <p:childTnLst>
+                        <p:par>
+                          <p:cTn id="4" fill="hold">
+                            <p:stCondLst>
+                              <p:cond delay="0"/>
+                            </p:stCondLst>
+                            <p:childTnLst>
+                              <p:par>
+                                <p:cTn id="5" presetID="1" presetClass="entr" presetSubtype="0" fill="hold" grpId="0" nodeType="withEffect">
+                                  <p:stCondLst>
+                                    <p:cond delay="0"/>
+                                  </p:stCondLst>
+                                  <p:childTnLst>
+                                    <p:set>
+                                      <p:cBhvr>
+                                        <p:cTn id="6" dur="1" fill="hold">
+                                          <p:stCondLst>
+                                            <p:cond delay="0"/>
+                                          </p:stCondLst>
+                                        </p:cTn>
+                                        <p:tgtEl>
+                                          <p:spTgt spid="5"/>
+                                        </p:tgtEl>
+                                        <p:attrNameLst>
+                                          <p:attrName>style.visibility</p:attrName>
+                                        </p:attrNameLst>
+                                      </p:cBhvr>
+                                      <p:to>
+                                        <p:strVal val="visible"/>
+                                      </p:to>
+                                    </p:set>
+                                  </p:childTnLst>
+                                </p:cTn>
+                              </p:par>
+                              <p:par>
+                                <p:cTn id="7" presetID="1" presetClass="entr" presetSubtype="0" fill="hold" grpId="0" nodeType="withEffect">
+                                  <p:stCondLst>
+                                    <p:cond delay="0"/>
+                                  </p:stCondLst>
+                                  <p:childTnLst>
+                                    <p:set>
+                                      <p:cBhvr>
+                                        <p:cTn id="8" dur="1" fill="hold">
+                                          <p:stCondLst>
+                                            <p:cond delay="0"/>
+                                          </p:stCondLst>
+                                        </p:cTn>
+                                        <p:tgtEl>
+                                          <p:spTgt spid="23"/>
+                                        </p:tgtEl>
+                                        <p:attrNameLst>
+                                          <p:attrName>style.visibility</p:attrName>
+                                        </p:attrNameLst>
+                                      </p:cBhvr>
+                                      <p:to>
+                                        <p:strVal val="visible"/>
+                                      </p:to>
+                                    </p:set>
+                                  </p:childTnLst>
+                                </p:cTn>
+                              </p:par>
+                            </p:childTnLst>
+                          </p:cTn>
+                        </p:par>
+                      </p:childTnLst>
+                    </p:cTn>
+                  </p:par>
+                </p:childTnLst>
+              </p:cTn>
+              <p:prevCondLst>
+                <p:cond evt="onPrev" delay="0">
+                  <p:tgtEl>
+                    <p:sldTgt/>
+                  </p:tgtEl>
+                </p:cond>
+              </p:prevCondLst>
+              <p:nextCondLst>
+                <p:cond evt="onNext" delay="0">
+                  <p:tgtEl>
+                    <p:sldTgt/>
+                  </p:tgtEl>
+                </p:cond>
+              </p:nextCondLst>
+            </p:seq>
+          </p:childTnLst>
+        </p:cTn>
+      </p:par>
+    </p:tnLst>
+    <p:bldLst>
+      <p:bldP spid="5" grpId="0" animBg="1"/>
+      <p:bldP spid="23" grpId="0" animBg="1"/>
+    </p:bldLst>
+  </p:timing>
+</p:sld>
+</file>
+
+<file path=ppt/slides/slide11.xml><?xml version="1.0" encoding="utf-8"?>
 <p:sld xmlns:a="http://schemas.openxmlformats.org/drawingml/2006/main" xmlns:r="http://schemas.openxmlformats.org/officeDocument/2006/relationships" xmlns:p="http://schemas.openxmlformats.org/presentationml/2006/main">
   <p:cSld>
     <p:spTree>
@@ -4649,7 +5222,7 @@
 </p:sld>
 </file>
 
-<file path=ppt/slides/slide11.xml><?xml version="1.0" encoding="utf-8"?>
+<file path=ppt/slides/slide12.xml><?xml version="1.0" encoding="utf-8"?>
 <p:sld xmlns:a="http://schemas.openxmlformats.org/drawingml/2006/main" xmlns:r="http://schemas.openxmlformats.org/officeDocument/2006/relationships" xmlns:p="http://schemas.openxmlformats.org/presentationml/2006/main">
   <p:cSld>
     <p:spTree>
@@ -5200,7 +5773,7 @@
 </p:sld>
 </file>
 
-<file path=ppt/slides/slide12.xml><?xml version="1.0" encoding="utf-8"?>
+<file path=ppt/slides/slide13.xml><?xml version="1.0" encoding="utf-8"?>
 <p:sld xmlns:a="http://schemas.openxmlformats.org/drawingml/2006/main" xmlns:r="http://schemas.openxmlformats.org/officeDocument/2006/relationships" xmlns:p="http://schemas.openxmlformats.org/presentationml/2006/main">
   <p:cSld>
     <p:spTree>
@@ -5628,7 +6201,7 @@
 </p:sld>
 </file>
 
-<file path=ppt/slides/slide13.xml><?xml version="1.0" encoding="utf-8"?>
+<file path=ppt/slides/slide14.xml><?xml version="1.0" encoding="utf-8"?>
 <p:sld xmlns:a="http://schemas.openxmlformats.org/drawingml/2006/main" xmlns:r="http://schemas.openxmlformats.org/officeDocument/2006/relationships" xmlns:p="http://schemas.openxmlformats.org/presentationml/2006/main">
   <p:cSld>
     <p:spTree>
@@ -6232,7 +6805,7 @@
 </p:sld>
 </file>
 
-<file path=ppt/slides/slide14.xml><?xml version="1.0" encoding="utf-8"?>
+<file path=ppt/slides/slide15.xml><?xml version="1.0" encoding="utf-8"?>
 <p:sld xmlns:a="http://schemas.openxmlformats.org/drawingml/2006/main" xmlns:r="http://schemas.openxmlformats.org/officeDocument/2006/relationships" xmlns:p="http://schemas.openxmlformats.org/presentationml/2006/main">
   <p:cSld>
     <p:spTree>
@@ -7021,7 +7594,7 @@
 </p:sld>
 </file>
 
-<file path=ppt/slides/slide15.xml><?xml version="1.0" encoding="utf-8"?>
+<file path=ppt/slides/slide16.xml><?xml version="1.0" encoding="utf-8"?>
 <p:sld xmlns:a="http://schemas.openxmlformats.org/drawingml/2006/main" xmlns:r="http://schemas.openxmlformats.org/officeDocument/2006/relationships" xmlns:p="http://schemas.openxmlformats.org/presentationml/2006/main">
   <p:cSld>
     <p:spTree>
@@ -7152,7 +7725,7 @@
 </p:sld>
 </file>
 
-<file path=ppt/slides/slide16.xml><?xml version="1.0" encoding="utf-8"?>
+<file path=ppt/slides/slide17.xml><?xml version="1.0" encoding="utf-8"?>
 <p:sld xmlns:a="http://schemas.openxmlformats.org/drawingml/2006/main" xmlns:r="http://schemas.openxmlformats.org/officeDocument/2006/relationships" xmlns:p="http://schemas.openxmlformats.org/presentationml/2006/main">
   <p:cSld>
     <p:spTree>
@@ -7222,15 +7795,15 @@
           <a:p>
             <a:r>
               <a:rPr lang="pt-BR" dirty="0"/>
-              <a:t>Usando a função </a:t>
+              <a:t>Com o </a:t>
             </a:r>
             <a:r>
               <a:rPr lang="pt-BR" dirty="0" err="1"/>
-              <a:t>describe</a:t>
+              <a:t>boxplot</a:t>
             </a:r>
             <a:r>
               <a:rPr lang="pt-BR" dirty="0"/>
-              <a:t>() podemos identificar a presença de possíveis outliers nos dados, em particular nos dados de renda mensal e valor de empréstimo (e seus correlatos)</a:t>
+              <a:t> podemos observar mais facilmente a distribuição dos possíveis outliers</a:t>
             </a:r>
           </a:p>
         </p:txBody>
@@ -7341,7 +7914,7 @@
         <p:spPr>
           <a:xfrm>
             <a:off x="8907432" y="2728623"/>
-            <a:ext cx="3161489" cy="1938992"/>
+            <a:ext cx="3161489" cy="3416320"/>
           </a:xfrm>
           <a:prstGeom prst="rect">
             <a:avLst/>
@@ -7418,7 +7991,57 @@
                   <a:schemeClr val="bg1"/>
                 </a:solidFill>
               </a:rPr>
-              <a:t>O valor do empréstimo (e suas correlatas) possuem mais outliers, no entanto um corte na faixa dos R$40k seria um corte de menos de 8% dos inputs</a:t>
+              <a:t>O valor do empréstimo (e suas correlatas) possuem mais possíveis outliers, no entanto um corte na faixa dos R$40k seria um corte de menos de 8% dos inputs</a:t>
+            </a:r>
+          </a:p>
+          <a:p>
+            <a:pPr marL="285750" indent="-285750">
+              <a:buFont typeface="Arial" panose="020B0604020202020204" pitchFamily="34" charset="0"/>
+              <a:buChar char="•"/>
+            </a:pPr>
+            <a:endParaRPr lang="pt-BR" sz="1200" dirty="0">
+              <a:solidFill>
+                <a:schemeClr val="bg1"/>
+              </a:solidFill>
+            </a:endParaRPr>
+          </a:p>
+          <a:p>
+            <a:pPr marL="285750" indent="-285750">
+              <a:buFont typeface="Arial" panose="020B0604020202020204" pitchFamily="34" charset="0"/>
+              <a:buChar char="•"/>
+            </a:pPr>
+            <a:r>
+              <a:rPr lang="pt-BR" sz="1200" dirty="0">
+                <a:solidFill>
+                  <a:schemeClr val="bg1"/>
+                </a:solidFill>
+              </a:rPr>
+              <a:t>Para Juros e multa a relação e corte foram similares aos estipulados para o valor do empréstimo</a:t>
+            </a:r>
+          </a:p>
+          <a:p>
+            <a:pPr marL="285750" indent="-285750">
+              <a:buFont typeface="Arial" panose="020B0604020202020204" pitchFamily="34" charset="0"/>
+              <a:buChar char="•"/>
+            </a:pPr>
+            <a:endParaRPr lang="pt-BR" sz="1200" dirty="0">
+              <a:solidFill>
+                <a:schemeClr val="bg1"/>
+              </a:solidFill>
+            </a:endParaRPr>
+          </a:p>
+          <a:p>
+            <a:pPr marL="285750" indent="-285750">
+              <a:buFont typeface="Arial" panose="020B0604020202020204" pitchFamily="34" charset="0"/>
+              <a:buChar char="•"/>
+            </a:pPr>
+            <a:r>
+              <a:rPr lang="pt-BR" sz="1200" dirty="0">
+                <a:solidFill>
+                  <a:schemeClr val="bg1"/>
+                </a:solidFill>
+              </a:rPr>
+              <a:t>Valor atualizado de empréstimo foi ignorado por ter dependência linear com as colunas valor empréstimo, juros e multa</a:t>
             </a:r>
           </a:p>
         </p:txBody>
@@ -7483,7 +8106,7 @@
 </p:sld>
 </file>
 
-<file path=ppt/slides/slide17.xml><?xml version="1.0" encoding="utf-8"?>
+<file path=ppt/slides/slide18.xml><?xml version="1.0" encoding="utf-8"?>
 <p:sld xmlns:a="http://schemas.openxmlformats.org/drawingml/2006/main" xmlns:r="http://schemas.openxmlformats.org/officeDocument/2006/relationships" xmlns:p="http://schemas.openxmlformats.org/presentationml/2006/main">
   <p:cSld>
     <p:spTree>
@@ -7502,6 +8125,108 @@
       </p:grpSpPr>
       <p:sp>
         <p:nvSpPr>
+          <p:cNvPr id="8" name="Rectangle 5">
+            <a:extLst>
+              <a:ext uri="{FF2B5EF4-FFF2-40B4-BE49-F238E27FC236}">
+                <a16:creationId xmlns:a16="http://schemas.microsoft.com/office/drawing/2014/main" id="{7B58B58E-A563-4839-BFED-35058CA00F0B}"/>
+              </a:ext>
+            </a:extLst>
+          </p:cNvPr>
+          <p:cNvSpPr/>
+          <p:nvPr/>
+        </p:nvSpPr>
+        <p:spPr>
+          <a:xfrm>
+            <a:off x="8879" y="2025271"/>
+            <a:ext cx="8498594" cy="3916114"/>
+          </a:xfrm>
+          <a:prstGeom prst="rect">
+            <a:avLst/>
+          </a:prstGeom>
+          <a:solidFill>
+            <a:schemeClr val="bg1">
+              <a:lumMod val="65000"/>
+              <a:alpha val="48000"/>
+            </a:schemeClr>
+          </a:solidFill>
+          <a:ln w="0">
+            <a:noFill/>
+          </a:ln>
+        </p:spPr>
+        <p:style>
+          <a:lnRef idx="2">
+            <a:schemeClr val="accent1">
+              <a:shade val="50000"/>
+            </a:schemeClr>
+          </a:lnRef>
+          <a:fillRef idx="1">
+            <a:schemeClr val="accent1"/>
+          </a:fillRef>
+          <a:effectRef idx="0">
+            <a:schemeClr val="accent1"/>
+          </a:effectRef>
+          <a:fontRef idx="minor">
+            <a:schemeClr val="lt1"/>
+          </a:fontRef>
+        </p:style>
+        <p:txBody>
+          <a:bodyPr rtlCol="0" anchor="ctr"/>
+          <a:lstStyle/>
+          <a:p>
+            <a:pPr algn="r"/>
+            <a:endParaRPr lang="pt-BR"/>
+          </a:p>
+        </p:txBody>
+      </p:sp>
+      <p:pic>
+        <p:nvPicPr>
+          <p:cNvPr id="1026" name="Picture 2">
+            <a:extLst>
+              <a:ext uri="{FF2B5EF4-FFF2-40B4-BE49-F238E27FC236}">
+                <a16:creationId xmlns:a16="http://schemas.microsoft.com/office/drawing/2014/main" id="{8DE0C385-1571-40F3-927B-1DF3369E9038}"/>
+              </a:ext>
+            </a:extLst>
+          </p:cNvPr>
+          <p:cNvPicPr>
+            <a:picLocks noChangeAspect="1" noChangeArrowheads="1"/>
+          </p:cNvPicPr>
+          <p:nvPr/>
+        </p:nvPicPr>
+        <p:blipFill>
+          <a:blip r:embed="rId2">
+            <a:extLst>
+              <a:ext uri="{28A0092B-C50C-407E-A947-70E740481C1C}">
+                <a14:useLocalDpi xmlns:a14="http://schemas.microsoft.com/office/drawing/2010/main" val="0"/>
+              </a:ext>
+            </a:extLst>
+          </a:blip>
+          <a:srcRect/>
+          <a:stretch>
+            <a:fillRect/>
+          </a:stretch>
+        </p:blipFill>
+        <p:spPr bwMode="auto">
+          <a:xfrm>
+            <a:off x="-578160" y="1435399"/>
+            <a:ext cx="9124545" cy="4525440"/>
+          </a:xfrm>
+          <a:prstGeom prst="rect">
+            <a:avLst/>
+          </a:prstGeom>
+          <a:noFill/>
+          <a:extLst>
+            <a:ext uri="{909E8E84-426E-40DD-AFC4-6F175D3DCCD1}">
+              <a14:hiddenFill xmlns:a14="http://schemas.microsoft.com/office/drawing/2010/main">
+                <a:solidFill>
+                  <a:srgbClr val="FFFFFF"/>
+                </a:solidFill>
+              </a14:hiddenFill>
+            </a:ext>
+          </a:extLst>
+        </p:spPr>
+      </p:pic>
+      <p:sp>
+        <p:nvSpPr>
           <p:cNvPr id="2" name="Title 1">
             <a:extLst>
               <a:ext uri="{FF2B5EF4-FFF2-40B4-BE49-F238E27FC236}">
@@ -7525,7 +8250,7 @@
           <a:p>
             <a:r>
               <a:rPr lang="pt-BR" dirty="0"/>
-              <a:t>MODELAGEM</a:t>
+              <a:t>OUTLIERS</a:t>
             </a:r>
           </a:p>
         </p:txBody>
@@ -7546,6 +8271,228 @@
             <p:ph type="body" sz="quarter" idx="10"/>
           </p:nvPr>
         </p:nvSpPr>
+        <p:spPr/>
+        <p:txBody>
+          <a:bodyPr/>
+          <a:lstStyle/>
+          <a:p>
+            <a:r>
+              <a:rPr lang="pt-BR" dirty="0"/>
+              <a:t>Analisando mais a fundo a relação do valor do empréstimo e os valores de juros e multas podemos observar uma relação quase linear (com algumas exceções) e, portanto esperada</a:t>
+            </a:r>
+          </a:p>
+        </p:txBody>
+      </p:sp>
+      <p:pic>
+        <p:nvPicPr>
+          <p:cNvPr id="11" name="Imagem 10">
+            <a:extLst>
+              <a:ext uri="{FF2B5EF4-FFF2-40B4-BE49-F238E27FC236}">
+                <a16:creationId xmlns:a16="http://schemas.microsoft.com/office/drawing/2014/main" id="{301D411C-7DC6-47F6-947D-2C5A76956F98}"/>
+              </a:ext>
+            </a:extLst>
+          </p:cNvPr>
+          <p:cNvPicPr>
+            <a:picLocks noChangeAspect="1"/>
+          </p:cNvPicPr>
+          <p:nvPr/>
+        </p:nvPicPr>
+        <p:blipFill>
+          <a:blip r:embed="rId3">
+            <a:extLst>
+              <a:ext uri="{28A0092B-C50C-407E-A947-70E740481C1C}">
+                <a14:useLocalDpi xmlns:a14="http://schemas.microsoft.com/office/drawing/2010/main" val="0"/>
+              </a:ext>
+            </a:extLst>
+          </a:blip>
+          <a:stretch>
+            <a:fillRect/>
+          </a:stretch>
+        </p:blipFill>
+        <p:spPr>
+          <a:xfrm rot="19152625" flipH="1" flipV="1">
+            <a:off x="8649695" y="2293286"/>
+            <a:ext cx="736365" cy="736365"/>
+          </a:xfrm>
+          <a:prstGeom prst="rect">
+            <a:avLst/>
+          </a:prstGeom>
+        </p:spPr>
+      </p:pic>
+      <p:sp>
+        <p:nvSpPr>
+          <p:cNvPr id="12" name="CaixaDeTexto 11">
+            <a:extLst>
+              <a:ext uri="{FF2B5EF4-FFF2-40B4-BE49-F238E27FC236}">
+                <a16:creationId xmlns:a16="http://schemas.microsoft.com/office/drawing/2014/main" id="{EC65C331-36BD-4F7F-B5CA-D6B9FD8EB187}"/>
+              </a:ext>
+            </a:extLst>
+          </p:cNvPr>
+          <p:cNvSpPr txBox="1"/>
+          <p:nvPr/>
+        </p:nvSpPr>
+        <p:spPr>
+          <a:xfrm>
+            <a:off x="8907432" y="2728623"/>
+            <a:ext cx="3161489" cy="2862322"/>
+          </a:xfrm>
+          <a:prstGeom prst="rect">
+            <a:avLst/>
+          </a:prstGeom>
+          <a:noFill/>
+          <a:ln>
+            <a:solidFill>
+              <a:srgbClr val="EA4F3E"/>
+            </a:solidFill>
+          </a:ln>
+        </p:spPr>
+        <p:txBody>
+          <a:bodyPr wrap="square" rtlCol="0">
+            <a:spAutoFit/>
+          </a:bodyPr>
+          <a:lstStyle/>
+          <a:p>
+            <a:pPr marL="285750" indent="-285750">
+              <a:buFont typeface="Arial" panose="020B0604020202020204" pitchFamily="34" charset="0"/>
+              <a:buChar char="•"/>
+            </a:pPr>
+            <a:r>
+              <a:rPr lang="pt-BR" sz="1200" dirty="0">
+                <a:solidFill>
+                  <a:schemeClr val="bg1"/>
+                </a:solidFill>
+              </a:rPr>
+              <a:t>Caso seja observado que os valores muito altos de juros, multas e valor de empréstimo pode-se retirar com os cortes previamente observados</a:t>
+            </a:r>
+          </a:p>
+          <a:p>
+            <a:pPr marL="285750" indent="-285750">
+              <a:buFont typeface="Arial" panose="020B0604020202020204" pitchFamily="34" charset="0"/>
+              <a:buChar char="•"/>
+            </a:pPr>
+            <a:endParaRPr lang="pt-BR" sz="1200" dirty="0">
+              <a:solidFill>
+                <a:schemeClr val="bg1"/>
+              </a:solidFill>
+            </a:endParaRPr>
+          </a:p>
+          <a:p>
+            <a:pPr marL="285750" indent="-285750">
+              <a:buFont typeface="Arial" panose="020B0604020202020204" pitchFamily="34" charset="0"/>
+              <a:buChar char="•"/>
+            </a:pPr>
+            <a:r>
+              <a:rPr lang="pt-BR" sz="1200" dirty="0">
+                <a:solidFill>
+                  <a:schemeClr val="bg1"/>
+                </a:solidFill>
+              </a:rPr>
+              <a:t>Outra opção para tratamento dos dados seria o cálculo da taxa percentual de juros e multas e estabelecer um valor mínimo e máximo de corte com base no conhecimento de negócio</a:t>
+            </a:r>
+          </a:p>
+          <a:p>
+            <a:pPr marL="285750" indent="-285750">
+              <a:buFont typeface="Arial" panose="020B0604020202020204" pitchFamily="34" charset="0"/>
+              <a:buChar char="•"/>
+            </a:pPr>
+            <a:endParaRPr lang="pt-BR" sz="1200" dirty="0">
+              <a:solidFill>
+                <a:schemeClr val="bg1"/>
+              </a:solidFill>
+            </a:endParaRPr>
+          </a:p>
+          <a:p>
+            <a:pPr marL="285750" indent="-285750">
+              <a:buFont typeface="Arial" panose="020B0604020202020204" pitchFamily="34" charset="0"/>
+              <a:buChar char="•"/>
+            </a:pPr>
+            <a:r>
+              <a:rPr lang="pt-BR" sz="1200" dirty="0">
+                <a:solidFill>
+                  <a:schemeClr val="bg1"/>
+                </a:solidFill>
+              </a:rPr>
+              <a:t>No entanto, no teste feito, como a relação entre as variáveis era próxima a esperada o resultado do modelo foi melhorado com a presença dos “outliers”</a:t>
+            </a:r>
+          </a:p>
+        </p:txBody>
+      </p:sp>
+    </p:spTree>
+    <p:extLst>
+      <p:ext uri="{BB962C8B-B14F-4D97-AF65-F5344CB8AC3E}">
+        <p14:creationId xmlns:p14="http://schemas.microsoft.com/office/powerpoint/2010/main" val="2662883569"/>
+      </p:ext>
+    </p:extLst>
+  </p:cSld>
+  <p:clrMapOvr>
+    <a:masterClrMapping/>
+  </p:clrMapOvr>
+</p:sld>
+</file>
+
+<file path=ppt/slides/slide19.xml><?xml version="1.0" encoding="utf-8"?>
+<p:sld xmlns:a="http://schemas.openxmlformats.org/drawingml/2006/main" xmlns:r="http://schemas.openxmlformats.org/officeDocument/2006/relationships" xmlns:p="http://schemas.openxmlformats.org/presentationml/2006/main">
+  <p:cSld>
+    <p:spTree>
+      <p:nvGrpSpPr>
+        <p:cNvPr id="1" name=""/>
+        <p:cNvGrpSpPr/>
+        <p:nvPr/>
+      </p:nvGrpSpPr>
+      <p:grpSpPr>
+        <a:xfrm>
+          <a:off x="0" y="0"/>
+          <a:ext cx="0" cy="0"/>
+          <a:chOff x="0" y="0"/>
+          <a:chExt cx="0" cy="0"/>
+        </a:xfrm>
+      </p:grpSpPr>
+      <p:sp>
+        <p:nvSpPr>
+          <p:cNvPr id="2" name="Title 1">
+            <a:extLst>
+              <a:ext uri="{FF2B5EF4-FFF2-40B4-BE49-F238E27FC236}">
+                <a16:creationId xmlns:a16="http://schemas.microsoft.com/office/drawing/2014/main" id="{42E47C92-7214-4014-81C1-8D18678ACA3C}"/>
+              </a:ext>
+            </a:extLst>
+          </p:cNvPr>
+          <p:cNvSpPr>
+            <a:spLocks noGrp="1"/>
+          </p:cNvSpPr>
+          <p:nvPr>
+            <p:ph type="title"/>
+          </p:nvPr>
+        </p:nvSpPr>
+        <p:spPr/>
+        <p:txBody>
+          <a:bodyPr>
+            <a:normAutofit fontScale="90000"/>
+          </a:bodyPr>
+          <a:lstStyle/>
+          <a:p>
+            <a:r>
+              <a:rPr lang="pt-BR" dirty="0"/>
+              <a:t>MODELAGEM</a:t>
+            </a:r>
+          </a:p>
+        </p:txBody>
+      </p:sp>
+      <p:sp>
+        <p:nvSpPr>
+          <p:cNvPr id="3" name="Text Placeholder 2">
+            <a:extLst>
+              <a:ext uri="{FF2B5EF4-FFF2-40B4-BE49-F238E27FC236}">
+                <a16:creationId xmlns:a16="http://schemas.microsoft.com/office/drawing/2014/main" id="{5BA0068A-B971-486A-AD27-01FE70D39325}"/>
+              </a:ext>
+            </a:extLst>
+          </p:cNvPr>
+          <p:cNvSpPr>
+            <a:spLocks noGrp="1"/>
+          </p:cNvSpPr>
+          <p:nvPr>
+            <p:ph type="body" sz="quarter" idx="10"/>
+          </p:nvPr>
+        </p:nvSpPr>
         <p:spPr>
           <a:xfrm>
             <a:off x="692150" y="782346"/>
@@ -7589,7 +8536,7 @@
           <p:nvPr>
             <p:extLst>
               <p:ext uri="{D42A27DB-BD31-4B8C-83A1-F6EECF244321}">
-                <p14:modId xmlns:p14="http://schemas.microsoft.com/office/powerpoint/2010/main" val="1651432971"/>
+                <p14:modId xmlns:p14="http://schemas.microsoft.com/office/powerpoint/2010/main" val="1725843337"/>
               </p:ext>
             </p:extLst>
           </p:nvPr>
@@ -7856,8 +8803,14 @@
                     <a:lnT w="38100" cmpd="sng">
                       <a:noFill/>
                     </a:lnT>
-                    <a:lnB w="12700" cmpd="sng">
-                      <a:noFill/>
+                    <a:lnB w="12700" cap="flat" cmpd="sng" algn="ctr">
+                      <a:solidFill>
+                        <a:schemeClr val="tx1"/>
+                      </a:solidFill>
+                      <a:prstDash val="solid"/>
+                      <a:round/>
+                      <a:headEnd type="none" w="med" len="med"/>
+                      <a:tailEnd type="none" w="med" len="med"/>
                     </a:lnB>
                     <a:lnTlToBr w="12700" cmpd="sng">
                       <a:noFill/>
@@ -7898,8 +8851,14 @@
                     <a:lnT w="38100" cmpd="sng">
                       <a:noFill/>
                     </a:lnT>
-                    <a:lnB w="12700" cmpd="sng">
-                      <a:noFill/>
+                    <a:lnB w="12700" cap="flat" cmpd="sng" algn="ctr">
+                      <a:solidFill>
+                        <a:schemeClr val="tx1"/>
+                      </a:solidFill>
+                      <a:prstDash val="solid"/>
+                      <a:round/>
+                      <a:headEnd type="none" w="med" len="med"/>
+                      <a:tailEnd type="none" w="med" len="med"/>
                     </a:lnB>
                     <a:lnTlToBr w="12700" cmpd="sng">
                       <a:noFill/>
@@ -7983,8 +8942,14 @@
                     <a:lnL w="12700" cmpd="sng">
                       <a:noFill/>
                     </a:lnL>
-                    <a:lnR w="12700" cmpd="sng">
-                      <a:noFill/>
+                    <a:lnR w="12700" cap="flat" cmpd="sng" algn="ctr">
+                      <a:solidFill>
+                        <a:schemeClr val="tx1"/>
+                      </a:solidFill>
+                      <a:prstDash val="solid"/>
+                      <a:round/>
+                      <a:headEnd type="none" w="med" len="med"/>
+                      <a:tailEnd type="none" w="med" len="med"/>
                     </a:lnR>
                     <a:lnT w="12700" cmpd="sng">
                       <a:noFill/>
@@ -8018,12 +8983,42 @@
                     </a:p>
                   </a:txBody>
                   <a:tcPr marL="90874" marR="90874" marT="45437" marB="45437" anchor="ctr">
-                    <a:lnL w="12700" cmpd="sng">
-                      <a:noFill/>
+                    <a:lnL w="12700" cap="flat" cmpd="sng" algn="ctr">
+                      <a:solidFill>
+                        <a:schemeClr val="tx1"/>
+                      </a:solidFill>
+                      <a:prstDash val="solid"/>
+                      <a:round/>
+                      <a:headEnd type="none" w="med" len="med"/>
+                      <a:tailEnd type="none" w="med" len="med"/>
                     </a:lnL>
-                    <a:lnT w="12700" cmpd="sng">
-                      <a:noFill/>
+                    <a:lnR w="12700" cap="flat" cmpd="sng" algn="ctr">
+                      <a:solidFill>
+                        <a:schemeClr val="tx1"/>
+                      </a:solidFill>
+                      <a:prstDash val="solid"/>
+                      <a:round/>
+                      <a:headEnd type="none" w="med" len="med"/>
+                      <a:tailEnd type="none" w="med" len="med"/>
+                    </a:lnR>
+                    <a:lnT w="12700" cap="flat" cmpd="sng" algn="ctr">
+                      <a:solidFill>
+                        <a:schemeClr val="tx1"/>
+                      </a:solidFill>
+                      <a:prstDash val="solid"/>
+                      <a:round/>
+                      <a:headEnd type="none" w="med" len="med"/>
+                      <a:tailEnd type="none" w="med" len="med"/>
                     </a:lnT>
+                    <a:lnB w="12700" cap="flat" cmpd="sng" algn="ctr">
+                      <a:solidFill>
+                        <a:schemeClr val="tx1"/>
+                      </a:solidFill>
+                      <a:prstDash val="solid"/>
+                      <a:round/>
+                      <a:headEnd type="none" w="med" len="med"/>
+                      <a:tailEnd type="none" w="med" len="med"/>
+                    </a:lnB>
                     <a:solidFill>
                       <a:schemeClr val="bg1">
                         <a:lumMod val="65000"/>
@@ -8044,9 +9039,42 @@
                     </a:p>
                   </a:txBody>
                   <a:tcPr marL="90874" marR="90874" marT="45437" marB="45437" anchor="ctr">
-                    <a:lnT w="12700" cmpd="sng">
-                      <a:noFill/>
+                    <a:lnL w="12700" cap="flat" cmpd="sng" algn="ctr">
+                      <a:solidFill>
+                        <a:schemeClr val="tx1"/>
+                      </a:solidFill>
+                      <a:prstDash val="solid"/>
+                      <a:round/>
+                      <a:headEnd type="none" w="med" len="med"/>
+                      <a:tailEnd type="none" w="med" len="med"/>
+                    </a:lnL>
+                    <a:lnR w="12700" cap="flat" cmpd="sng" algn="ctr">
+                      <a:solidFill>
+                        <a:schemeClr val="tx1"/>
+                      </a:solidFill>
+                      <a:prstDash val="solid"/>
+                      <a:round/>
+                      <a:headEnd type="none" w="med" len="med"/>
+                      <a:tailEnd type="none" w="med" len="med"/>
+                    </a:lnR>
+                    <a:lnT w="12700" cap="flat" cmpd="sng" algn="ctr">
+                      <a:solidFill>
+                        <a:schemeClr val="tx1"/>
+                      </a:solidFill>
+                      <a:prstDash val="solid"/>
+                      <a:round/>
+                      <a:headEnd type="none" w="med" len="med"/>
+                      <a:tailEnd type="none" w="med" len="med"/>
                     </a:lnT>
+                    <a:lnB w="12700" cap="flat" cmpd="sng" algn="ctr">
+                      <a:solidFill>
+                        <a:schemeClr val="tx1"/>
+                      </a:solidFill>
+                      <a:prstDash val="solid"/>
+                      <a:round/>
+                      <a:headEnd type="none" w="med" len="med"/>
+                      <a:tailEnd type="none" w="med" len="med"/>
+                    </a:lnB>
                     <a:solidFill>
                       <a:schemeClr val="bg1">
                         <a:lumMod val="65000"/>
@@ -8091,8 +9119,14 @@
                     <a:lnL w="12700" cmpd="sng">
                       <a:noFill/>
                     </a:lnL>
-                    <a:lnR w="12700" cmpd="sng">
-                      <a:noFill/>
+                    <a:lnR w="12700" cap="flat" cmpd="sng" algn="ctr">
+                      <a:solidFill>
+                        <a:schemeClr val="tx1"/>
+                      </a:solidFill>
+                      <a:prstDash val="solid"/>
+                      <a:round/>
+                      <a:headEnd type="none" w="med" len="med"/>
+                      <a:tailEnd type="none" w="med" len="med"/>
                     </a:lnR>
                     <a:lnT w="12700" cmpd="sng">
                       <a:noFill/>
@@ -8126,9 +9160,42 @@
                     </a:p>
                   </a:txBody>
                   <a:tcPr marL="90874" marR="90874" marT="45437" marB="45437" anchor="ctr">
-                    <a:lnL w="12700" cmpd="sng">
-                      <a:noFill/>
+                    <a:lnL w="12700" cap="flat" cmpd="sng" algn="ctr">
+                      <a:solidFill>
+                        <a:schemeClr val="tx1"/>
+                      </a:solidFill>
+                      <a:prstDash val="solid"/>
+                      <a:round/>
+                      <a:headEnd type="none" w="med" len="med"/>
+                      <a:tailEnd type="none" w="med" len="med"/>
                     </a:lnL>
+                    <a:lnR w="12700" cap="flat" cmpd="sng" algn="ctr">
+                      <a:solidFill>
+                        <a:schemeClr val="tx1"/>
+                      </a:solidFill>
+                      <a:prstDash val="solid"/>
+                      <a:round/>
+                      <a:headEnd type="none" w="med" len="med"/>
+                      <a:tailEnd type="none" w="med" len="med"/>
+                    </a:lnR>
+                    <a:lnT w="12700" cap="flat" cmpd="sng" algn="ctr">
+                      <a:solidFill>
+                        <a:schemeClr val="tx1"/>
+                      </a:solidFill>
+                      <a:prstDash val="solid"/>
+                      <a:round/>
+                      <a:headEnd type="none" w="med" len="med"/>
+                      <a:tailEnd type="none" w="med" len="med"/>
+                    </a:lnT>
+                    <a:lnB w="12700" cap="flat" cmpd="sng" algn="ctr">
+                      <a:solidFill>
+                        <a:schemeClr val="tx1"/>
+                      </a:solidFill>
+                      <a:prstDash val="solid"/>
+                      <a:round/>
+                      <a:headEnd type="none" w="med" len="med"/>
+                      <a:tailEnd type="none" w="med" len="med"/>
+                    </a:lnB>
                     <a:solidFill>
                       <a:schemeClr val="bg1">
                         <a:lumMod val="65000"/>
@@ -8149,6 +9216,42 @@
                     </a:p>
                   </a:txBody>
                   <a:tcPr marL="90874" marR="90874" marT="45437" marB="45437" anchor="ctr">
+                    <a:lnL w="12700" cap="flat" cmpd="sng" algn="ctr">
+                      <a:solidFill>
+                        <a:schemeClr val="tx1"/>
+                      </a:solidFill>
+                      <a:prstDash val="solid"/>
+                      <a:round/>
+                      <a:headEnd type="none" w="med" len="med"/>
+                      <a:tailEnd type="none" w="med" len="med"/>
+                    </a:lnL>
+                    <a:lnR w="12700" cap="flat" cmpd="sng" algn="ctr">
+                      <a:solidFill>
+                        <a:schemeClr val="tx1"/>
+                      </a:solidFill>
+                      <a:prstDash val="solid"/>
+                      <a:round/>
+                      <a:headEnd type="none" w="med" len="med"/>
+                      <a:tailEnd type="none" w="med" len="med"/>
+                    </a:lnR>
+                    <a:lnT w="12700" cap="flat" cmpd="sng" algn="ctr">
+                      <a:solidFill>
+                        <a:schemeClr val="tx1"/>
+                      </a:solidFill>
+                      <a:prstDash val="solid"/>
+                      <a:round/>
+                      <a:headEnd type="none" w="med" len="med"/>
+                      <a:tailEnd type="none" w="med" len="med"/>
+                    </a:lnT>
+                    <a:lnB w="12700" cap="flat" cmpd="sng" algn="ctr">
+                      <a:solidFill>
+                        <a:schemeClr val="tx1"/>
+                      </a:solidFill>
+                      <a:prstDash val="solid"/>
+                      <a:round/>
+                      <a:headEnd type="none" w="med" len="med"/>
+                      <a:tailEnd type="none" w="med" len="med"/>
+                    </a:lnB>
                     <a:solidFill>
                       <a:schemeClr val="bg1">
                         <a:lumMod val="65000"/>
@@ -8295,21 +9398,8 @@
                   <a:schemeClr val="bg1"/>
                 </a:solidFill>
               </a:rPr>
-              <a:t> ou também a modelagem das variáveis com valores </a:t>
-            </a:r>
-            <a:r>
-              <a:rPr lang="pt-BR" dirty="0" err="1">
-                <a:solidFill>
-                  <a:schemeClr val="bg1"/>
-                </a:solidFill>
-              </a:rPr>
-              <a:t>nuçps</a:t>
-            </a:r>
-            <a:endParaRPr lang="pt-BR" dirty="0">
-              <a:solidFill>
-                <a:schemeClr val="bg1"/>
-              </a:solidFill>
-            </a:endParaRPr>
+              <a:t> ou também a modelagem das variáveis com valores nulos</a:t>
+            </a:r>
           </a:p>
         </p:txBody>
       </p:sp>
@@ -8326,7 +9416,739 @@
 </p:sld>
 </file>
 
-<file path=ppt/slides/slide18.xml><?xml version="1.0" encoding="utf-8"?>
+<file path=ppt/slides/slide2.xml><?xml version="1.0" encoding="utf-8"?>
+<p:sld xmlns:a="http://schemas.openxmlformats.org/drawingml/2006/main" xmlns:r="http://schemas.openxmlformats.org/officeDocument/2006/relationships" xmlns:p="http://schemas.openxmlformats.org/presentationml/2006/main">
+  <p:cSld>
+    <p:spTree>
+      <p:nvGrpSpPr>
+        <p:cNvPr id="1" name=""/>
+        <p:cNvGrpSpPr/>
+        <p:nvPr/>
+      </p:nvGrpSpPr>
+      <p:grpSpPr>
+        <a:xfrm>
+          <a:off x="0" y="0"/>
+          <a:ext cx="0" cy="0"/>
+          <a:chOff x="0" y="0"/>
+          <a:chExt cx="0" cy="0"/>
+        </a:xfrm>
+      </p:grpSpPr>
+      <p:sp>
+        <p:nvSpPr>
+          <p:cNvPr id="2" name="Título 1">
+            <a:extLst>
+              <a:ext uri="{FF2B5EF4-FFF2-40B4-BE49-F238E27FC236}">
+                <a16:creationId xmlns:a16="http://schemas.microsoft.com/office/drawing/2014/main" id="{4E9A574B-4711-4751-B6C0-BD8EEE3AE7B1}"/>
+              </a:ext>
+            </a:extLst>
+          </p:cNvPr>
+          <p:cNvSpPr>
+            <a:spLocks noGrp="1"/>
+          </p:cNvSpPr>
+          <p:nvPr>
+            <p:ph type="title"/>
+          </p:nvPr>
+        </p:nvSpPr>
+        <p:spPr/>
+        <p:txBody>
+          <a:bodyPr>
+            <a:normAutofit fontScale="90000"/>
+          </a:bodyPr>
+          <a:lstStyle/>
+          <a:p>
+            <a:r>
+              <a:rPr lang="pt-BR" dirty="0"/>
+              <a:t>AGENDA</a:t>
+            </a:r>
+          </a:p>
+        </p:txBody>
+      </p:sp>
+      <p:grpSp>
+        <p:nvGrpSpPr>
+          <p:cNvPr id="30" name="Agrupar 29">
+            <a:extLst>
+              <a:ext uri="{FF2B5EF4-FFF2-40B4-BE49-F238E27FC236}">
+                <a16:creationId xmlns:a16="http://schemas.microsoft.com/office/drawing/2014/main" id="{669CCEA5-955A-4C29-9D1D-C100E6E3D956}"/>
+              </a:ext>
+            </a:extLst>
+          </p:cNvPr>
+          <p:cNvGrpSpPr/>
+          <p:nvPr/>
+        </p:nvGrpSpPr>
+        <p:grpSpPr>
+          <a:xfrm>
+            <a:off x="506026" y="1447060"/>
+            <a:ext cx="3813114" cy="488046"/>
+            <a:chOff x="506026" y="1447060"/>
+            <a:chExt cx="3813114" cy="488046"/>
+          </a:xfrm>
+        </p:grpSpPr>
+        <p:sp>
+          <p:nvSpPr>
+            <p:cNvPr id="4" name="Seta: Pentágono 3">
+              <a:extLst>
+                <a:ext uri="{FF2B5EF4-FFF2-40B4-BE49-F238E27FC236}">
+                  <a16:creationId xmlns:a16="http://schemas.microsoft.com/office/drawing/2014/main" id="{BEE356B0-8183-49A1-B5B7-807BA47CA693}"/>
+                </a:ext>
+              </a:extLst>
+            </p:cNvPr>
+            <p:cNvSpPr/>
+            <p:nvPr/>
+          </p:nvSpPr>
+          <p:spPr>
+            <a:xfrm>
+              <a:off x="506026" y="1447060"/>
+              <a:ext cx="1136343" cy="484632"/>
+            </a:xfrm>
+            <a:prstGeom prst="homePlate">
+              <a:avLst/>
+            </a:prstGeom>
+            <a:solidFill>
+              <a:srgbClr val="EA4F3E"/>
+            </a:solidFill>
+            <a:ln>
+              <a:noFill/>
+            </a:ln>
+          </p:spPr>
+          <p:style>
+            <a:lnRef idx="2">
+              <a:schemeClr val="accent1">
+                <a:shade val="50000"/>
+              </a:schemeClr>
+            </a:lnRef>
+            <a:fillRef idx="1">
+              <a:schemeClr val="accent1"/>
+            </a:fillRef>
+            <a:effectRef idx="0">
+              <a:schemeClr val="accent1"/>
+            </a:effectRef>
+            <a:fontRef idx="minor">
+              <a:schemeClr val="lt1"/>
+            </a:fontRef>
+          </p:style>
+          <p:txBody>
+            <a:bodyPr rtlCol="0" anchor="ctr"/>
+            <a:lstStyle/>
+            <a:p>
+              <a:pPr algn="ctr"/>
+              <a:endParaRPr lang="pt-BR"/>
+            </a:p>
+          </p:txBody>
+        </p:sp>
+        <p:sp>
+          <p:nvSpPr>
+            <p:cNvPr id="5" name="Seta: Divisa 4">
+              <a:extLst>
+                <a:ext uri="{FF2B5EF4-FFF2-40B4-BE49-F238E27FC236}">
+                  <a16:creationId xmlns:a16="http://schemas.microsoft.com/office/drawing/2014/main" id="{80933C8E-B8C9-41CB-9F57-E68902FB33DB}"/>
+                </a:ext>
+              </a:extLst>
+            </p:cNvPr>
+            <p:cNvSpPr/>
+            <p:nvPr/>
+          </p:nvSpPr>
+          <p:spPr>
+            <a:xfrm>
+              <a:off x="1642369" y="1450474"/>
+              <a:ext cx="484632" cy="484632"/>
+            </a:xfrm>
+            <a:prstGeom prst="chevron">
+              <a:avLst/>
+            </a:prstGeom>
+            <a:solidFill>
+              <a:srgbClr val="EA4F3E"/>
+            </a:solidFill>
+            <a:ln>
+              <a:noFill/>
+            </a:ln>
+          </p:spPr>
+          <p:style>
+            <a:lnRef idx="2">
+              <a:schemeClr val="accent1">
+                <a:shade val="50000"/>
+              </a:schemeClr>
+            </a:lnRef>
+            <a:fillRef idx="1">
+              <a:schemeClr val="accent1"/>
+            </a:fillRef>
+            <a:effectRef idx="0">
+              <a:schemeClr val="accent1"/>
+            </a:effectRef>
+            <a:fontRef idx="minor">
+              <a:schemeClr val="lt1"/>
+            </a:fontRef>
+          </p:style>
+          <p:txBody>
+            <a:bodyPr rtlCol="0" anchor="ctr"/>
+            <a:lstStyle/>
+            <a:p>
+              <a:pPr algn="ctr"/>
+              <a:endParaRPr lang="pt-BR">
+                <a:solidFill>
+                  <a:schemeClr val="tx1"/>
+                </a:solidFill>
+              </a:endParaRPr>
+            </a:p>
+          </p:txBody>
+        </p:sp>
+        <p:sp>
+          <p:nvSpPr>
+            <p:cNvPr id="6" name="CaixaDeTexto 5">
+              <a:extLst>
+                <a:ext uri="{FF2B5EF4-FFF2-40B4-BE49-F238E27FC236}">
+                  <a16:creationId xmlns:a16="http://schemas.microsoft.com/office/drawing/2014/main" id="{E88E37D0-14A9-43D1-9F49-B63FCCEE8B38}"/>
+                </a:ext>
+              </a:extLst>
+            </p:cNvPr>
+            <p:cNvSpPr txBox="1"/>
+            <p:nvPr/>
+          </p:nvSpPr>
+          <p:spPr>
+            <a:xfrm>
+              <a:off x="2127001" y="1467065"/>
+              <a:ext cx="2192139" cy="461665"/>
+            </a:xfrm>
+            <a:prstGeom prst="rect">
+              <a:avLst/>
+            </a:prstGeom>
+            <a:noFill/>
+          </p:spPr>
+          <p:txBody>
+            <a:bodyPr wrap="none" rtlCol="0">
+              <a:spAutoFit/>
+            </a:bodyPr>
+            <a:lstStyle/>
+            <a:p>
+              <a:r>
+                <a:rPr lang="pt-BR" sz="2400" dirty="0">
+                  <a:solidFill>
+                    <a:schemeClr val="bg1"/>
+                  </a:solidFill>
+                </a:rPr>
+                <a:t>BASE DE DADOS</a:t>
+              </a:r>
+            </a:p>
+          </p:txBody>
+        </p:sp>
+      </p:grpSp>
+      <p:grpSp>
+        <p:nvGrpSpPr>
+          <p:cNvPr id="29" name="Agrupar 28">
+            <a:extLst>
+              <a:ext uri="{FF2B5EF4-FFF2-40B4-BE49-F238E27FC236}">
+                <a16:creationId xmlns:a16="http://schemas.microsoft.com/office/drawing/2014/main" id="{DD28CEA5-1E67-4FA6-B737-08ED8B67BE91}"/>
+              </a:ext>
+            </a:extLst>
+          </p:cNvPr>
+          <p:cNvGrpSpPr/>
+          <p:nvPr/>
+        </p:nvGrpSpPr>
+        <p:grpSpPr>
+          <a:xfrm>
+            <a:off x="506026" y="2492998"/>
+            <a:ext cx="4465625" cy="486482"/>
+            <a:chOff x="506026" y="2244200"/>
+            <a:chExt cx="4465625" cy="486482"/>
+          </a:xfrm>
+        </p:grpSpPr>
+        <p:sp>
+          <p:nvSpPr>
+            <p:cNvPr id="13" name="Seta: Pentágono 12">
+              <a:extLst>
+                <a:ext uri="{FF2B5EF4-FFF2-40B4-BE49-F238E27FC236}">
+                  <a16:creationId xmlns:a16="http://schemas.microsoft.com/office/drawing/2014/main" id="{CE54CBD9-982A-4DE7-A723-8016080AFE7E}"/>
+                </a:ext>
+              </a:extLst>
+            </p:cNvPr>
+            <p:cNvSpPr/>
+            <p:nvPr/>
+          </p:nvSpPr>
+          <p:spPr>
+            <a:xfrm>
+              <a:off x="506026" y="2246050"/>
+              <a:ext cx="2506487" cy="484632"/>
+            </a:xfrm>
+            <a:prstGeom prst="homePlate">
+              <a:avLst/>
+            </a:prstGeom>
+            <a:solidFill>
+              <a:srgbClr val="EA4F3E"/>
+            </a:solidFill>
+            <a:ln>
+              <a:noFill/>
+            </a:ln>
+          </p:spPr>
+          <p:style>
+            <a:lnRef idx="2">
+              <a:schemeClr val="accent1">
+                <a:shade val="50000"/>
+              </a:schemeClr>
+            </a:lnRef>
+            <a:fillRef idx="1">
+              <a:schemeClr val="accent1"/>
+            </a:fillRef>
+            <a:effectRef idx="0">
+              <a:schemeClr val="accent1"/>
+            </a:effectRef>
+            <a:fontRef idx="minor">
+              <a:schemeClr val="lt1"/>
+            </a:fontRef>
+          </p:style>
+          <p:txBody>
+            <a:bodyPr rtlCol="0" anchor="ctr"/>
+            <a:lstStyle/>
+            <a:p>
+              <a:pPr algn="ctr"/>
+              <a:endParaRPr lang="pt-BR"/>
+            </a:p>
+          </p:txBody>
+        </p:sp>
+        <p:sp>
+          <p:nvSpPr>
+            <p:cNvPr id="14" name="Seta: Divisa 13">
+              <a:extLst>
+                <a:ext uri="{FF2B5EF4-FFF2-40B4-BE49-F238E27FC236}">
+                  <a16:creationId xmlns:a16="http://schemas.microsoft.com/office/drawing/2014/main" id="{BA314239-93CA-43E7-AB37-B5D0FC63CA05}"/>
+                </a:ext>
+              </a:extLst>
+            </p:cNvPr>
+            <p:cNvSpPr/>
+            <p:nvPr/>
+          </p:nvSpPr>
+          <p:spPr>
+            <a:xfrm>
+              <a:off x="3012513" y="2244200"/>
+              <a:ext cx="484632" cy="484632"/>
+            </a:xfrm>
+            <a:prstGeom prst="chevron">
+              <a:avLst/>
+            </a:prstGeom>
+            <a:solidFill>
+              <a:srgbClr val="EA4F3E"/>
+            </a:solidFill>
+            <a:ln>
+              <a:noFill/>
+            </a:ln>
+          </p:spPr>
+          <p:style>
+            <a:lnRef idx="2">
+              <a:schemeClr val="accent1">
+                <a:shade val="50000"/>
+              </a:schemeClr>
+            </a:lnRef>
+            <a:fillRef idx="1">
+              <a:schemeClr val="accent1"/>
+            </a:fillRef>
+            <a:effectRef idx="0">
+              <a:schemeClr val="accent1"/>
+            </a:effectRef>
+            <a:fontRef idx="minor">
+              <a:schemeClr val="lt1"/>
+            </a:fontRef>
+          </p:style>
+          <p:txBody>
+            <a:bodyPr rtlCol="0" anchor="ctr"/>
+            <a:lstStyle/>
+            <a:p>
+              <a:pPr algn="ctr"/>
+              <a:endParaRPr lang="pt-BR" dirty="0">
+                <a:solidFill>
+                  <a:schemeClr val="tx1"/>
+                </a:solidFill>
+              </a:endParaRPr>
+            </a:p>
+          </p:txBody>
+        </p:sp>
+        <p:sp>
+          <p:nvSpPr>
+            <p:cNvPr id="15" name="CaixaDeTexto 14">
+              <a:extLst>
+                <a:ext uri="{FF2B5EF4-FFF2-40B4-BE49-F238E27FC236}">
+                  <a16:creationId xmlns:a16="http://schemas.microsoft.com/office/drawing/2014/main" id="{F40333FB-3F9A-4050-8FE0-1976DD7DC0AF}"/>
+                </a:ext>
+              </a:extLst>
+            </p:cNvPr>
+            <p:cNvSpPr txBox="1"/>
+            <p:nvPr/>
+          </p:nvSpPr>
+          <p:spPr>
+            <a:xfrm>
+              <a:off x="3497145" y="2255683"/>
+              <a:ext cx="1474506" cy="461665"/>
+            </a:xfrm>
+            <a:prstGeom prst="rect">
+              <a:avLst/>
+            </a:prstGeom>
+            <a:noFill/>
+          </p:spPr>
+          <p:txBody>
+            <a:bodyPr wrap="none" rtlCol="0">
+              <a:spAutoFit/>
+            </a:bodyPr>
+            <a:lstStyle/>
+            <a:p>
+              <a:r>
+                <a:rPr lang="pt-BR" sz="2400" dirty="0">
+                  <a:solidFill>
+                    <a:schemeClr val="bg1"/>
+                  </a:solidFill>
+                </a:rPr>
+                <a:t>VARIÁVEIS</a:t>
+              </a:r>
+            </a:p>
+          </p:txBody>
+        </p:sp>
+      </p:grpSp>
+      <p:grpSp>
+        <p:nvGrpSpPr>
+          <p:cNvPr id="28" name="Agrupar 27">
+            <a:extLst>
+              <a:ext uri="{FF2B5EF4-FFF2-40B4-BE49-F238E27FC236}">
+                <a16:creationId xmlns:a16="http://schemas.microsoft.com/office/drawing/2014/main" id="{E092E6D0-1039-4FDE-9A42-92CC0FFFCBC0}"/>
+              </a:ext>
+            </a:extLst>
+          </p:cNvPr>
+          <p:cNvGrpSpPr/>
+          <p:nvPr/>
+        </p:nvGrpSpPr>
+        <p:grpSpPr>
+          <a:xfrm>
+            <a:off x="506026" y="3537372"/>
+            <a:ext cx="5040936" cy="484632"/>
+            <a:chOff x="506026" y="3186684"/>
+            <a:chExt cx="5040936" cy="484632"/>
+          </a:xfrm>
+        </p:grpSpPr>
+        <p:sp>
+          <p:nvSpPr>
+            <p:cNvPr id="17" name="Seta: Pentágono 16">
+              <a:extLst>
+                <a:ext uri="{FF2B5EF4-FFF2-40B4-BE49-F238E27FC236}">
+                  <a16:creationId xmlns:a16="http://schemas.microsoft.com/office/drawing/2014/main" id="{69CA51CE-A0AF-4AE6-A8A1-59F70A24EE49}"/>
+                </a:ext>
+              </a:extLst>
+            </p:cNvPr>
+            <p:cNvSpPr/>
+            <p:nvPr/>
+          </p:nvSpPr>
+          <p:spPr>
+            <a:xfrm>
+              <a:off x="506026" y="3186684"/>
+              <a:ext cx="3158998" cy="484632"/>
+            </a:xfrm>
+            <a:prstGeom prst="homePlate">
+              <a:avLst/>
+            </a:prstGeom>
+            <a:solidFill>
+              <a:srgbClr val="EA4F3E"/>
+            </a:solidFill>
+            <a:ln>
+              <a:noFill/>
+            </a:ln>
+          </p:spPr>
+          <p:style>
+            <a:lnRef idx="2">
+              <a:schemeClr val="accent1">
+                <a:shade val="50000"/>
+              </a:schemeClr>
+            </a:lnRef>
+            <a:fillRef idx="1">
+              <a:schemeClr val="accent1"/>
+            </a:fillRef>
+            <a:effectRef idx="0">
+              <a:schemeClr val="accent1"/>
+            </a:effectRef>
+            <a:fontRef idx="minor">
+              <a:schemeClr val="lt1"/>
+            </a:fontRef>
+          </p:style>
+          <p:txBody>
+            <a:bodyPr rtlCol="0" anchor="ctr"/>
+            <a:lstStyle/>
+            <a:p>
+              <a:pPr algn="ctr"/>
+              <a:endParaRPr lang="pt-BR"/>
+            </a:p>
+          </p:txBody>
+        </p:sp>
+        <p:sp>
+          <p:nvSpPr>
+            <p:cNvPr id="18" name="Seta: Divisa 17">
+              <a:extLst>
+                <a:ext uri="{FF2B5EF4-FFF2-40B4-BE49-F238E27FC236}">
+                  <a16:creationId xmlns:a16="http://schemas.microsoft.com/office/drawing/2014/main" id="{18EF5A36-9B62-40A3-8CFE-901059452D27}"/>
+                </a:ext>
+              </a:extLst>
+            </p:cNvPr>
+            <p:cNvSpPr/>
+            <p:nvPr/>
+          </p:nvSpPr>
+          <p:spPr>
+            <a:xfrm>
+              <a:off x="3665024" y="3186684"/>
+              <a:ext cx="484632" cy="484632"/>
+            </a:xfrm>
+            <a:prstGeom prst="chevron">
+              <a:avLst/>
+            </a:prstGeom>
+            <a:solidFill>
+              <a:srgbClr val="EA4F3E"/>
+            </a:solidFill>
+            <a:ln>
+              <a:noFill/>
+            </a:ln>
+          </p:spPr>
+          <p:style>
+            <a:lnRef idx="2">
+              <a:schemeClr val="accent1">
+                <a:shade val="50000"/>
+              </a:schemeClr>
+            </a:lnRef>
+            <a:fillRef idx="1">
+              <a:schemeClr val="accent1"/>
+            </a:fillRef>
+            <a:effectRef idx="0">
+              <a:schemeClr val="accent1"/>
+            </a:effectRef>
+            <a:fontRef idx="minor">
+              <a:schemeClr val="lt1"/>
+            </a:fontRef>
+          </p:style>
+          <p:txBody>
+            <a:bodyPr rtlCol="0" anchor="ctr"/>
+            <a:lstStyle/>
+            <a:p>
+              <a:pPr algn="ctr"/>
+              <a:endParaRPr lang="pt-BR" dirty="0">
+                <a:solidFill>
+                  <a:schemeClr val="tx1"/>
+                </a:solidFill>
+              </a:endParaRPr>
+            </a:p>
+          </p:txBody>
+        </p:sp>
+        <p:sp>
+          <p:nvSpPr>
+            <p:cNvPr id="19" name="CaixaDeTexto 18">
+              <a:extLst>
+                <a:ext uri="{FF2B5EF4-FFF2-40B4-BE49-F238E27FC236}">
+                  <a16:creationId xmlns:a16="http://schemas.microsoft.com/office/drawing/2014/main" id="{1017DB53-9881-44E8-B503-4F3172B6903B}"/>
+                </a:ext>
+              </a:extLst>
+            </p:cNvPr>
+            <p:cNvSpPr txBox="1"/>
+            <p:nvPr/>
+          </p:nvSpPr>
+          <p:spPr>
+            <a:xfrm>
+              <a:off x="4149656" y="3198167"/>
+              <a:ext cx="1397306" cy="461665"/>
+            </a:xfrm>
+            <a:prstGeom prst="rect">
+              <a:avLst/>
+            </a:prstGeom>
+            <a:noFill/>
+          </p:spPr>
+          <p:txBody>
+            <a:bodyPr wrap="none" rtlCol="0">
+              <a:spAutoFit/>
+            </a:bodyPr>
+            <a:lstStyle/>
+            <a:p>
+              <a:r>
+                <a:rPr lang="pt-BR" sz="2400" dirty="0">
+                  <a:solidFill>
+                    <a:schemeClr val="bg1"/>
+                  </a:solidFill>
+                </a:rPr>
+                <a:t>OUTLIERS</a:t>
+              </a:r>
+            </a:p>
+          </p:txBody>
+        </p:sp>
+      </p:grpSp>
+      <p:grpSp>
+        <p:nvGrpSpPr>
+          <p:cNvPr id="27" name="Agrupar 26">
+            <a:extLst>
+              <a:ext uri="{FF2B5EF4-FFF2-40B4-BE49-F238E27FC236}">
+                <a16:creationId xmlns:a16="http://schemas.microsoft.com/office/drawing/2014/main" id="{91F5A8E2-47D3-4B52-B1D5-0C072F467788}"/>
+              </a:ext>
+            </a:extLst>
+          </p:cNvPr>
+          <p:cNvGrpSpPr/>
+          <p:nvPr/>
+        </p:nvGrpSpPr>
+        <p:grpSpPr>
+          <a:xfrm>
+            <a:off x="506025" y="4579896"/>
+            <a:ext cx="6122988" cy="492252"/>
+            <a:chOff x="506025" y="4010626"/>
+            <a:chExt cx="6122988" cy="492252"/>
+          </a:xfrm>
+        </p:grpSpPr>
+        <p:sp>
+          <p:nvSpPr>
+            <p:cNvPr id="24" name="CaixaDeTexto 23">
+              <a:extLst>
+                <a:ext uri="{FF2B5EF4-FFF2-40B4-BE49-F238E27FC236}">
+                  <a16:creationId xmlns:a16="http://schemas.microsoft.com/office/drawing/2014/main" id="{F9D4165C-FB60-4AB1-9016-5AA8ECFE8881}"/>
+                </a:ext>
+              </a:extLst>
+            </p:cNvPr>
+            <p:cNvSpPr txBox="1"/>
+            <p:nvPr/>
+          </p:nvSpPr>
+          <p:spPr>
+            <a:xfrm>
+              <a:off x="4724966" y="4041213"/>
+              <a:ext cx="1904047" cy="461665"/>
+            </a:xfrm>
+            <a:prstGeom prst="rect">
+              <a:avLst/>
+            </a:prstGeom>
+            <a:noFill/>
+          </p:spPr>
+          <p:txBody>
+            <a:bodyPr wrap="none" rtlCol="0">
+              <a:spAutoFit/>
+            </a:bodyPr>
+            <a:lstStyle/>
+            <a:p>
+              <a:r>
+                <a:rPr lang="pt-BR" sz="2400" dirty="0">
+                  <a:solidFill>
+                    <a:schemeClr val="bg1"/>
+                  </a:solidFill>
+                </a:rPr>
+                <a:t>MODELAGEM</a:t>
+              </a:r>
+            </a:p>
+          </p:txBody>
+        </p:sp>
+        <p:sp>
+          <p:nvSpPr>
+            <p:cNvPr id="25" name="Seta: Pentágono 24">
+              <a:extLst>
+                <a:ext uri="{FF2B5EF4-FFF2-40B4-BE49-F238E27FC236}">
+                  <a16:creationId xmlns:a16="http://schemas.microsoft.com/office/drawing/2014/main" id="{E6835AC1-BBF9-488D-B932-D4E596326A24}"/>
+                </a:ext>
+              </a:extLst>
+            </p:cNvPr>
+            <p:cNvSpPr/>
+            <p:nvPr/>
+          </p:nvSpPr>
+          <p:spPr>
+            <a:xfrm>
+              <a:off x="506025" y="4010626"/>
+              <a:ext cx="3734309" cy="484632"/>
+            </a:xfrm>
+            <a:prstGeom prst="homePlate">
+              <a:avLst/>
+            </a:prstGeom>
+            <a:solidFill>
+              <a:srgbClr val="EA4F3E"/>
+            </a:solidFill>
+            <a:ln>
+              <a:noFill/>
+            </a:ln>
+          </p:spPr>
+          <p:style>
+            <a:lnRef idx="2">
+              <a:schemeClr val="accent1">
+                <a:shade val="50000"/>
+              </a:schemeClr>
+            </a:lnRef>
+            <a:fillRef idx="1">
+              <a:schemeClr val="accent1"/>
+            </a:fillRef>
+            <a:effectRef idx="0">
+              <a:schemeClr val="accent1"/>
+            </a:effectRef>
+            <a:fontRef idx="minor">
+              <a:schemeClr val="lt1"/>
+            </a:fontRef>
+          </p:style>
+          <p:txBody>
+            <a:bodyPr rtlCol="0" anchor="ctr"/>
+            <a:lstStyle/>
+            <a:p>
+              <a:pPr algn="ctr"/>
+              <a:endParaRPr lang="pt-BR"/>
+            </a:p>
+          </p:txBody>
+        </p:sp>
+        <p:sp>
+          <p:nvSpPr>
+            <p:cNvPr id="26" name="Seta: Divisa 25">
+              <a:extLst>
+                <a:ext uri="{FF2B5EF4-FFF2-40B4-BE49-F238E27FC236}">
+                  <a16:creationId xmlns:a16="http://schemas.microsoft.com/office/drawing/2014/main" id="{5316BD11-4B24-4CA5-B1AD-4EC9E7B08A45}"/>
+                </a:ext>
+              </a:extLst>
+            </p:cNvPr>
+            <p:cNvSpPr/>
+            <p:nvPr/>
+          </p:nvSpPr>
+          <p:spPr>
+            <a:xfrm>
+              <a:off x="4240334" y="4010626"/>
+              <a:ext cx="484632" cy="484632"/>
+            </a:xfrm>
+            <a:prstGeom prst="chevron">
+              <a:avLst/>
+            </a:prstGeom>
+            <a:solidFill>
+              <a:srgbClr val="EA4F3E"/>
+            </a:solidFill>
+            <a:ln>
+              <a:noFill/>
+            </a:ln>
+          </p:spPr>
+          <p:style>
+            <a:lnRef idx="2">
+              <a:schemeClr val="accent1">
+                <a:shade val="50000"/>
+              </a:schemeClr>
+            </a:lnRef>
+            <a:fillRef idx="1">
+              <a:schemeClr val="accent1"/>
+            </a:fillRef>
+            <a:effectRef idx="0">
+              <a:schemeClr val="accent1"/>
+            </a:effectRef>
+            <a:fontRef idx="minor">
+              <a:schemeClr val="lt1"/>
+            </a:fontRef>
+          </p:style>
+          <p:txBody>
+            <a:bodyPr rtlCol="0" anchor="ctr"/>
+            <a:lstStyle/>
+            <a:p>
+              <a:pPr algn="ctr"/>
+              <a:endParaRPr lang="pt-BR" dirty="0">
+                <a:solidFill>
+                  <a:schemeClr val="tx1"/>
+                </a:solidFill>
+              </a:endParaRPr>
+            </a:p>
+          </p:txBody>
+        </p:sp>
+      </p:grpSp>
+    </p:spTree>
+    <p:extLst>
+      <p:ext uri="{BB962C8B-B14F-4D97-AF65-F5344CB8AC3E}">
+        <p14:creationId xmlns:p14="http://schemas.microsoft.com/office/powerpoint/2010/main" val="460081362"/>
+      </p:ext>
+    </p:extLst>
+  </p:cSld>
+  <p:clrMapOvr>
+    <a:masterClrMapping/>
+  </p:clrMapOvr>
+</p:sld>
+</file>
+
+<file path=ppt/slides/slide20.xml><?xml version="1.0" encoding="utf-8"?>
 <p:sld xmlns:a="http://schemas.openxmlformats.org/drawingml/2006/main" xmlns:r="http://schemas.openxmlformats.org/officeDocument/2006/relationships" xmlns:p="http://schemas.openxmlformats.org/presentationml/2006/main">
   <p:cSld>
     <p:spTree>
@@ -8600,7 +10422,7 @@
 </p:sld>
 </file>
 
-<file path=ppt/slides/slide2.xml><?xml version="1.0" encoding="utf-8"?>
+<file path=ppt/slides/slide3.xml><?xml version="1.0" encoding="utf-8"?>
 <p:sld xmlns:a="http://schemas.openxmlformats.org/drawingml/2006/main" xmlns:r="http://schemas.openxmlformats.org/officeDocument/2006/relationships" xmlns:p="http://schemas.openxmlformats.org/presentationml/2006/main">
   <p:cSld>
     <p:spTree>
@@ -8675,18 +10497,14 @@
           <a:p>
             <a:r>
               <a:rPr lang="pt-BR" dirty="0"/>
-              <a:t>Iniciamos a </a:t>
-            </a:r>
-            <a:r>
-              <a:rPr lang="en-GB" dirty="0" err="1"/>
-              <a:t>análise</a:t>
+              <a:t>Iniciamos a análise</a:t>
             </a:r>
             <a:r>
               <a:rPr lang="en-GB" dirty="0"/>
               <a:t> </a:t>
             </a:r>
             <a:r>
-              <a:rPr lang="en-GB" dirty="0" err="1"/>
+              <a:rPr lang="pt-BR" dirty="0"/>
               <a:t>carregando</a:t>
             </a:r>
             <a:r>
@@ -8702,7 +10520,7 @@
               <a:t> a </a:t>
             </a:r>
             <a:r>
-              <a:rPr lang="en-GB" dirty="0" err="1"/>
+              <a:rPr lang="pt-BR" dirty="0"/>
               <a:t>estruturação</a:t>
             </a:r>
             <a:r>
@@ -9002,7 +10820,7 @@
 </p:sld>
 </file>
 
-<file path=ppt/slides/slide3.xml><?xml version="1.0" encoding="utf-8"?>
+<file path=ppt/slides/slide4.xml><?xml version="1.0" encoding="utf-8"?>
 <p:sld xmlns:a="http://schemas.openxmlformats.org/drawingml/2006/main" xmlns:r="http://schemas.openxmlformats.org/officeDocument/2006/relationships" xmlns:p="http://schemas.openxmlformats.org/presentationml/2006/main">
   <p:cSld>
     <p:spTree>
@@ -9399,7 +11217,7 @@
 </p:sld>
 </file>
 
-<file path=ppt/slides/slide4.xml><?xml version="1.0" encoding="utf-8"?>
+<file path=ppt/slides/slide5.xml><?xml version="1.0" encoding="utf-8"?>
 <p:sld xmlns:a="http://schemas.openxmlformats.org/drawingml/2006/main" xmlns:r="http://schemas.openxmlformats.org/officeDocument/2006/relationships" xmlns:p="http://schemas.openxmlformats.org/presentationml/2006/main">
   <p:cSld>
     <p:spTree>
@@ -9624,7 +11442,7 @@
 </p:sld>
 </file>
 
-<file path=ppt/slides/slide5.xml><?xml version="1.0" encoding="utf-8"?>
+<file path=ppt/slides/slide6.xml><?xml version="1.0" encoding="utf-8"?>
 <p:sld xmlns:a="http://schemas.openxmlformats.org/drawingml/2006/main" xmlns:r="http://schemas.openxmlformats.org/officeDocument/2006/relationships" xmlns:p="http://schemas.openxmlformats.org/presentationml/2006/main">
   <p:cSld>
     <p:spTree>
@@ -9665,12 +11483,8 @@
           <a:lstStyle/>
           <a:p>
             <a:r>
-              <a:rPr lang="en-GB" dirty="0"/>
-              <a:t>VARI</a:t>
-            </a:r>
-            <a:r>
               <a:rPr lang="pt-BR" dirty="0"/>
-              <a:t>ÁVEIS</a:t>
+              <a:t>BASE DE DADOS</a:t>
             </a:r>
           </a:p>
         </p:txBody>
@@ -9995,7 +11809,7 @@
 </p:sld>
 </file>
 
-<file path=ppt/slides/slide6.xml><?xml version="1.0" encoding="utf-8"?>
+<file path=ppt/slides/slide7.xml><?xml version="1.0" encoding="utf-8"?>
 <p:sld xmlns:a="http://schemas.openxmlformats.org/drawingml/2006/main" xmlns:r="http://schemas.openxmlformats.org/officeDocument/2006/relationships" xmlns:p="http://schemas.openxmlformats.org/presentationml/2006/main">
   <p:cSld>
     <p:spTree>
@@ -10560,7 +12374,7 @@
 </p:sld>
 </file>
 
-<file path=ppt/slides/slide7.xml><?xml version="1.0" encoding="utf-8"?>
+<file path=ppt/slides/slide8.xml><?xml version="1.0" encoding="utf-8"?>
 <p:sld xmlns:a="http://schemas.openxmlformats.org/drawingml/2006/main" xmlns:r="http://schemas.openxmlformats.org/officeDocument/2006/relationships" xmlns:p="http://schemas.openxmlformats.org/presentationml/2006/main">
   <p:cSld>
     <p:spTree>
@@ -10988,7 +12802,7 @@
             </a:pPr>
             <a:r>
               <a:rPr lang="pt-BR" dirty="0"/>
-              <a:t>Indicativo de variáveis </a:t>
+              <a:t>Bom indicativo </a:t>
             </a:r>
             <a:r>
               <a:rPr lang="pt-BR" dirty="0">
@@ -11122,7 +12936,7 @@
 </p:sld>
 </file>
 
-<file path=ppt/slides/slide8.xml><?xml version="1.0" encoding="utf-8"?>
+<file path=ppt/slides/slide9.xml><?xml version="1.0" encoding="utf-8"?>
 <p:sld xmlns:a="http://schemas.openxmlformats.org/drawingml/2006/main" xmlns:r="http://schemas.openxmlformats.org/officeDocument/2006/relationships" xmlns:p="http://schemas.openxmlformats.org/presentationml/2006/main">
   <p:cSld>
     <p:spTree>
@@ -11550,7 +13364,7 @@
             </a:pPr>
             <a:r>
               <a:rPr lang="pt-BR" dirty="0"/>
-              <a:t>Possíveis preditoras para modelo auxiliar para determinar essas variáveis (para inserção posterior no modelo primário)</a:t>
+              <a:t>Possíveis preditoras de modelo auxiliar para determinar essas variáveis (inserção posterior no modelo primário)</a:t>
             </a:r>
           </a:p>
         </p:txBody>
@@ -11559,577 +13373,6 @@
     <p:extLst>
       <p:ext uri="{BB962C8B-B14F-4D97-AF65-F5344CB8AC3E}">
         <p14:creationId xmlns:p14="http://schemas.microsoft.com/office/powerpoint/2010/main" val="3773723419"/>
-      </p:ext>
-    </p:extLst>
-  </p:cSld>
-  <p:clrMapOvr>
-    <a:masterClrMapping/>
-  </p:clrMapOvr>
-  <p:timing>
-    <p:tnLst>
-      <p:par>
-        <p:cTn id="1" dur="indefinite" restart="never" nodeType="tmRoot">
-          <p:childTnLst>
-            <p:seq concurrent="1" nextAc="seek">
-              <p:cTn id="2" dur="indefinite" nodeType="mainSeq">
-                <p:childTnLst>
-                  <p:par>
-                    <p:cTn id="3" fill="hold">
-                      <p:stCondLst>
-                        <p:cond delay="indefinite"/>
-                        <p:cond evt="onBegin" delay="0">
-                          <p:tn val="2"/>
-                        </p:cond>
-                      </p:stCondLst>
-                      <p:childTnLst>
-                        <p:par>
-                          <p:cTn id="4" fill="hold">
-                            <p:stCondLst>
-                              <p:cond delay="0"/>
-                            </p:stCondLst>
-                            <p:childTnLst>
-                              <p:par>
-                                <p:cTn id="5" presetID="1" presetClass="entr" presetSubtype="0" fill="hold" grpId="0" nodeType="withEffect">
-                                  <p:stCondLst>
-                                    <p:cond delay="0"/>
-                                  </p:stCondLst>
-                                  <p:childTnLst>
-                                    <p:set>
-                                      <p:cBhvr>
-                                        <p:cTn id="6" dur="1" fill="hold">
-                                          <p:stCondLst>
-                                            <p:cond delay="0"/>
-                                          </p:stCondLst>
-                                        </p:cTn>
-                                        <p:tgtEl>
-                                          <p:spTgt spid="5"/>
-                                        </p:tgtEl>
-                                        <p:attrNameLst>
-                                          <p:attrName>style.visibility</p:attrName>
-                                        </p:attrNameLst>
-                                      </p:cBhvr>
-                                      <p:to>
-                                        <p:strVal val="visible"/>
-                                      </p:to>
-                                    </p:set>
-                                  </p:childTnLst>
-                                </p:cTn>
-                              </p:par>
-                              <p:par>
-                                <p:cTn id="7" presetID="1" presetClass="entr" presetSubtype="0" fill="hold" grpId="0" nodeType="withEffect">
-                                  <p:stCondLst>
-                                    <p:cond delay="0"/>
-                                  </p:stCondLst>
-                                  <p:childTnLst>
-                                    <p:set>
-                                      <p:cBhvr>
-                                        <p:cTn id="8" dur="1" fill="hold">
-                                          <p:stCondLst>
-                                            <p:cond delay="0"/>
-                                          </p:stCondLst>
-                                        </p:cTn>
-                                        <p:tgtEl>
-                                          <p:spTgt spid="23"/>
-                                        </p:tgtEl>
-                                        <p:attrNameLst>
-                                          <p:attrName>style.visibility</p:attrName>
-                                        </p:attrNameLst>
-                                      </p:cBhvr>
-                                      <p:to>
-                                        <p:strVal val="visible"/>
-                                      </p:to>
-                                    </p:set>
-                                  </p:childTnLst>
-                                </p:cTn>
-                              </p:par>
-                            </p:childTnLst>
-                          </p:cTn>
-                        </p:par>
-                      </p:childTnLst>
-                    </p:cTn>
-                  </p:par>
-                </p:childTnLst>
-              </p:cTn>
-              <p:prevCondLst>
-                <p:cond evt="onPrev" delay="0">
-                  <p:tgtEl>
-                    <p:sldTgt/>
-                  </p:tgtEl>
-                </p:cond>
-              </p:prevCondLst>
-              <p:nextCondLst>
-                <p:cond evt="onNext" delay="0">
-                  <p:tgtEl>
-                    <p:sldTgt/>
-                  </p:tgtEl>
-                </p:cond>
-              </p:nextCondLst>
-            </p:seq>
-          </p:childTnLst>
-        </p:cTn>
-      </p:par>
-    </p:tnLst>
-    <p:bldLst>
-      <p:bldP spid="5" grpId="0" animBg="1"/>
-      <p:bldP spid="23" grpId="0" animBg="1"/>
-    </p:bldLst>
-  </p:timing>
-</p:sld>
-</file>
-
-<file path=ppt/slides/slide9.xml><?xml version="1.0" encoding="utf-8"?>
-<p:sld xmlns:a="http://schemas.openxmlformats.org/drawingml/2006/main" xmlns:r="http://schemas.openxmlformats.org/officeDocument/2006/relationships" xmlns:p="http://schemas.openxmlformats.org/presentationml/2006/main">
-  <p:cSld>
-    <p:spTree>
-      <p:nvGrpSpPr>
-        <p:cNvPr id="1" name=""/>
-        <p:cNvGrpSpPr/>
-        <p:nvPr/>
-      </p:nvGrpSpPr>
-      <p:grpSpPr>
-        <a:xfrm>
-          <a:off x="0" y="0"/>
-          <a:ext cx="0" cy="0"/>
-          <a:chOff x="0" y="0"/>
-          <a:chExt cx="0" cy="0"/>
-        </a:xfrm>
-      </p:grpSpPr>
-      <p:sp>
-        <p:nvSpPr>
-          <p:cNvPr id="2" name="Title 1">
-            <a:extLst>
-              <a:ext uri="{FF2B5EF4-FFF2-40B4-BE49-F238E27FC236}">
-                <a16:creationId xmlns:a16="http://schemas.microsoft.com/office/drawing/2014/main" id="{EF8B6E40-6DA4-406B-8073-1BBEF28FC7D3}"/>
-              </a:ext>
-            </a:extLst>
-          </p:cNvPr>
-          <p:cNvSpPr>
-            <a:spLocks noGrp="1"/>
-          </p:cNvSpPr>
-          <p:nvPr>
-            <p:ph type="title"/>
-          </p:nvPr>
-        </p:nvSpPr>
-        <p:spPr/>
-        <p:txBody>
-          <a:bodyPr>
-            <a:normAutofit fontScale="90000"/>
-          </a:bodyPr>
-          <a:lstStyle/>
-          <a:p>
-            <a:r>
-              <a:rPr lang="pt-BR" dirty="0"/>
-              <a:t>VARIÁVEIS</a:t>
-            </a:r>
-          </a:p>
-        </p:txBody>
-      </p:sp>
-      <p:sp>
-        <p:nvSpPr>
-          <p:cNvPr id="3" name="Text Placeholder 2">
-            <a:extLst>
-              <a:ext uri="{FF2B5EF4-FFF2-40B4-BE49-F238E27FC236}">
-                <a16:creationId xmlns:a16="http://schemas.microsoft.com/office/drawing/2014/main" id="{07BF83B4-B389-4038-A73D-4CC6F7BCA408}"/>
-              </a:ext>
-            </a:extLst>
-          </p:cNvPr>
-          <p:cNvSpPr>
-            <a:spLocks noGrp="1"/>
-          </p:cNvSpPr>
-          <p:nvPr>
-            <p:ph type="body" sz="quarter" idx="10"/>
-          </p:nvPr>
-        </p:nvSpPr>
-        <p:spPr>
-          <a:xfrm>
-            <a:off x="692150" y="782346"/>
-            <a:ext cx="10515600" cy="1298575"/>
-          </a:xfrm>
-        </p:spPr>
-        <p:txBody>
-          <a:bodyPr/>
-          <a:lstStyle/>
-          <a:p>
-            <a:r>
-              <a:rPr lang="pt-BR" dirty="0"/>
-              <a:t>Iniciamos a análise das variáveis com uma análise da correlação</a:t>
-            </a:r>
-          </a:p>
-        </p:txBody>
-      </p:sp>
-      <p:grpSp>
-        <p:nvGrpSpPr>
-          <p:cNvPr id="4" name="Group 3">
-            <a:extLst>
-              <a:ext uri="{FF2B5EF4-FFF2-40B4-BE49-F238E27FC236}">
-                <a16:creationId xmlns:a16="http://schemas.microsoft.com/office/drawing/2014/main" id="{657DAAAF-98AA-49EE-92AD-108EEEA864D9}"/>
-              </a:ext>
-            </a:extLst>
-          </p:cNvPr>
-          <p:cNvGrpSpPr/>
-          <p:nvPr/>
-        </p:nvGrpSpPr>
-        <p:grpSpPr>
-          <a:xfrm>
-            <a:off x="145336" y="1318459"/>
-            <a:ext cx="5522648" cy="4757195"/>
-            <a:chOff x="-3" y="1435260"/>
-            <a:chExt cx="5522648" cy="4757195"/>
-          </a:xfrm>
-        </p:grpSpPr>
-        <p:sp>
-          <p:nvSpPr>
-            <p:cNvPr id="9" name="Rectangle 8">
-              <a:extLst>
-                <a:ext uri="{FF2B5EF4-FFF2-40B4-BE49-F238E27FC236}">
-                  <a16:creationId xmlns:a16="http://schemas.microsoft.com/office/drawing/2014/main" id="{FF14658B-69C4-412A-B3E0-F2FEB7F7E49B}"/>
-                </a:ext>
-              </a:extLst>
-            </p:cNvPr>
-            <p:cNvSpPr/>
-            <p:nvPr/>
-          </p:nvSpPr>
-          <p:spPr>
-            <a:xfrm rot="5400000">
-              <a:off x="-1208220" y="2643478"/>
-              <a:ext cx="3645697" cy="1229263"/>
-            </a:xfrm>
-            <a:prstGeom prst="rect">
-              <a:avLst/>
-            </a:prstGeom>
-            <a:solidFill>
-              <a:schemeClr val="bg1">
-                <a:lumMod val="65000"/>
-                <a:alpha val="48000"/>
-              </a:schemeClr>
-            </a:solidFill>
-            <a:ln w="0">
-              <a:solidFill>
-                <a:srgbClr val="596166"/>
-              </a:solidFill>
-            </a:ln>
-          </p:spPr>
-          <p:style>
-            <a:lnRef idx="2">
-              <a:schemeClr val="accent1">
-                <a:shade val="50000"/>
-              </a:schemeClr>
-            </a:lnRef>
-            <a:fillRef idx="1">
-              <a:schemeClr val="accent1"/>
-            </a:fillRef>
-            <a:effectRef idx="0">
-              <a:schemeClr val="accent1"/>
-            </a:effectRef>
-            <a:fontRef idx="minor">
-              <a:schemeClr val="lt1"/>
-            </a:fontRef>
-          </p:style>
-          <p:txBody>
-            <a:bodyPr rtlCol="0" anchor="ctr"/>
-            <a:lstStyle/>
-            <a:p>
-              <a:pPr algn="ctr"/>
-              <a:endParaRPr lang="pt-BR"/>
-            </a:p>
-          </p:txBody>
-        </p:sp>
-        <p:sp>
-          <p:nvSpPr>
-            <p:cNvPr id="8" name="Rectangle 7">
-              <a:extLst>
-                <a:ext uri="{FF2B5EF4-FFF2-40B4-BE49-F238E27FC236}">
-                  <a16:creationId xmlns:a16="http://schemas.microsoft.com/office/drawing/2014/main" id="{B7ACA159-CA64-4DE5-B724-DF914133FD91}"/>
-                </a:ext>
-              </a:extLst>
-            </p:cNvPr>
-            <p:cNvSpPr/>
-            <p:nvPr/>
-          </p:nvSpPr>
-          <p:spPr>
-            <a:xfrm>
-              <a:off x="1229262" y="5080958"/>
-              <a:ext cx="4260013" cy="1111497"/>
-            </a:xfrm>
-            <a:prstGeom prst="rect">
-              <a:avLst/>
-            </a:prstGeom>
-            <a:solidFill>
-              <a:schemeClr val="bg1">
-                <a:lumMod val="65000"/>
-                <a:alpha val="48000"/>
-              </a:schemeClr>
-            </a:solidFill>
-            <a:ln w="0">
-              <a:noFill/>
-            </a:ln>
-          </p:spPr>
-          <p:style>
-            <a:lnRef idx="2">
-              <a:schemeClr val="accent1">
-                <a:shade val="50000"/>
-              </a:schemeClr>
-            </a:lnRef>
-            <a:fillRef idx="1">
-              <a:schemeClr val="accent1"/>
-            </a:fillRef>
-            <a:effectRef idx="0">
-              <a:schemeClr val="accent1"/>
-            </a:effectRef>
-            <a:fontRef idx="minor">
-              <a:schemeClr val="lt1"/>
-            </a:fontRef>
-          </p:style>
-          <p:txBody>
-            <a:bodyPr rtlCol="0" anchor="ctr"/>
-            <a:lstStyle/>
-            <a:p>
-              <a:pPr algn="ctr"/>
-              <a:endParaRPr lang="pt-BR"/>
-            </a:p>
-          </p:txBody>
-        </p:sp>
-        <p:pic>
-          <p:nvPicPr>
-            <p:cNvPr id="2056" name="Picture 8">
-              <a:extLst>
-                <a:ext uri="{FF2B5EF4-FFF2-40B4-BE49-F238E27FC236}">
-                  <a16:creationId xmlns:a16="http://schemas.microsoft.com/office/drawing/2014/main" id="{F1EE69BB-985D-424D-AFF4-D87F4494B9A7}"/>
-                </a:ext>
-              </a:extLst>
-            </p:cNvPr>
-            <p:cNvPicPr>
-              <a:picLocks noChangeAspect="1" noChangeArrowheads="1"/>
-            </p:cNvPicPr>
-            <p:nvPr/>
-          </p:nvPicPr>
-          <p:blipFill>
-            <a:blip r:embed="rId2">
-              <a:extLst>
-                <a:ext uri="{28A0092B-C50C-407E-A947-70E740481C1C}">
-                  <a14:useLocalDpi xmlns:a14="http://schemas.microsoft.com/office/drawing/2010/main" val="0"/>
-                </a:ext>
-              </a:extLst>
-            </a:blip>
-            <a:srcRect/>
-            <a:stretch>
-              <a:fillRect/>
-            </a:stretch>
-          </p:blipFill>
-          <p:spPr bwMode="auto">
-            <a:xfrm>
-              <a:off x="0" y="1435260"/>
-              <a:ext cx="5522645" cy="4757195"/>
-            </a:xfrm>
-            <a:prstGeom prst="rect">
-              <a:avLst/>
-            </a:prstGeom>
-            <a:noFill/>
-            <a:extLst>
-              <a:ext uri="{909E8E84-426E-40DD-AFC4-6F175D3DCCD1}">
-                <a14:hiddenFill xmlns:a14="http://schemas.microsoft.com/office/drawing/2010/main">
-                  <a:solidFill>
-                    <a:srgbClr val="FFFFFF"/>
-                  </a:solidFill>
-                </a14:hiddenFill>
-              </a:ext>
-            </a:extLst>
-          </p:spPr>
-        </p:pic>
-      </p:grpSp>
-      <p:sp>
-        <p:nvSpPr>
-          <p:cNvPr id="5" name="Rectangle 4">
-            <a:extLst>
-              <a:ext uri="{FF2B5EF4-FFF2-40B4-BE49-F238E27FC236}">
-                <a16:creationId xmlns:a16="http://schemas.microsoft.com/office/drawing/2014/main" id="{72EF741D-EC3E-4520-A797-0D3C1EB10736}"/>
-              </a:ext>
-            </a:extLst>
-          </p:cNvPr>
-          <p:cNvSpPr/>
-          <p:nvPr/>
-        </p:nvSpPr>
-        <p:spPr>
-          <a:xfrm rot="5400000" flipH="1">
-            <a:off x="2673624" y="142909"/>
-            <a:ext cx="432704" cy="5489280"/>
-          </a:xfrm>
-          <a:prstGeom prst="rect">
-            <a:avLst/>
-          </a:prstGeom>
-          <a:noFill/>
-          <a:ln w="38100">
-            <a:solidFill>
-              <a:schemeClr val="bg1"/>
-            </a:solidFill>
-          </a:ln>
-        </p:spPr>
-        <p:style>
-          <a:lnRef idx="2">
-            <a:schemeClr val="accent1">
-              <a:shade val="50000"/>
-            </a:schemeClr>
-          </a:lnRef>
-          <a:fillRef idx="1">
-            <a:schemeClr val="accent1"/>
-          </a:fillRef>
-          <a:effectRef idx="0">
-            <a:schemeClr val="accent1"/>
-          </a:effectRef>
-          <a:fontRef idx="minor">
-            <a:schemeClr val="lt1"/>
-          </a:fontRef>
-        </p:style>
-        <p:txBody>
-          <a:bodyPr rtlCol="0" anchor="ctr"/>
-          <a:lstStyle/>
-          <a:p>
-            <a:pPr algn="ctr"/>
-            <a:endParaRPr lang="pt-BR"/>
-          </a:p>
-        </p:txBody>
-      </p:sp>
-      <p:sp>
-        <p:nvSpPr>
-          <p:cNvPr id="24" name="TextBox 23">
-            <a:extLst>
-              <a:ext uri="{FF2B5EF4-FFF2-40B4-BE49-F238E27FC236}">
-                <a16:creationId xmlns:a16="http://schemas.microsoft.com/office/drawing/2014/main" id="{73A9D265-CD53-4BA0-8EFA-2CA1F7A2DF5F}"/>
-              </a:ext>
-            </a:extLst>
-          </p:cNvPr>
-          <p:cNvSpPr txBox="1"/>
-          <p:nvPr/>
-        </p:nvSpPr>
-        <p:spPr>
-          <a:xfrm>
-            <a:off x="5761736" y="1318459"/>
-            <a:ext cx="6284926" cy="1200329"/>
-          </a:xfrm>
-          <a:prstGeom prst="rect">
-            <a:avLst/>
-          </a:prstGeom>
-          <a:noFill/>
-        </p:spPr>
-        <p:txBody>
-          <a:bodyPr wrap="square" rtlCol="0">
-            <a:spAutoFit/>
-          </a:bodyPr>
-          <a:lstStyle/>
-          <a:p>
-            <a:r>
-              <a:rPr lang="pt-BR" sz="2400" dirty="0">
-                <a:solidFill>
-                  <a:schemeClr val="bg1"/>
-                </a:solidFill>
-              </a:rPr>
-              <a:t>Analisando o mapa de correlação podemos identificar:</a:t>
-            </a:r>
-          </a:p>
-          <a:p>
-            <a:endParaRPr lang="pt-BR" sz="2400" dirty="0">
-              <a:solidFill>
-                <a:schemeClr val="bg1"/>
-              </a:solidFill>
-            </a:endParaRPr>
-          </a:p>
-        </p:txBody>
-      </p:sp>
-      <p:sp>
-        <p:nvSpPr>
-          <p:cNvPr id="23" name="Callout: Bent Line 22">
-            <a:extLst>
-              <a:ext uri="{FF2B5EF4-FFF2-40B4-BE49-F238E27FC236}">
-                <a16:creationId xmlns:a16="http://schemas.microsoft.com/office/drawing/2014/main" id="{D2E531F3-D9A8-44F1-B899-91A149E52607}"/>
-              </a:ext>
-            </a:extLst>
-          </p:cNvPr>
-          <p:cNvSpPr/>
-          <p:nvPr/>
-        </p:nvSpPr>
-        <p:spPr>
-          <a:xfrm>
-            <a:off x="6983510" y="3080779"/>
-            <a:ext cx="4511187" cy="2129575"/>
-          </a:xfrm>
-          <a:prstGeom prst="borderCallout2">
-            <a:avLst>
-              <a:gd name="adj1" fmla="val 18750"/>
-              <a:gd name="adj2" fmla="val -8333"/>
-              <a:gd name="adj3" fmla="val 18750"/>
-              <a:gd name="adj4" fmla="val -16667"/>
-              <a:gd name="adj5" fmla="val -8954"/>
-              <a:gd name="adj6" fmla="val -29456"/>
-            </a:avLst>
-          </a:prstGeom>
-          <a:noFill/>
-          <a:ln>
-            <a:solidFill>
-              <a:schemeClr val="bg1"/>
-            </a:solidFill>
-          </a:ln>
-        </p:spPr>
-        <p:style>
-          <a:lnRef idx="2">
-            <a:schemeClr val="accent1">
-              <a:shade val="50000"/>
-            </a:schemeClr>
-          </a:lnRef>
-          <a:fillRef idx="1">
-            <a:schemeClr val="accent1"/>
-          </a:fillRef>
-          <a:effectRef idx="0">
-            <a:schemeClr val="accent1"/>
-          </a:effectRef>
-          <a:fontRef idx="minor">
-            <a:schemeClr val="lt1"/>
-          </a:fontRef>
-        </p:style>
-        <p:txBody>
-          <a:bodyPr rtlCol="0" anchor="ctr"/>
-          <a:lstStyle/>
-          <a:p>
-            <a:pPr marL="285750" indent="-285750">
-              <a:buFont typeface="Arial" panose="020B0604020202020204" pitchFamily="34" charset="0"/>
-              <a:buChar char="•"/>
-            </a:pPr>
-            <a:r>
-              <a:rPr lang="pt-BR" dirty="0"/>
-              <a:t>Para as variáveis </a:t>
-            </a:r>
-            <a:r>
-              <a:rPr lang="pt-BR" dirty="0" err="1"/>
-              <a:t>Qtde</a:t>
-            </a:r>
-            <a:r>
-              <a:rPr lang="pt-BR" dirty="0"/>
-              <a:t> adiantamento e </a:t>
-            </a:r>
-            <a:r>
-              <a:rPr lang="pt-BR" dirty="0" err="1"/>
-              <a:t>Qtde</a:t>
-            </a:r>
-            <a:r>
-              <a:rPr lang="pt-BR" dirty="0"/>
-              <a:t> fonte de renda as correlações são menos expressivas</a:t>
-            </a:r>
-          </a:p>
-          <a:p>
-            <a:pPr marL="285750" indent="-285750">
-              <a:buFont typeface="Arial" panose="020B0604020202020204" pitchFamily="34" charset="0"/>
-              <a:buChar char="•"/>
-            </a:pPr>
-            <a:r>
-              <a:rPr lang="pt-BR" dirty="0"/>
-              <a:t>Um modelo auxiliar para corrigir os valores nulos será potencialmente menos preciso</a:t>
-            </a:r>
-          </a:p>
-        </p:txBody>
-      </p:sp>
-    </p:spTree>
-    <p:extLst>
-      <p:ext uri="{BB962C8B-B14F-4D97-AF65-F5344CB8AC3E}">
-        <p14:creationId xmlns:p14="http://schemas.microsoft.com/office/powerpoint/2010/main" val="1923640337"/>
       </p:ext>
     </p:extLst>
   </p:cSld>

</xml_diff>